<commit_message>
add Yen vao team VP va team Web
</commit_message>
<xml_diff>
--- a/Document/00.Other/FUFO_First_Plan.pptx
+++ b/Document/00.Other/FUFO_First_Plan.pptx
@@ -4077,30 +4077,6 @@
         </dgm:presLayoutVars>
       </dgm:prSet>
       <dgm:spPr/>
-    </dgm:pt>
-    <dgm:pt modelId="{644CA3B1-0F4B-4554-8C15-7E669E7DAE55}" type="pres">
-      <dgm:prSet presAssocID="{9B526122-3AF4-4288-8BB1-A546A87A9F43}" presName="roof" presStyleLbl="dkBgShp" presStyleIdx="0" presStyleCnt="2"/>
-      <dgm:spPr/>
-    </dgm:pt>
-    <dgm:pt modelId="{2F52C8D3-E569-4246-9BEF-6F5367864A1B}" type="pres">
-      <dgm:prSet presAssocID="{9B526122-3AF4-4288-8BB1-A546A87A9F43}" presName="pillars" presStyleCnt="0"/>
-      <dgm:spPr/>
-    </dgm:pt>
-    <dgm:pt modelId="{E0E39095-FBC8-472D-BBAA-31FB5C927584}" type="pres">
-      <dgm:prSet presAssocID="{9B526122-3AF4-4288-8BB1-A546A87A9F43}" presName="pillar1" presStyleLbl="node1" presStyleIdx="0" presStyleCnt="3">
-        <dgm:presLayoutVars>
-          <dgm:bulletEnabled val="1"/>
-        </dgm:presLayoutVars>
-      </dgm:prSet>
-      <dgm:spPr/>
-    </dgm:pt>
-    <dgm:pt modelId="{31E92E4A-6510-4C8C-A9F3-2AE7DBCEE482}" type="pres">
-      <dgm:prSet presAssocID="{34EE3FCF-56C8-44A1-BCDA-3B971E193010}" presName="pillarX" presStyleLbl="node1" presStyleIdx="1" presStyleCnt="3">
-        <dgm:presLayoutVars>
-          <dgm:bulletEnabled val="1"/>
-        </dgm:presLayoutVars>
-      </dgm:prSet>
-      <dgm:spPr/>
       <dgm:t>
         <a:bodyPr/>
         <a:lstStyle/>
@@ -4109,6 +4085,51 @@
         </a:p>
       </dgm:t>
     </dgm:pt>
+    <dgm:pt modelId="{644CA3B1-0F4B-4554-8C15-7E669E7DAE55}" type="pres">
+      <dgm:prSet presAssocID="{9B526122-3AF4-4288-8BB1-A546A87A9F43}" presName="roof" presStyleLbl="dkBgShp" presStyleIdx="0" presStyleCnt="2"/>
+      <dgm:spPr/>
+      <dgm:t>
+        <a:bodyPr/>
+        <a:lstStyle/>
+        <a:p>
+          <a:endParaRPr lang="en-US"/>
+        </a:p>
+      </dgm:t>
+    </dgm:pt>
+    <dgm:pt modelId="{2F52C8D3-E569-4246-9BEF-6F5367864A1B}" type="pres">
+      <dgm:prSet presAssocID="{9B526122-3AF4-4288-8BB1-A546A87A9F43}" presName="pillars" presStyleCnt="0"/>
+      <dgm:spPr/>
+    </dgm:pt>
+    <dgm:pt modelId="{E0E39095-FBC8-472D-BBAA-31FB5C927584}" type="pres">
+      <dgm:prSet presAssocID="{9B526122-3AF4-4288-8BB1-A546A87A9F43}" presName="pillar1" presStyleLbl="node1" presStyleIdx="0" presStyleCnt="3">
+        <dgm:presLayoutVars>
+          <dgm:bulletEnabled val="1"/>
+        </dgm:presLayoutVars>
+      </dgm:prSet>
+      <dgm:spPr/>
+      <dgm:t>
+        <a:bodyPr/>
+        <a:lstStyle/>
+        <a:p>
+          <a:endParaRPr lang="en-US"/>
+        </a:p>
+      </dgm:t>
+    </dgm:pt>
+    <dgm:pt modelId="{31E92E4A-6510-4C8C-A9F3-2AE7DBCEE482}" type="pres">
+      <dgm:prSet presAssocID="{34EE3FCF-56C8-44A1-BCDA-3B971E193010}" presName="pillarX" presStyleLbl="node1" presStyleIdx="1" presStyleCnt="3">
+        <dgm:presLayoutVars>
+          <dgm:bulletEnabled val="1"/>
+        </dgm:presLayoutVars>
+      </dgm:prSet>
+      <dgm:spPr/>
+      <dgm:t>
+        <a:bodyPr/>
+        <a:lstStyle/>
+        <a:p>
+          <a:endParaRPr lang="en-US"/>
+        </a:p>
+      </dgm:t>
+    </dgm:pt>
     <dgm:pt modelId="{8482E7D4-3202-49AB-AFBF-F8BECE31A5B1}" type="pres">
       <dgm:prSet presAssocID="{1C9FF68B-2C5D-4326-9043-9C3E251B775D}" presName="pillarX" presStyleLbl="node1" presStyleIdx="2" presStyleCnt="3">
         <dgm:presLayoutVars>
@@ -4116,6 +4137,13 @@
         </dgm:presLayoutVars>
       </dgm:prSet>
       <dgm:spPr/>
+      <dgm:t>
+        <a:bodyPr/>
+        <a:lstStyle/>
+        <a:p>
+          <a:endParaRPr lang="en-US"/>
+        </a:p>
+      </dgm:t>
     </dgm:pt>
     <dgm:pt modelId="{519C24BF-6D77-4BD0-9F6E-2B93E9CA6D02}" type="pres">
       <dgm:prSet presAssocID="{9B526122-3AF4-4288-8BB1-A546A87A9F43}" presName="base" presStyleLbl="dkBgShp" presStyleIdx="1" presStyleCnt="2"/>
@@ -4615,26 +4643,6 @@
         </dgm:presLayoutVars>
       </dgm:prSet>
       <dgm:spPr/>
-    </dgm:pt>
-    <dgm:pt modelId="{C6113C20-630F-49F5-B2AF-74CFA5E0F025}" type="pres">
-      <dgm:prSet presAssocID="{A414F3A0-F3D0-48C7-BD5E-C973BD4DA5FC}" presName="hierRoot1" presStyleCnt="0"/>
-      <dgm:spPr/>
-    </dgm:pt>
-    <dgm:pt modelId="{9385CF6E-0152-40BE-9849-6653EE0F2BDD}" type="pres">
-      <dgm:prSet presAssocID="{A414F3A0-F3D0-48C7-BD5E-C973BD4DA5FC}" presName="composite" presStyleCnt="0"/>
-      <dgm:spPr/>
-    </dgm:pt>
-    <dgm:pt modelId="{EA82BF5B-4228-479A-AB7B-7847B2199AE5}" type="pres">
-      <dgm:prSet presAssocID="{A414F3A0-F3D0-48C7-BD5E-C973BD4DA5FC}" presName="background" presStyleLbl="node0" presStyleIdx="0" presStyleCnt="2"/>
-      <dgm:spPr/>
-    </dgm:pt>
-    <dgm:pt modelId="{6C24B679-A224-47EA-987A-C973994C4BF6}" type="pres">
-      <dgm:prSet presAssocID="{A414F3A0-F3D0-48C7-BD5E-C973BD4DA5FC}" presName="text" presStyleLbl="fgAcc0" presStyleIdx="0" presStyleCnt="2" custLinFactNeighborY="-82">
-        <dgm:presLayoutVars>
-          <dgm:chPref val="3"/>
-        </dgm:presLayoutVars>
-      </dgm:prSet>
-      <dgm:spPr/>
       <dgm:t>
         <a:bodyPr/>
         <a:lstStyle/>
@@ -4643,28 +4651,20 @@
         </a:p>
       </dgm:t>
     </dgm:pt>
-    <dgm:pt modelId="{64EF175C-EE99-4948-A63A-9793D3378EA2}" type="pres">
-      <dgm:prSet presAssocID="{A414F3A0-F3D0-48C7-BD5E-C973BD4DA5FC}" presName="hierChild2" presStyleCnt="0"/>
-      <dgm:spPr/>
-    </dgm:pt>
-    <dgm:pt modelId="{1A16012F-D7C1-44F5-9D61-12EE6B937EAA}" type="pres">
-      <dgm:prSet presAssocID="{434D147A-963A-4E4A-A913-C410E6C829B9}" presName="Name10" presStyleLbl="parChTrans1D2" presStyleIdx="0" presStyleCnt="3"/>
-      <dgm:spPr/>
-    </dgm:pt>
-    <dgm:pt modelId="{C861FA9D-E83A-400B-9987-35C02BA1EFAA}" type="pres">
-      <dgm:prSet presAssocID="{DD351C4C-72E9-4E05-8DC7-951FBBE48B55}" presName="hierRoot2" presStyleCnt="0"/>
-      <dgm:spPr/>
-    </dgm:pt>
-    <dgm:pt modelId="{C36192DB-22D6-4C98-970D-8BDFA754D958}" type="pres">
-      <dgm:prSet presAssocID="{DD351C4C-72E9-4E05-8DC7-951FBBE48B55}" presName="composite2" presStyleCnt="0"/>
-      <dgm:spPr/>
-    </dgm:pt>
-    <dgm:pt modelId="{BC357281-8921-4737-9E42-E87F7CE8A538}" type="pres">
-      <dgm:prSet presAssocID="{DD351C4C-72E9-4E05-8DC7-951FBBE48B55}" presName="background2" presStyleLbl="node2" presStyleIdx="0" presStyleCnt="3"/>
-      <dgm:spPr/>
-    </dgm:pt>
-    <dgm:pt modelId="{32A0E7CE-AD8E-4FDF-A9AE-B903F6897885}" type="pres">
-      <dgm:prSet presAssocID="{DD351C4C-72E9-4E05-8DC7-951FBBE48B55}" presName="text2" presStyleLbl="fgAcc2" presStyleIdx="0" presStyleCnt="3">
+    <dgm:pt modelId="{C6113C20-630F-49F5-B2AF-74CFA5E0F025}" type="pres">
+      <dgm:prSet presAssocID="{A414F3A0-F3D0-48C7-BD5E-C973BD4DA5FC}" presName="hierRoot1" presStyleCnt="0"/>
+      <dgm:spPr/>
+    </dgm:pt>
+    <dgm:pt modelId="{9385CF6E-0152-40BE-9849-6653EE0F2BDD}" type="pres">
+      <dgm:prSet presAssocID="{A414F3A0-F3D0-48C7-BD5E-C973BD4DA5FC}" presName="composite" presStyleCnt="0"/>
+      <dgm:spPr/>
+    </dgm:pt>
+    <dgm:pt modelId="{EA82BF5B-4228-479A-AB7B-7847B2199AE5}" type="pres">
+      <dgm:prSet presAssocID="{A414F3A0-F3D0-48C7-BD5E-C973BD4DA5FC}" presName="background" presStyleLbl="node0" presStyleIdx="0" presStyleCnt="2"/>
+      <dgm:spPr/>
+    </dgm:pt>
+    <dgm:pt modelId="{6C24B679-A224-47EA-987A-C973994C4BF6}" type="pres">
+      <dgm:prSet presAssocID="{A414F3A0-F3D0-48C7-BD5E-C973BD4DA5FC}" presName="text" presStyleLbl="fgAcc0" presStyleIdx="0" presStyleCnt="2" custLinFactNeighborY="-82">
         <dgm:presLayoutVars>
           <dgm:chPref val="3"/>
         </dgm:presLayoutVars>
@@ -4678,32 +4678,12 @@
         </a:p>
       </dgm:t>
     </dgm:pt>
-    <dgm:pt modelId="{7D291A92-E0F2-424B-82AB-06BAA86C8A8A}" type="pres">
-      <dgm:prSet presAssocID="{DD351C4C-72E9-4E05-8DC7-951FBBE48B55}" presName="hierChild3" presStyleCnt="0"/>
-      <dgm:spPr/>
-    </dgm:pt>
-    <dgm:pt modelId="{B61A23CF-FEB6-4EA8-B741-96881DC2FC32}" type="pres">
-      <dgm:prSet presAssocID="{5B972C33-620B-4D06-A769-D30144C88AD2}" presName="Name10" presStyleLbl="parChTrans1D2" presStyleIdx="1" presStyleCnt="3"/>
-      <dgm:spPr/>
-    </dgm:pt>
-    <dgm:pt modelId="{6397F36E-1110-4552-BF36-85FAA2BCC405}" type="pres">
-      <dgm:prSet presAssocID="{E176D4A6-23B1-45F8-8639-0521E74F02D8}" presName="hierRoot2" presStyleCnt="0"/>
-      <dgm:spPr/>
-    </dgm:pt>
-    <dgm:pt modelId="{D4DC89AD-B35B-46F8-AE3E-AC04306B1D72}" type="pres">
-      <dgm:prSet presAssocID="{E176D4A6-23B1-45F8-8639-0521E74F02D8}" presName="composite2" presStyleCnt="0"/>
-      <dgm:spPr/>
-    </dgm:pt>
-    <dgm:pt modelId="{00F83B0E-96DC-4A67-8AF0-CF719D3A9CE2}" type="pres">
-      <dgm:prSet presAssocID="{E176D4A6-23B1-45F8-8639-0521E74F02D8}" presName="background2" presStyleLbl="node2" presStyleIdx="1" presStyleCnt="3"/>
-      <dgm:spPr/>
-    </dgm:pt>
-    <dgm:pt modelId="{7E96EB48-7081-44FF-950B-EC8DC6726213}" type="pres">
-      <dgm:prSet presAssocID="{E176D4A6-23B1-45F8-8639-0521E74F02D8}" presName="text2" presStyleLbl="fgAcc2" presStyleIdx="1" presStyleCnt="3">
-        <dgm:presLayoutVars>
-          <dgm:chPref val="3"/>
-        </dgm:presLayoutVars>
-      </dgm:prSet>
+    <dgm:pt modelId="{64EF175C-EE99-4948-A63A-9793D3378EA2}" type="pres">
+      <dgm:prSet presAssocID="{A414F3A0-F3D0-48C7-BD5E-C973BD4DA5FC}" presName="hierChild2" presStyleCnt="0"/>
+      <dgm:spPr/>
+    </dgm:pt>
+    <dgm:pt modelId="{1A16012F-D7C1-44F5-9D61-12EE6B937EAA}" type="pres">
+      <dgm:prSet presAssocID="{434D147A-963A-4E4A-A913-C410E6C829B9}" presName="Name10" presStyleLbl="parChTrans1D2" presStyleIdx="0" presStyleCnt="3"/>
       <dgm:spPr/>
       <dgm:t>
         <a:bodyPr/>
@@ -4713,80 +4693,20 @@
         </a:p>
       </dgm:t>
     </dgm:pt>
-    <dgm:pt modelId="{E2705C0D-DCE7-4806-B5CE-6334B46F3D72}" type="pres">
-      <dgm:prSet presAssocID="{E176D4A6-23B1-45F8-8639-0521E74F02D8}" presName="hierChild3" presStyleCnt="0"/>
-      <dgm:spPr/>
-    </dgm:pt>
-    <dgm:pt modelId="{4580C0A3-0B00-4D07-A4C7-FDACE7457F11}" type="pres">
-      <dgm:prSet presAssocID="{32FFCEA9-CFEA-4E99-AE91-D669F856CF5B}" presName="Name17" presStyleLbl="parChTrans1D3" presStyleIdx="0" presStyleCnt="2"/>
-      <dgm:spPr/>
-    </dgm:pt>
-    <dgm:pt modelId="{6B3ED4EE-60A3-49BD-86AA-0BA6FCD81929}" type="pres">
-      <dgm:prSet presAssocID="{CB3DEED7-A648-4A10-9B33-E76584843873}" presName="hierRoot3" presStyleCnt="0"/>
-      <dgm:spPr/>
-    </dgm:pt>
-    <dgm:pt modelId="{10C813ED-52CE-4760-8C67-8D52E89ECFC0}" type="pres">
-      <dgm:prSet presAssocID="{CB3DEED7-A648-4A10-9B33-E76584843873}" presName="composite3" presStyleCnt="0"/>
-      <dgm:spPr/>
-    </dgm:pt>
-    <dgm:pt modelId="{4CEC9687-6F3A-4F9F-8EDD-1D2FA25B73D4}" type="pres">
-      <dgm:prSet presAssocID="{CB3DEED7-A648-4A10-9B33-E76584843873}" presName="background3" presStyleLbl="node3" presStyleIdx="0" presStyleCnt="2"/>
-      <dgm:spPr/>
-    </dgm:pt>
-    <dgm:pt modelId="{296B1435-349D-4FEC-943E-71A2532A3EC2}" type="pres">
-      <dgm:prSet presAssocID="{CB3DEED7-A648-4A10-9B33-E76584843873}" presName="text3" presStyleLbl="fgAcc3" presStyleIdx="0" presStyleCnt="2">
-        <dgm:presLayoutVars>
-          <dgm:chPref val="3"/>
-        </dgm:presLayoutVars>
-      </dgm:prSet>
-      <dgm:spPr/>
-    </dgm:pt>
-    <dgm:pt modelId="{478743AF-E349-41FB-BD1B-E0954F22C99D}" type="pres">
-      <dgm:prSet presAssocID="{CB3DEED7-A648-4A10-9B33-E76584843873}" presName="hierChild4" presStyleCnt="0"/>
-      <dgm:spPr/>
-    </dgm:pt>
-    <dgm:pt modelId="{B706113B-F671-40DD-BBAB-322AE14F6488}" type="pres">
-      <dgm:prSet presAssocID="{50E80EE0-A4DD-47C0-AF86-36F5A9425CC3}" presName="hierRoot1" presStyleCnt="0"/>
-      <dgm:spPr/>
-    </dgm:pt>
-    <dgm:pt modelId="{552ED644-101E-4FE2-9EBF-1FC517A0C839}" type="pres">
-      <dgm:prSet presAssocID="{50E80EE0-A4DD-47C0-AF86-36F5A9425CC3}" presName="composite" presStyleCnt="0"/>
-      <dgm:spPr/>
-    </dgm:pt>
-    <dgm:pt modelId="{343C0B6F-AB84-4647-8D12-F4F20E2875B6}" type="pres">
-      <dgm:prSet presAssocID="{50E80EE0-A4DD-47C0-AF86-36F5A9425CC3}" presName="background" presStyleLbl="node0" presStyleIdx="1" presStyleCnt="2"/>
-      <dgm:spPr/>
-    </dgm:pt>
-    <dgm:pt modelId="{44711A0E-F7D4-4839-8F69-8F00BCAD9C5F}" type="pres">
-      <dgm:prSet presAssocID="{50E80EE0-A4DD-47C0-AF86-36F5A9425CC3}" presName="text" presStyleLbl="fgAcc0" presStyleIdx="1" presStyleCnt="2">
-        <dgm:presLayoutVars>
-          <dgm:chPref val="3"/>
-        </dgm:presLayoutVars>
-      </dgm:prSet>
-      <dgm:spPr/>
-    </dgm:pt>
-    <dgm:pt modelId="{E50D9762-5E63-4AD4-BDFF-9EC3A870AD70}" type="pres">
-      <dgm:prSet presAssocID="{50E80EE0-A4DD-47C0-AF86-36F5A9425CC3}" presName="hierChild2" presStyleCnt="0"/>
-      <dgm:spPr/>
-    </dgm:pt>
-    <dgm:pt modelId="{0E60B450-62CE-4945-82D4-E2C344E085E1}" type="pres">
-      <dgm:prSet presAssocID="{D4830123-865B-406D-A862-C0D16419462C}" presName="Name10" presStyleLbl="parChTrans1D2" presStyleIdx="2" presStyleCnt="3"/>
-      <dgm:spPr/>
-    </dgm:pt>
-    <dgm:pt modelId="{21416203-3929-439C-985F-9ED931C6F86D}" type="pres">
-      <dgm:prSet presAssocID="{CF02CACD-5214-4A46-984B-DC32F543FA4D}" presName="hierRoot2" presStyleCnt="0"/>
-      <dgm:spPr/>
-    </dgm:pt>
-    <dgm:pt modelId="{FDF1F5F3-57B7-4549-BB10-12753610BCD0}" type="pres">
-      <dgm:prSet presAssocID="{CF02CACD-5214-4A46-984B-DC32F543FA4D}" presName="composite2" presStyleCnt="0"/>
-      <dgm:spPr/>
-    </dgm:pt>
-    <dgm:pt modelId="{A21D24DE-3421-4081-9E9F-D30B62C5A7DA}" type="pres">
-      <dgm:prSet presAssocID="{CF02CACD-5214-4A46-984B-DC32F543FA4D}" presName="background2" presStyleLbl="node2" presStyleIdx="2" presStyleCnt="3"/>
-      <dgm:spPr/>
-    </dgm:pt>
-    <dgm:pt modelId="{EE3A2CD5-60F8-4EE9-953D-C4A6F826B37C}" type="pres">
-      <dgm:prSet presAssocID="{CF02CACD-5214-4A46-984B-DC32F543FA4D}" presName="text2" presStyleLbl="fgAcc2" presStyleIdx="2" presStyleCnt="3">
+    <dgm:pt modelId="{C861FA9D-E83A-400B-9987-35C02BA1EFAA}" type="pres">
+      <dgm:prSet presAssocID="{DD351C4C-72E9-4E05-8DC7-951FBBE48B55}" presName="hierRoot2" presStyleCnt="0"/>
+      <dgm:spPr/>
+    </dgm:pt>
+    <dgm:pt modelId="{C36192DB-22D6-4C98-970D-8BDFA754D958}" type="pres">
+      <dgm:prSet presAssocID="{DD351C4C-72E9-4E05-8DC7-951FBBE48B55}" presName="composite2" presStyleCnt="0"/>
+      <dgm:spPr/>
+    </dgm:pt>
+    <dgm:pt modelId="{BC357281-8921-4737-9E42-E87F7CE8A538}" type="pres">
+      <dgm:prSet presAssocID="{DD351C4C-72E9-4E05-8DC7-951FBBE48B55}" presName="background2" presStyleLbl="node2" presStyleIdx="0" presStyleCnt="3"/>
+      <dgm:spPr/>
+    </dgm:pt>
+    <dgm:pt modelId="{32A0E7CE-AD8E-4FDF-A9AE-B903F6897885}" type="pres">
+      <dgm:prSet presAssocID="{DD351C4C-72E9-4E05-8DC7-951FBBE48B55}" presName="text2" presStyleLbl="fgAcc2" presStyleIdx="0" presStyleCnt="3">
         <dgm:presLayoutVars>
           <dgm:chPref val="3"/>
         </dgm:presLayoutVars>
@@ -4800,32 +4720,12 @@
         </a:p>
       </dgm:t>
     </dgm:pt>
-    <dgm:pt modelId="{B391353A-4A98-4E32-B3B8-1BB7A24C59E9}" type="pres">
-      <dgm:prSet presAssocID="{CF02CACD-5214-4A46-984B-DC32F543FA4D}" presName="hierChild3" presStyleCnt="0"/>
-      <dgm:spPr/>
-    </dgm:pt>
-    <dgm:pt modelId="{C757932D-7951-4624-82BD-C376A99BA321}" type="pres">
-      <dgm:prSet presAssocID="{1081519C-20CC-45D5-B02A-E770EA067C1F}" presName="Name17" presStyleLbl="parChTrans1D3" presStyleIdx="1" presStyleCnt="2"/>
-      <dgm:spPr/>
-    </dgm:pt>
-    <dgm:pt modelId="{B6E00746-F1A4-499C-8355-1AB328D0909D}" type="pres">
-      <dgm:prSet presAssocID="{DB08E750-94D2-4C11-9395-3D108CD78B28}" presName="hierRoot3" presStyleCnt="0"/>
-      <dgm:spPr/>
-    </dgm:pt>
-    <dgm:pt modelId="{0137267E-5713-42DC-AFDC-5F762D5F8865}" type="pres">
-      <dgm:prSet presAssocID="{DB08E750-94D2-4C11-9395-3D108CD78B28}" presName="composite3" presStyleCnt="0"/>
-      <dgm:spPr/>
-    </dgm:pt>
-    <dgm:pt modelId="{11CB2A99-F7EE-49F5-B0DF-A661BAF615CD}" type="pres">
-      <dgm:prSet presAssocID="{DB08E750-94D2-4C11-9395-3D108CD78B28}" presName="background3" presStyleLbl="node3" presStyleIdx="1" presStyleCnt="2"/>
-      <dgm:spPr/>
-    </dgm:pt>
-    <dgm:pt modelId="{A93C7A98-583F-4FFC-9AE9-ACF593FB5064}" type="pres">
-      <dgm:prSet presAssocID="{DB08E750-94D2-4C11-9395-3D108CD78B28}" presName="text3" presStyleLbl="fgAcc3" presStyleIdx="1" presStyleCnt="2">
-        <dgm:presLayoutVars>
-          <dgm:chPref val="3"/>
-        </dgm:presLayoutVars>
-      </dgm:prSet>
+    <dgm:pt modelId="{7D291A92-E0F2-424B-82AB-06BAA86C8A8A}" type="pres">
+      <dgm:prSet presAssocID="{DD351C4C-72E9-4E05-8DC7-951FBBE48B55}" presName="hierChild3" presStyleCnt="0"/>
+      <dgm:spPr/>
+    </dgm:pt>
+    <dgm:pt modelId="{B61A23CF-FEB6-4EA8-B741-96881DC2FC32}" type="pres">
+      <dgm:prSet presAssocID="{5B972C33-620B-4D06-A769-D30144C88AD2}" presName="Name10" presStyleLbl="parChTrans1D2" presStyleIdx="1" presStyleCnt="3"/>
       <dgm:spPr/>
       <dgm:t>
         <a:bodyPr/>
@@ -4835,6 +4735,190 @@
         </a:p>
       </dgm:t>
     </dgm:pt>
+    <dgm:pt modelId="{6397F36E-1110-4552-BF36-85FAA2BCC405}" type="pres">
+      <dgm:prSet presAssocID="{E176D4A6-23B1-45F8-8639-0521E74F02D8}" presName="hierRoot2" presStyleCnt="0"/>
+      <dgm:spPr/>
+    </dgm:pt>
+    <dgm:pt modelId="{D4DC89AD-B35B-46F8-AE3E-AC04306B1D72}" type="pres">
+      <dgm:prSet presAssocID="{E176D4A6-23B1-45F8-8639-0521E74F02D8}" presName="composite2" presStyleCnt="0"/>
+      <dgm:spPr/>
+    </dgm:pt>
+    <dgm:pt modelId="{00F83B0E-96DC-4A67-8AF0-CF719D3A9CE2}" type="pres">
+      <dgm:prSet presAssocID="{E176D4A6-23B1-45F8-8639-0521E74F02D8}" presName="background2" presStyleLbl="node2" presStyleIdx="1" presStyleCnt="3"/>
+      <dgm:spPr/>
+    </dgm:pt>
+    <dgm:pt modelId="{7E96EB48-7081-44FF-950B-EC8DC6726213}" type="pres">
+      <dgm:prSet presAssocID="{E176D4A6-23B1-45F8-8639-0521E74F02D8}" presName="text2" presStyleLbl="fgAcc2" presStyleIdx="1" presStyleCnt="3">
+        <dgm:presLayoutVars>
+          <dgm:chPref val="3"/>
+        </dgm:presLayoutVars>
+      </dgm:prSet>
+      <dgm:spPr/>
+      <dgm:t>
+        <a:bodyPr/>
+        <a:lstStyle/>
+        <a:p>
+          <a:endParaRPr lang="en-US"/>
+        </a:p>
+      </dgm:t>
+    </dgm:pt>
+    <dgm:pt modelId="{E2705C0D-DCE7-4806-B5CE-6334B46F3D72}" type="pres">
+      <dgm:prSet presAssocID="{E176D4A6-23B1-45F8-8639-0521E74F02D8}" presName="hierChild3" presStyleCnt="0"/>
+      <dgm:spPr/>
+    </dgm:pt>
+    <dgm:pt modelId="{4580C0A3-0B00-4D07-A4C7-FDACE7457F11}" type="pres">
+      <dgm:prSet presAssocID="{32FFCEA9-CFEA-4E99-AE91-D669F856CF5B}" presName="Name17" presStyleLbl="parChTrans1D3" presStyleIdx="0" presStyleCnt="2"/>
+      <dgm:spPr/>
+      <dgm:t>
+        <a:bodyPr/>
+        <a:lstStyle/>
+        <a:p>
+          <a:endParaRPr lang="en-US"/>
+        </a:p>
+      </dgm:t>
+    </dgm:pt>
+    <dgm:pt modelId="{6B3ED4EE-60A3-49BD-86AA-0BA6FCD81929}" type="pres">
+      <dgm:prSet presAssocID="{CB3DEED7-A648-4A10-9B33-E76584843873}" presName="hierRoot3" presStyleCnt="0"/>
+      <dgm:spPr/>
+    </dgm:pt>
+    <dgm:pt modelId="{10C813ED-52CE-4760-8C67-8D52E89ECFC0}" type="pres">
+      <dgm:prSet presAssocID="{CB3DEED7-A648-4A10-9B33-E76584843873}" presName="composite3" presStyleCnt="0"/>
+      <dgm:spPr/>
+    </dgm:pt>
+    <dgm:pt modelId="{4CEC9687-6F3A-4F9F-8EDD-1D2FA25B73D4}" type="pres">
+      <dgm:prSet presAssocID="{CB3DEED7-A648-4A10-9B33-E76584843873}" presName="background3" presStyleLbl="node3" presStyleIdx="0" presStyleCnt="2"/>
+      <dgm:spPr/>
+    </dgm:pt>
+    <dgm:pt modelId="{296B1435-349D-4FEC-943E-71A2532A3EC2}" type="pres">
+      <dgm:prSet presAssocID="{CB3DEED7-A648-4A10-9B33-E76584843873}" presName="text3" presStyleLbl="fgAcc3" presStyleIdx="0" presStyleCnt="2">
+        <dgm:presLayoutVars>
+          <dgm:chPref val="3"/>
+        </dgm:presLayoutVars>
+      </dgm:prSet>
+      <dgm:spPr/>
+      <dgm:t>
+        <a:bodyPr/>
+        <a:lstStyle/>
+        <a:p>
+          <a:endParaRPr lang="en-US"/>
+        </a:p>
+      </dgm:t>
+    </dgm:pt>
+    <dgm:pt modelId="{478743AF-E349-41FB-BD1B-E0954F22C99D}" type="pres">
+      <dgm:prSet presAssocID="{CB3DEED7-A648-4A10-9B33-E76584843873}" presName="hierChild4" presStyleCnt="0"/>
+      <dgm:spPr/>
+    </dgm:pt>
+    <dgm:pt modelId="{B706113B-F671-40DD-BBAB-322AE14F6488}" type="pres">
+      <dgm:prSet presAssocID="{50E80EE0-A4DD-47C0-AF86-36F5A9425CC3}" presName="hierRoot1" presStyleCnt="0"/>
+      <dgm:spPr/>
+    </dgm:pt>
+    <dgm:pt modelId="{552ED644-101E-4FE2-9EBF-1FC517A0C839}" type="pres">
+      <dgm:prSet presAssocID="{50E80EE0-A4DD-47C0-AF86-36F5A9425CC3}" presName="composite" presStyleCnt="0"/>
+      <dgm:spPr/>
+    </dgm:pt>
+    <dgm:pt modelId="{343C0B6F-AB84-4647-8D12-F4F20E2875B6}" type="pres">
+      <dgm:prSet presAssocID="{50E80EE0-A4DD-47C0-AF86-36F5A9425CC3}" presName="background" presStyleLbl="node0" presStyleIdx="1" presStyleCnt="2"/>
+      <dgm:spPr/>
+    </dgm:pt>
+    <dgm:pt modelId="{44711A0E-F7D4-4839-8F69-8F00BCAD9C5F}" type="pres">
+      <dgm:prSet presAssocID="{50E80EE0-A4DD-47C0-AF86-36F5A9425CC3}" presName="text" presStyleLbl="fgAcc0" presStyleIdx="1" presStyleCnt="2">
+        <dgm:presLayoutVars>
+          <dgm:chPref val="3"/>
+        </dgm:presLayoutVars>
+      </dgm:prSet>
+      <dgm:spPr/>
+      <dgm:t>
+        <a:bodyPr/>
+        <a:lstStyle/>
+        <a:p>
+          <a:endParaRPr lang="en-US"/>
+        </a:p>
+      </dgm:t>
+    </dgm:pt>
+    <dgm:pt modelId="{E50D9762-5E63-4AD4-BDFF-9EC3A870AD70}" type="pres">
+      <dgm:prSet presAssocID="{50E80EE0-A4DD-47C0-AF86-36F5A9425CC3}" presName="hierChild2" presStyleCnt="0"/>
+      <dgm:spPr/>
+    </dgm:pt>
+    <dgm:pt modelId="{0E60B450-62CE-4945-82D4-E2C344E085E1}" type="pres">
+      <dgm:prSet presAssocID="{D4830123-865B-406D-A862-C0D16419462C}" presName="Name10" presStyleLbl="parChTrans1D2" presStyleIdx="2" presStyleCnt="3"/>
+      <dgm:spPr/>
+      <dgm:t>
+        <a:bodyPr/>
+        <a:lstStyle/>
+        <a:p>
+          <a:endParaRPr lang="en-US"/>
+        </a:p>
+      </dgm:t>
+    </dgm:pt>
+    <dgm:pt modelId="{21416203-3929-439C-985F-9ED931C6F86D}" type="pres">
+      <dgm:prSet presAssocID="{CF02CACD-5214-4A46-984B-DC32F543FA4D}" presName="hierRoot2" presStyleCnt="0"/>
+      <dgm:spPr/>
+    </dgm:pt>
+    <dgm:pt modelId="{FDF1F5F3-57B7-4549-BB10-12753610BCD0}" type="pres">
+      <dgm:prSet presAssocID="{CF02CACD-5214-4A46-984B-DC32F543FA4D}" presName="composite2" presStyleCnt="0"/>
+      <dgm:spPr/>
+    </dgm:pt>
+    <dgm:pt modelId="{A21D24DE-3421-4081-9E9F-D30B62C5A7DA}" type="pres">
+      <dgm:prSet presAssocID="{CF02CACD-5214-4A46-984B-DC32F543FA4D}" presName="background2" presStyleLbl="node2" presStyleIdx="2" presStyleCnt="3"/>
+      <dgm:spPr/>
+    </dgm:pt>
+    <dgm:pt modelId="{EE3A2CD5-60F8-4EE9-953D-C4A6F826B37C}" type="pres">
+      <dgm:prSet presAssocID="{CF02CACD-5214-4A46-984B-DC32F543FA4D}" presName="text2" presStyleLbl="fgAcc2" presStyleIdx="2" presStyleCnt="3">
+        <dgm:presLayoutVars>
+          <dgm:chPref val="3"/>
+        </dgm:presLayoutVars>
+      </dgm:prSet>
+      <dgm:spPr/>
+      <dgm:t>
+        <a:bodyPr/>
+        <a:lstStyle/>
+        <a:p>
+          <a:endParaRPr lang="en-US"/>
+        </a:p>
+      </dgm:t>
+    </dgm:pt>
+    <dgm:pt modelId="{B391353A-4A98-4E32-B3B8-1BB7A24C59E9}" type="pres">
+      <dgm:prSet presAssocID="{CF02CACD-5214-4A46-984B-DC32F543FA4D}" presName="hierChild3" presStyleCnt="0"/>
+      <dgm:spPr/>
+    </dgm:pt>
+    <dgm:pt modelId="{C757932D-7951-4624-82BD-C376A99BA321}" type="pres">
+      <dgm:prSet presAssocID="{1081519C-20CC-45D5-B02A-E770EA067C1F}" presName="Name17" presStyleLbl="parChTrans1D3" presStyleIdx="1" presStyleCnt="2"/>
+      <dgm:spPr/>
+      <dgm:t>
+        <a:bodyPr/>
+        <a:lstStyle/>
+        <a:p>
+          <a:endParaRPr lang="en-US"/>
+        </a:p>
+      </dgm:t>
+    </dgm:pt>
+    <dgm:pt modelId="{B6E00746-F1A4-499C-8355-1AB328D0909D}" type="pres">
+      <dgm:prSet presAssocID="{DB08E750-94D2-4C11-9395-3D108CD78B28}" presName="hierRoot3" presStyleCnt="0"/>
+      <dgm:spPr/>
+    </dgm:pt>
+    <dgm:pt modelId="{0137267E-5713-42DC-AFDC-5F762D5F8865}" type="pres">
+      <dgm:prSet presAssocID="{DB08E750-94D2-4C11-9395-3D108CD78B28}" presName="composite3" presStyleCnt="0"/>
+      <dgm:spPr/>
+    </dgm:pt>
+    <dgm:pt modelId="{11CB2A99-F7EE-49F5-B0DF-A661BAF615CD}" type="pres">
+      <dgm:prSet presAssocID="{DB08E750-94D2-4C11-9395-3D108CD78B28}" presName="background3" presStyleLbl="node3" presStyleIdx="1" presStyleCnt="2"/>
+      <dgm:spPr/>
+    </dgm:pt>
+    <dgm:pt modelId="{A93C7A98-583F-4FFC-9AE9-ACF593FB5064}" type="pres">
+      <dgm:prSet presAssocID="{DB08E750-94D2-4C11-9395-3D108CD78B28}" presName="text3" presStyleLbl="fgAcc3" presStyleIdx="1" presStyleCnt="2">
+        <dgm:presLayoutVars>
+          <dgm:chPref val="3"/>
+        </dgm:presLayoutVars>
+      </dgm:prSet>
+      <dgm:spPr/>
+      <dgm:t>
+        <a:bodyPr/>
+        <a:lstStyle/>
+        <a:p>
+          <a:endParaRPr lang="en-US"/>
+        </a:p>
+      </dgm:t>
+    </dgm:pt>
     <dgm:pt modelId="{77A5C83E-EBBE-4670-B21F-BDC54345842B}" type="pres">
       <dgm:prSet presAssocID="{DB08E750-94D2-4C11-9395-3D108CD78B28}" presName="hierChild4" presStyleCnt="0"/>
       <dgm:spPr/>
@@ -4842,6 +4926,13 @@
     <dgm:pt modelId="{799BAAE0-7536-4307-9D0D-87574C180732}" type="pres">
       <dgm:prSet presAssocID="{D5AB019A-5544-4188-AB7B-9CADF99F6F32}" presName="Name23" presStyleLbl="parChTrans1D4" presStyleIdx="0" presStyleCnt="1"/>
       <dgm:spPr/>
+      <dgm:t>
+        <a:bodyPr/>
+        <a:lstStyle/>
+        <a:p>
+          <a:endParaRPr lang="en-US"/>
+        </a:p>
+      </dgm:t>
     </dgm:pt>
     <dgm:pt modelId="{5D20BC75-481D-4B9D-9F0B-F7E878804E7D}" type="pres">
       <dgm:prSet presAssocID="{B1AB8732-6210-4A07-8D75-1FE0E583A3CB}" presName="hierRoot4" presStyleCnt="0"/>
@@ -4862,6 +4953,13 @@
         </dgm:presLayoutVars>
       </dgm:prSet>
       <dgm:spPr/>
+      <dgm:t>
+        <a:bodyPr/>
+        <a:lstStyle/>
+        <a:p>
+          <a:endParaRPr lang="en-US"/>
+        </a:p>
+      </dgm:t>
     </dgm:pt>
     <dgm:pt modelId="{4EE4D6EB-08A4-4178-941B-A536292F3188}" type="pres">
       <dgm:prSet presAssocID="{B1AB8732-6210-4A07-8D75-1FE0E583A3CB}" presName="hierChild5" presStyleCnt="0"/>
@@ -4869,29 +4967,29 @@
     </dgm:pt>
   </dgm:ptLst>
   <dgm:cxnLst>
+    <dgm:cxn modelId="{612B1620-EE8A-4BFA-BDA7-4319DA79CFB2}" type="presOf" srcId="{DB08E750-94D2-4C11-9395-3D108CD78B28}" destId="{A93C7A98-583F-4FFC-9AE9-ACF593FB5064}" srcOrd="0" destOrd="0" presId="urn:microsoft.com/office/officeart/2005/8/layout/hierarchy1"/>
     <dgm:cxn modelId="{8E1781F3-394B-46D5-AE9B-600DB2069D16}" type="presOf" srcId="{DD351C4C-72E9-4E05-8DC7-951FBBE48B55}" destId="{32A0E7CE-AD8E-4FDF-A9AE-B903F6897885}" srcOrd="0" destOrd="0" presId="urn:microsoft.com/office/officeart/2005/8/layout/hierarchy1"/>
     <dgm:cxn modelId="{E6721ED1-94B9-49C1-8925-527259634E6A}" srcId="{E176D4A6-23B1-45F8-8639-0521E74F02D8}" destId="{CB3DEED7-A648-4A10-9B33-E76584843873}" srcOrd="0" destOrd="0" parTransId="{32FFCEA9-CFEA-4E99-AE91-D669F856CF5B}" sibTransId="{A03E0E33-B27A-434A-9093-7E75644F577B}"/>
-    <dgm:cxn modelId="{612B1620-EE8A-4BFA-BDA7-4319DA79CFB2}" type="presOf" srcId="{DB08E750-94D2-4C11-9395-3D108CD78B28}" destId="{A93C7A98-583F-4FFC-9AE9-ACF593FB5064}" srcOrd="0" destOrd="0" presId="urn:microsoft.com/office/officeart/2005/8/layout/hierarchy1"/>
+    <dgm:cxn modelId="{3D4806BF-CFEC-4D09-BFE7-9F41FEA9075F}" srcId="{CF02CACD-5214-4A46-984B-DC32F543FA4D}" destId="{DB08E750-94D2-4C11-9395-3D108CD78B28}" srcOrd="0" destOrd="0" parTransId="{1081519C-20CC-45D5-B02A-E770EA067C1F}" sibTransId="{B5C03D0C-5A2A-41B5-9190-1B4F013CC9A5}"/>
     <dgm:cxn modelId="{2B150C46-4247-4152-9328-0B54CA43702B}" srcId="{50E80EE0-A4DD-47C0-AF86-36F5A9425CC3}" destId="{CF02CACD-5214-4A46-984B-DC32F543FA4D}" srcOrd="0" destOrd="0" parTransId="{D4830123-865B-406D-A862-C0D16419462C}" sibTransId="{734D32F3-A2FC-4F87-AAC7-8B4034F7C089}"/>
     <dgm:cxn modelId="{7462140B-21A5-4B1B-B87E-4A6874A95807}" type="presOf" srcId="{434D147A-963A-4E4A-A913-C410E6C829B9}" destId="{1A16012F-D7C1-44F5-9D61-12EE6B937EAA}" srcOrd="0" destOrd="0" presId="urn:microsoft.com/office/officeart/2005/8/layout/hierarchy1"/>
+    <dgm:cxn modelId="{653CE37B-801A-40A3-883B-963A1284776E}" type="presOf" srcId="{32FFCEA9-CFEA-4E99-AE91-D669F856CF5B}" destId="{4580C0A3-0B00-4D07-A4C7-FDACE7457F11}" srcOrd="0" destOrd="0" presId="urn:microsoft.com/office/officeart/2005/8/layout/hierarchy1"/>
+    <dgm:cxn modelId="{649C52CC-CCD4-4553-BE56-65223E83C0D7}" type="presOf" srcId="{1081519C-20CC-45D5-B02A-E770EA067C1F}" destId="{C757932D-7951-4624-82BD-C376A99BA321}" srcOrd="0" destOrd="0" presId="urn:microsoft.com/office/officeart/2005/8/layout/hierarchy1"/>
+    <dgm:cxn modelId="{83C3C5AF-88F9-4206-8B46-1DD3BE4EE214}" srcId="{A414F3A0-F3D0-48C7-BD5E-C973BD4DA5FC}" destId="{DD351C4C-72E9-4E05-8DC7-951FBBE48B55}" srcOrd="0" destOrd="0" parTransId="{434D147A-963A-4E4A-A913-C410E6C829B9}" sibTransId="{4E4DA8F2-F873-4FAE-8DE0-E56B52C5B5AA}"/>
+    <dgm:cxn modelId="{3CFBD283-9E26-49D4-B54B-187C493F9659}" type="presOf" srcId="{5B972C33-620B-4D06-A769-D30144C88AD2}" destId="{B61A23CF-FEB6-4EA8-B741-96881DC2FC32}" srcOrd="0" destOrd="0" presId="urn:microsoft.com/office/officeart/2005/8/layout/hierarchy1"/>
+    <dgm:cxn modelId="{F8337653-B88F-4A59-99BE-7DE533C74E50}" type="presOf" srcId="{A414F3A0-F3D0-48C7-BD5E-C973BD4DA5FC}" destId="{6C24B679-A224-47EA-987A-C973994C4BF6}" srcOrd="0" destOrd="0" presId="urn:microsoft.com/office/officeart/2005/8/layout/hierarchy1"/>
+    <dgm:cxn modelId="{B2167D26-B17B-4D07-A377-071A932DEECE}" type="presOf" srcId="{CB3DEED7-A648-4A10-9B33-E76584843873}" destId="{296B1435-349D-4FEC-943E-71A2532A3EC2}" srcOrd="0" destOrd="0" presId="urn:microsoft.com/office/officeart/2005/8/layout/hierarchy1"/>
     <dgm:cxn modelId="{028B927F-CA6C-4EBE-AB96-56ED5E871712}" type="presOf" srcId="{50E80EE0-A4DD-47C0-AF86-36F5A9425CC3}" destId="{44711A0E-F7D4-4839-8F69-8F00BCAD9C5F}" srcOrd="0" destOrd="0" presId="urn:microsoft.com/office/officeart/2005/8/layout/hierarchy1"/>
-    <dgm:cxn modelId="{649C52CC-CCD4-4553-BE56-65223E83C0D7}" type="presOf" srcId="{1081519C-20CC-45D5-B02A-E770EA067C1F}" destId="{C757932D-7951-4624-82BD-C376A99BA321}" srcOrd="0" destOrd="0" presId="urn:microsoft.com/office/officeart/2005/8/layout/hierarchy1"/>
-    <dgm:cxn modelId="{F8337653-B88F-4A59-99BE-7DE533C74E50}" type="presOf" srcId="{A414F3A0-F3D0-48C7-BD5E-C973BD4DA5FC}" destId="{6C24B679-A224-47EA-987A-C973994C4BF6}" srcOrd="0" destOrd="0" presId="urn:microsoft.com/office/officeart/2005/8/layout/hierarchy1"/>
+    <dgm:cxn modelId="{E383296D-B537-4D96-9007-0A9A97560E96}" type="presOf" srcId="{CF02CACD-5214-4A46-984B-DC32F543FA4D}" destId="{EE3A2CD5-60F8-4EE9-953D-C4A6F826B37C}" srcOrd="0" destOrd="0" presId="urn:microsoft.com/office/officeart/2005/8/layout/hierarchy1"/>
+    <dgm:cxn modelId="{CE4CB1B4-6888-46EE-860A-E1AACBC7364D}" srcId="{A414F3A0-F3D0-48C7-BD5E-C973BD4DA5FC}" destId="{E176D4A6-23B1-45F8-8639-0521E74F02D8}" srcOrd="1" destOrd="0" parTransId="{5B972C33-620B-4D06-A769-D30144C88AD2}" sibTransId="{446B8507-2614-4842-BE67-D3CAA520C94F}"/>
     <dgm:cxn modelId="{8FEF37D0-8A58-4C63-A14A-3F9C2A496508}" srcId="{DB08E750-94D2-4C11-9395-3D108CD78B28}" destId="{B1AB8732-6210-4A07-8D75-1FE0E583A3CB}" srcOrd="0" destOrd="0" parTransId="{D5AB019A-5544-4188-AB7B-9CADF99F6F32}" sibTransId="{A7EF3C8C-F583-4F9A-8216-DD0743F5ECF8}"/>
+    <dgm:cxn modelId="{125E1740-EE63-444B-9704-9225851683A1}" type="presOf" srcId="{AF829859-61F7-4201-8323-ABD140313E8F}" destId="{50AE0911-3195-437C-9119-7F816C8A5E95}" srcOrd="0" destOrd="0" presId="urn:microsoft.com/office/officeart/2005/8/layout/hierarchy1"/>
+    <dgm:cxn modelId="{D5E066B8-A34A-4B94-8E96-0A7516D01487}" type="presOf" srcId="{E176D4A6-23B1-45F8-8639-0521E74F02D8}" destId="{7E96EB48-7081-44FF-950B-EC8DC6726213}" srcOrd="0" destOrd="0" presId="urn:microsoft.com/office/officeart/2005/8/layout/hierarchy1"/>
+    <dgm:cxn modelId="{6B771457-6666-4AB8-99C6-B8433F1B4AED}" type="presOf" srcId="{D5AB019A-5544-4188-AB7B-9CADF99F6F32}" destId="{799BAAE0-7536-4307-9D0D-87574C180732}" srcOrd="0" destOrd="0" presId="urn:microsoft.com/office/officeart/2005/8/layout/hierarchy1"/>
+    <dgm:cxn modelId="{3121340A-0CC5-4DF3-AA6A-B3DC2F48FE10}" type="presOf" srcId="{B1AB8732-6210-4A07-8D75-1FE0E583A3CB}" destId="{23007F57-0668-4FBB-A4EB-0FBC1CD29C2A}" srcOrd="0" destOrd="0" presId="urn:microsoft.com/office/officeart/2005/8/layout/hierarchy1"/>
+    <dgm:cxn modelId="{E08EDB9E-E72B-47FC-B054-F05013E35335}" srcId="{AF829859-61F7-4201-8323-ABD140313E8F}" destId="{50E80EE0-A4DD-47C0-AF86-36F5A9425CC3}" srcOrd="1" destOrd="0" parTransId="{37196A59-8A05-408E-8081-A896B92CDAE6}" sibTransId="{120DCC16-057E-4097-80A3-06DCD7725CF4}"/>
     <dgm:cxn modelId="{BF7D22BA-6C42-4F1E-A0F6-F7B9A7181421}" type="presOf" srcId="{D4830123-865B-406D-A862-C0D16419462C}" destId="{0E60B450-62CE-4945-82D4-E2C344E085E1}" srcOrd="0" destOrd="0" presId="urn:microsoft.com/office/officeart/2005/8/layout/hierarchy1"/>
-    <dgm:cxn modelId="{83C3C5AF-88F9-4206-8B46-1DD3BE4EE214}" srcId="{A414F3A0-F3D0-48C7-BD5E-C973BD4DA5FC}" destId="{DD351C4C-72E9-4E05-8DC7-951FBBE48B55}" srcOrd="0" destOrd="0" parTransId="{434D147A-963A-4E4A-A913-C410E6C829B9}" sibTransId="{4E4DA8F2-F873-4FAE-8DE0-E56B52C5B5AA}"/>
-    <dgm:cxn modelId="{E08EDB9E-E72B-47FC-B054-F05013E35335}" srcId="{AF829859-61F7-4201-8323-ABD140313E8F}" destId="{50E80EE0-A4DD-47C0-AF86-36F5A9425CC3}" srcOrd="1" destOrd="0" parTransId="{37196A59-8A05-408E-8081-A896B92CDAE6}" sibTransId="{120DCC16-057E-4097-80A3-06DCD7725CF4}"/>
-    <dgm:cxn modelId="{6B771457-6666-4AB8-99C6-B8433F1B4AED}" type="presOf" srcId="{D5AB019A-5544-4188-AB7B-9CADF99F6F32}" destId="{799BAAE0-7536-4307-9D0D-87574C180732}" srcOrd="0" destOrd="0" presId="urn:microsoft.com/office/officeart/2005/8/layout/hierarchy1"/>
-    <dgm:cxn modelId="{CE4CB1B4-6888-46EE-860A-E1AACBC7364D}" srcId="{A414F3A0-F3D0-48C7-BD5E-C973BD4DA5FC}" destId="{E176D4A6-23B1-45F8-8639-0521E74F02D8}" srcOrd="1" destOrd="0" parTransId="{5B972C33-620B-4D06-A769-D30144C88AD2}" sibTransId="{446B8507-2614-4842-BE67-D3CAA520C94F}"/>
     <dgm:cxn modelId="{01CEB5AF-BD2A-4C67-B375-1A59B608C007}" srcId="{AF829859-61F7-4201-8323-ABD140313E8F}" destId="{A414F3A0-F3D0-48C7-BD5E-C973BD4DA5FC}" srcOrd="0" destOrd="0" parTransId="{EDCF52CB-D464-4D7F-AB0F-B35D0BDA5651}" sibTransId="{C179DFEE-2BB5-43E0-ADF6-AF3A69E786FC}"/>
-    <dgm:cxn modelId="{E383296D-B537-4D96-9007-0A9A97560E96}" type="presOf" srcId="{CF02CACD-5214-4A46-984B-DC32F543FA4D}" destId="{EE3A2CD5-60F8-4EE9-953D-C4A6F826B37C}" srcOrd="0" destOrd="0" presId="urn:microsoft.com/office/officeart/2005/8/layout/hierarchy1"/>
-    <dgm:cxn modelId="{3D4806BF-CFEC-4D09-BFE7-9F41FEA9075F}" srcId="{CF02CACD-5214-4A46-984B-DC32F543FA4D}" destId="{DB08E750-94D2-4C11-9395-3D108CD78B28}" srcOrd="0" destOrd="0" parTransId="{1081519C-20CC-45D5-B02A-E770EA067C1F}" sibTransId="{B5C03D0C-5A2A-41B5-9190-1B4F013CC9A5}"/>
-    <dgm:cxn modelId="{3121340A-0CC5-4DF3-AA6A-B3DC2F48FE10}" type="presOf" srcId="{B1AB8732-6210-4A07-8D75-1FE0E583A3CB}" destId="{23007F57-0668-4FBB-A4EB-0FBC1CD29C2A}" srcOrd="0" destOrd="0" presId="urn:microsoft.com/office/officeart/2005/8/layout/hierarchy1"/>
-    <dgm:cxn modelId="{D5E066B8-A34A-4B94-8E96-0A7516D01487}" type="presOf" srcId="{E176D4A6-23B1-45F8-8639-0521E74F02D8}" destId="{7E96EB48-7081-44FF-950B-EC8DC6726213}" srcOrd="0" destOrd="0" presId="urn:microsoft.com/office/officeart/2005/8/layout/hierarchy1"/>
-    <dgm:cxn modelId="{3CFBD283-9E26-49D4-B54B-187C493F9659}" type="presOf" srcId="{5B972C33-620B-4D06-A769-D30144C88AD2}" destId="{B61A23CF-FEB6-4EA8-B741-96881DC2FC32}" srcOrd="0" destOrd="0" presId="urn:microsoft.com/office/officeart/2005/8/layout/hierarchy1"/>
-    <dgm:cxn modelId="{653CE37B-801A-40A3-883B-963A1284776E}" type="presOf" srcId="{32FFCEA9-CFEA-4E99-AE91-D669F856CF5B}" destId="{4580C0A3-0B00-4D07-A4C7-FDACE7457F11}" srcOrd="0" destOrd="0" presId="urn:microsoft.com/office/officeart/2005/8/layout/hierarchy1"/>
-    <dgm:cxn modelId="{B2167D26-B17B-4D07-A377-071A932DEECE}" type="presOf" srcId="{CB3DEED7-A648-4A10-9B33-E76584843873}" destId="{296B1435-349D-4FEC-943E-71A2532A3EC2}" srcOrd="0" destOrd="0" presId="urn:microsoft.com/office/officeart/2005/8/layout/hierarchy1"/>
-    <dgm:cxn modelId="{125E1740-EE63-444B-9704-9225851683A1}" type="presOf" srcId="{AF829859-61F7-4201-8323-ABD140313E8F}" destId="{50AE0911-3195-437C-9119-7F816C8A5E95}" srcOrd="0" destOrd="0" presId="urn:microsoft.com/office/officeart/2005/8/layout/hierarchy1"/>
     <dgm:cxn modelId="{9F35B850-AA61-499C-875E-B9A6D6002A01}" type="presParOf" srcId="{50AE0911-3195-437C-9119-7F816C8A5E95}" destId="{C6113C20-630F-49F5-B2AF-74CFA5E0F025}" srcOrd="0" destOrd="0" presId="urn:microsoft.com/office/officeart/2005/8/layout/hierarchy1"/>
     <dgm:cxn modelId="{A7A78E2B-A68A-487D-8EB8-24EFD5BF7283}" type="presParOf" srcId="{C6113C20-630F-49F5-B2AF-74CFA5E0F025}" destId="{9385CF6E-0152-40BE-9849-6653EE0F2BDD}" srcOrd="0" destOrd="0" presId="urn:microsoft.com/office/officeart/2005/8/layout/hierarchy1"/>
     <dgm:cxn modelId="{5D18E95A-B05E-446C-97D6-89A4CE6E17B0}" type="presParOf" srcId="{9385CF6E-0152-40BE-9849-6653EE0F2BDD}" destId="{EA82BF5B-4228-479A-AB7B-7847B2199AE5}" srcOrd="0" destOrd="0" presId="urn:microsoft.com/office/officeart/2005/8/layout/hierarchy1"/>
@@ -5519,26 +5617,6 @@
         </dgm:presLayoutVars>
       </dgm:prSet>
       <dgm:spPr/>
-    </dgm:pt>
-    <dgm:pt modelId="{C6113C20-630F-49F5-B2AF-74CFA5E0F025}" type="pres">
-      <dgm:prSet presAssocID="{A414F3A0-F3D0-48C7-BD5E-C973BD4DA5FC}" presName="hierRoot1" presStyleCnt="0"/>
-      <dgm:spPr/>
-    </dgm:pt>
-    <dgm:pt modelId="{9385CF6E-0152-40BE-9849-6653EE0F2BDD}" type="pres">
-      <dgm:prSet presAssocID="{A414F3A0-F3D0-48C7-BD5E-C973BD4DA5FC}" presName="composite" presStyleCnt="0"/>
-      <dgm:spPr/>
-    </dgm:pt>
-    <dgm:pt modelId="{EA82BF5B-4228-479A-AB7B-7847B2199AE5}" type="pres">
-      <dgm:prSet presAssocID="{A414F3A0-F3D0-48C7-BD5E-C973BD4DA5FC}" presName="background" presStyleLbl="node0" presStyleIdx="0" presStyleCnt="3"/>
-      <dgm:spPr/>
-    </dgm:pt>
-    <dgm:pt modelId="{6C24B679-A224-47EA-987A-C973994C4BF6}" type="pres">
-      <dgm:prSet presAssocID="{A414F3A0-F3D0-48C7-BD5E-C973BD4DA5FC}" presName="text" presStyleLbl="fgAcc0" presStyleIdx="0" presStyleCnt="3" custLinFactNeighborY="-82">
-        <dgm:presLayoutVars>
-          <dgm:chPref val="3"/>
-        </dgm:presLayoutVars>
-      </dgm:prSet>
-      <dgm:spPr/>
       <dgm:t>
         <a:bodyPr/>
         <a:lstStyle/>
@@ -5547,28 +5625,20 @@
         </a:p>
       </dgm:t>
     </dgm:pt>
-    <dgm:pt modelId="{64EF175C-EE99-4948-A63A-9793D3378EA2}" type="pres">
-      <dgm:prSet presAssocID="{A414F3A0-F3D0-48C7-BD5E-C973BD4DA5FC}" presName="hierChild2" presStyleCnt="0"/>
-      <dgm:spPr/>
-    </dgm:pt>
-    <dgm:pt modelId="{1A16012F-D7C1-44F5-9D61-12EE6B937EAA}" type="pres">
-      <dgm:prSet presAssocID="{434D147A-963A-4E4A-A913-C410E6C829B9}" presName="Name10" presStyleLbl="parChTrans1D2" presStyleIdx="0" presStyleCnt="4"/>
-      <dgm:spPr/>
-    </dgm:pt>
-    <dgm:pt modelId="{C861FA9D-E83A-400B-9987-35C02BA1EFAA}" type="pres">
-      <dgm:prSet presAssocID="{DD351C4C-72E9-4E05-8DC7-951FBBE48B55}" presName="hierRoot2" presStyleCnt="0"/>
-      <dgm:spPr/>
-    </dgm:pt>
-    <dgm:pt modelId="{C36192DB-22D6-4C98-970D-8BDFA754D958}" type="pres">
-      <dgm:prSet presAssocID="{DD351C4C-72E9-4E05-8DC7-951FBBE48B55}" presName="composite2" presStyleCnt="0"/>
-      <dgm:spPr/>
-    </dgm:pt>
-    <dgm:pt modelId="{BC357281-8921-4737-9E42-E87F7CE8A538}" type="pres">
-      <dgm:prSet presAssocID="{DD351C4C-72E9-4E05-8DC7-951FBBE48B55}" presName="background2" presStyleLbl="node2" presStyleIdx="0" presStyleCnt="4"/>
-      <dgm:spPr/>
-    </dgm:pt>
-    <dgm:pt modelId="{32A0E7CE-AD8E-4FDF-A9AE-B903F6897885}" type="pres">
-      <dgm:prSet presAssocID="{DD351C4C-72E9-4E05-8DC7-951FBBE48B55}" presName="text2" presStyleLbl="fgAcc2" presStyleIdx="0" presStyleCnt="4">
+    <dgm:pt modelId="{C6113C20-630F-49F5-B2AF-74CFA5E0F025}" type="pres">
+      <dgm:prSet presAssocID="{A414F3A0-F3D0-48C7-BD5E-C973BD4DA5FC}" presName="hierRoot1" presStyleCnt="0"/>
+      <dgm:spPr/>
+    </dgm:pt>
+    <dgm:pt modelId="{9385CF6E-0152-40BE-9849-6653EE0F2BDD}" type="pres">
+      <dgm:prSet presAssocID="{A414F3A0-F3D0-48C7-BD5E-C973BD4DA5FC}" presName="composite" presStyleCnt="0"/>
+      <dgm:spPr/>
+    </dgm:pt>
+    <dgm:pt modelId="{EA82BF5B-4228-479A-AB7B-7847B2199AE5}" type="pres">
+      <dgm:prSet presAssocID="{A414F3A0-F3D0-48C7-BD5E-C973BD4DA5FC}" presName="background" presStyleLbl="node0" presStyleIdx="0" presStyleCnt="3"/>
+      <dgm:spPr/>
+    </dgm:pt>
+    <dgm:pt modelId="{6C24B679-A224-47EA-987A-C973994C4BF6}" type="pres">
+      <dgm:prSet presAssocID="{A414F3A0-F3D0-48C7-BD5E-C973BD4DA5FC}" presName="text" presStyleLbl="fgAcc0" presStyleIdx="0" presStyleCnt="3" custLinFactNeighborY="-82">
         <dgm:presLayoutVars>
           <dgm:chPref val="3"/>
         </dgm:presLayoutVars>
@@ -5582,32 +5652,12 @@
         </a:p>
       </dgm:t>
     </dgm:pt>
-    <dgm:pt modelId="{7D291A92-E0F2-424B-82AB-06BAA86C8A8A}" type="pres">
-      <dgm:prSet presAssocID="{DD351C4C-72E9-4E05-8DC7-951FBBE48B55}" presName="hierChild3" presStyleCnt="0"/>
-      <dgm:spPr/>
-    </dgm:pt>
-    <dgm:pt modelId="{B61A23CF-FEB6-4EA8-B741-96881DC2FC32}" type="pres">
-      <dgm:prSet presAssocID="{5B972C33-620B-4D06-A769-D30144C88AD2}" presName="Name10" presStyleLbl="parChTrans1D2" presStyleIdx="1" presStyleCnt="4"/>
-      <dgm:spPr/>
-    </dgm:pt>
-    <dgm:pt modelId="{6397F36E-1110-4552-BF36-85FAA2BCC405}" type="pres">
-      <dgm:prSet presAssocID="{E176D4A6-23B1-45F8-8639-0521E74F02D8}" presName="hierRoot2" presStyleCnt="0"/>
-      <dgm:spPr/>
-    </dgm:pt>
-    <dgm:pt modelId="{D4DC89AD-B35B-46F8-AE3E-AC04306B1D72}" type="pres">
-      <dgm:prSet presAssocID="{E176D4A6-23B1-45F8-8639-0521E74F02D8}" presName="composite2" presStyleCnt="0"/>
-      <dgm:spPr/>
-    </dgm:pt>
-    <dgm:pt modelId="{00F83B0E-96DC-4A67-8AF0-CF719D3A9CE2}" type="pres">
-      <dgm:prSet presAssocID="{E176D4A6-23B1-45F8-8639-0521E74F02D8}" presName="background2" presStyleLbl="node2" presStyleIdx="1" presStyleCnt="4"/>
-      <dgm:spPr/>
-    </dgm:pt>
-    <dgm:pt modelId="{7E96EB48-7081-44FF-950B-EC8DC6726213}" type="pres">
-      <dgm:prSet presAssocID="{E176D4A6-23B1-45F8-8639-0521E74F02D8}" presName="text2" presStyleLbl="fgAcc2" presStyleIdx="1" presStyleCnt="4">
-        <dgm:presLayoutVars>
-          <dgm:chPref val="3"/>
-        </dgm:presLayoutVars>
-      </dgm:prSet>
+    <dgm:pt modelId="{64EF175C-EE99-4948-A63A-9793D3378EA2}" type="pres">
+      <dgm:prSet presAssocID="{A414F3A0-F3D0-48C7-BD5E-C973BD4DA5FC}" presName="hierChild2" presStyleCnt="0"/>
+      <dgm:spPr/>
+    </dgm:pt>
+    <dgm:pt modelId="{1A16012F-D7C1-44F5-9D61-12EE6B937EAA}" type="pres">
+      <dgm:prSet presAssocID="{434D147A-963A-4E4A-A913-C410E6C829B9}" presName="Name10" presStyleLbl="parChTrans1D2" presStyleIdx="0" presStyleCnt="4"/>
       <dgm:spPr/>
       <dgm:t>
         <a:bodyPr/>
@@ -5617,28 +5667,20 @@
         </a:p>
       </dgm:t>
     </dgm:pt>
-    <dgm:pt modelId="{E2705C0D-DCE7-4806-B5CE-6334B46F3D72}" type="pres">
-      <dgm:prSet presAssocID="{E176D4A6-23B1-45F8-8639-0521E74F02D8}" presName="hierChild3" presStyleCnt="0"/>
-      <dgm:spPr/>
-    </dgm:pt>
-    <dgm:pt modelId="{BAA9464A-7426-4FCE-B8EB-DF88DC98CE53}" type="pres">
-      <dgm:prSet presAssocID="{210AA213-09A4-401F-84AA-AFF71994B0D6}" presName="Name17" presStyleLbl="parChTrans1D3" presStyleIdx="0" presStyleCnt="3"/>
-      <dgm:spPr/>
-    </dgm:pt>
-    <dgm:pt modelId="{6F092B58-2A04-4441-B85C-7AC9C7D1B3E5}" type="pres">
-      <dgm:prSet presAssocID="{75F1D198-E377-4B1E-9480-E53F39B98F96}" presName="hierRoot3" presStyleCnt="0"/>
-      <dgm:spPr/>
-    </dgm:pt>
-    <dgm:pt modelId="{9A11EDEA-6977-497D-922F-FD10596A807E}" type="pres">
-      <dgm:prSet presAssocID="{75F1D198-E377-4B1E-9480-E53F39B98F96}" presName="composite3" presStyleCnt="0"/>
-      <dgm:spPr/>
-    </dgm:pt>
-    <dgm:pt modelId="{3142DC97-2828-415C-9937-F30A104147F6}" type="pres">
-      <dgm:prSet presAssocID="{75F1D198-E377-4B1E-9480-E53F39B98F96}" presName="background3" presStyleLbl="node3" presStyleIdx="0" presStyleCnt="3"/>
-      <dgm:spPr/>
-    </dgm:pt>
-    <dgm:pt modelId="{3AC25D66-E1F4-487E-B166-08DDDC2A0FDA}" type="pres">
-      <dgm:prSet presAssocID="{75F1D198-E377-4B1E-9480-E53F39B98F96}" presName="text3" presStyleLbl="fgAcc3" presStyleIdx="0" presStyleCnt="3">
+    <dgm:pt modelId="{C861FA9D-E83A-400B-9987-35C02BA1EFAA}" type="pres">
+      <dgm:prSet presAssocID="{DD351C4C-72E9-4E05-8DC7-951FBBE48B55}" presName="hierRoot2" presStyleCnt="0"/>
+      <dgm:spPr/>
+    </dgm:pt>
+    <dgm:pt modelId="{C36192DB-22D6-4C98-970D-8BDFA754D958}" type="pres">
+      <dgm:prSet presAssocID="{DD351C4C-72E9-4E05-8DC7-951FBBE48B55}" presName="composite2" presStyleCnt="0"/>
+      <dgm:spPr/>
+    </dgm:pt>
+    <dgm:pt modelId="{BC357281-8921-4737-9E42-E87F7CE8A538}" type="pres">
+      <dgm:prSet presAssocID="{DD351C4C-72E9-4E05-8DC7-951FBBE48B55}" presName="background2" presStyleLbl="node2" presStyleIdx="0" presStyleCnt="4"/>
+      <dgm:spPr/>
+    </dgm:pt>
+    <dgm:pt modelId="{32A0E7CE-AD8E-4FDF-A9AE-B903F6897885}" type="pres">
+      <dgm:prSet presAssocID="{DD351C4C-72E9-4E05-8DC7-951FBBE48B55}" presName="text2" presStyleLbl="fgAcc2" presStyleIdx="0" presStyleCnt="4">
         <dgm:presLayoutVars>
           <dgm:chPref val="3"/>
         </dgm:presLayoutVars>
@@ -5652,56 +5694,12 @@
         </a:p>
       </dgm:t>
     </dgm:pt>
-    <dgm:pt modelId="{1FC9414F-1630-4C91-BED0-CB2DC41935B6}" type="pres">
-      <dgm:prSet presAssocID="{75F1D198-E377-4B1E-9480-E53F39B98F96}" presName="hierChild4" presStyleCnt="0"/>
-      <dgm:spPr/>
-    </dgm:pt>
-    <dgm:pt modelId="{B706113B-F671-40DD-BBAB-322AE14F6488}" type="pres">
-      <dgm:prSet presAssocID="{50E80EE0-A4DD-47C0-AF86-36F5A9425CC3}" presName="hierRoot1" presStyleCnt="0"/>
-      <dgm:spPr/>
-    </dgm:pt>
-    <dgm:pt modelId="{552ED644-101E-4FE2-9EBF-1FC517A0C839}" type="pres">
-      <dgm:prSet presAssocID="{50E80EE0-A4DD-47C0-AF86-36F5A9425CC3}" presName="composite" presStyleCnt="0"/>
-      <dgm:spPr/>
-    </dgm:pt>
-    <dgm:pt modelId="{343C0B6F-AB84-4647-8D12-F4F20E2875B6}" type="pres">
-      <dgm:prSet presAssocID="{50E80EE0-A4DD-47C0-AF86-36F5A9425CC3}" presName="background" presStyleLbl="node0" presStyleIdx="1" presStyleCnt="3"/>
-      <dgm:spPr/>
-    </dgm:pt>
-    <dgm:pt modelId="{44711A0E-F7D4-4839-8F69-8F00BCAD9C5F}" type="pres">
-      <dgm:prSet presAssocID="{50E80EE0-A4DD-47C0-AF86-36F5A9425CC3}" presName="text" presStyleLbl="fgAcc0" presStyleIdx="1" presStyleCnt="3">
-        <dgm:presLayoutVars>
-          <dgm:chPref val="3"/>
-        </dgm:presLayoutVars>
-      </dgm:prSet>
-      <dgm:spPr/>
-    </dgm:pt>
-    <dgm:pt modelId="{E50D9762-5E63-4AD4-BDFF-9EC3A870AD70}" type="pres">
-      <dgm:prSet presAssocID="{50E80EE0-A4DD-47C0-AF86-36F5A9425CC3}" presName="hierChild2" presStyleCnt="0"/>
-      <dgm:spPr/>
-    </dgm:pt>
-    <dgm:pt modelId="{0E60B450-62CE-4945-82D4-E2C344E085E1}" type="pres">
-      <dgm:prSet presAssocID="{D4830123-865B-406D-A862-C0D16419462C}" presName="Name10" presStyleLbl="parChTrans1D2" presStyleIdx="2" presStyleCnt="4"/>
-      <dgm:spPr/>
-    </dgm:pt>
-    <dgm:pt modelId="{21416203-3929-439C-985F-9ED931C6F86D}" type="pres">
-      <dgm:prSet presAssocID="{CF02CACD-5214-4A46-984B-DC32F543FA4D}" presName="hierRoot2" presStyleCnt="0"/>
-      <dgm:spPr/>
-    </dgm:pt>
-    <dgm:pt modelId="{FDF1F5F3-57B7-4549-BB10-12753610BCD0}" type="pres">
-      <dgm:prSet presAssocID="{CF02CACD-5214-4A46-984B-DC32F543FA4D}" presName="composite2" presStyleCnt="0"/>
-      <dgm:spPr/>
-    </dgm:pt>
-    <dgm:pt modelId="{A21D24DE-3421-4081-9E9F-D30B62C5A7DA}" type="pres">
-      <dgm:prSet presAssocID="{CF02CACD-5214-4A46-984B-DC32F543FA4D}" presName="background2" presStyleLbl="node2" presStyleIdx="2" presStyleCnt="4"/>
-      <dgm:spPr/>
-    </dgm:pt>
-    <dgm:pt modelId="{EE3A2CD5-60F8-4EE9-953D-C4A6F826B37C}" type="pres">
-      <dgm:prSet presAssocID="{CF02CACD-5214-4A46-984B-DC32F543FA4D}" presName="text2" presStyleLbl="fgAcc2" presStyleIdx="2" presStyleCnt="4">
-        <dgm:presLayoutVars>
-          <dgm:chPref val="3"/>
-        </dgm:presLayoutVars>
-      </dgm:prSet>
+    <dgm:pt modelId="{7D291A92-E0F2-424B-82AB-06BAA86C8A8A}" type="pres">
+      <dgm:prSet presAssocID="{DD351C4C-72E9-4E05-8DC7-951FBBE48B55}" presName="hierChild3" presStyleCnt="0"/>
+      <dgm:spPr/>
+    </dgm:pt>
+    <dgm:pt modelId="{B61A23CF-FEB6-4EA8-B741-96881DC2FC32}" type="pres">
+      <dgm:prSet presAssocID="{5B972C33-620B-4D06-A769-D30144C88AD2}" presName="Name10" presStyleLbl="parChTrans1D2" presStyleIdx="1" presStyleCnt="4"/>
       <dgm:spPr/>
       <dgm:t>
         <a:bodyPr/>
@@ -5711,28 +5709,20 @@
         </a:p>
       </dgm:t>
     </dgm:pt>
-    <dgm:pt modelId="{B391353A-4A98-4E32-B3B8-1BB7A24C59E9}" type="pres">
-      <dgm:prSet presAssocID="{CF02CACD-5214-4A46-984B-DC32F543FA4D}" presName="hierChild3" presStyleCnt="0"/>
-      <dgm:spPr/>
-    </dgm:pt>
-    <dgm:pt modelId="{C757932D-7951-4624-82BD-C376A99BA321}" type="pres">
-      <dgm:prSet presAssocID="{1081519C-20CC-45D5-B02A-E770EA067C1F}" presName="Name17" presStyleLbl="parChTrans1D3" presStyleIdx="1" presStyleCnt="3"/>
-      <dgm:spPr/>
-    </dgm:pt>
-    <dgm:pt modelId="{B6E00746-F1A4-499C-8355-1AB328D0909D}" type="pres">
-      <dgm:prSet presAssocID="{DB08E750-94D2-4C11-9395-3D108CD78B28}" presName="hierRoot3" presStyleCnt="0"/>
-      <dgm:spPr/>
-    </dgm:pt>
-    <dgm:pt modelId="{0137267E-5713-42DC-AFDC-5F762D5F8865}" type="pres">
-      <dgm:prSet presAssocID="{DB08E750-94D2-4C11-9395-3D108CD78B28}" presName="composite3" presStyleCnt="0"/>
-      <dgm:spPr/>
-    </dgm:pt>
-    <dgm:pt modelId="{11CB2A99-F7EE-49F5-B0DF-A661BAF615CD}" type="pres">
-      <dgm:prSet presAssocID="{DB08E750-94D2-4C11-9395-3D108CD78B28}" presName="background3" presStyleLbl="node3" presStyleIdx="1" presStyleCnt="3"/>
-      <dgm:spPr/>
-    </dgm:pt>
-    <dgm:pt modelId="{A93C7A98-583F-4FFC-9AE9-ACF593FB5064}" type="pres">
-      <dgm:prSet presAssocID="{DB08E750-94D2-4C11-9395-3D108CD78B28}" presName="text3" presStyleLbl="fgAcc3" presStyleIdx="1" presStyleCnt="3">
+    <dgm:pt modelId="{6397F36E-1110-4552-BF36-85FAA2BCC405}" type="pres">
+      <dgm:prSet presAssocID="{E176D4A6-23B1-45F8-8639-0521E74F02D8}" presName="hierRoot2" presStyleCnt="0"/>
+      <dgm:spPr/>
+    </dgm:pt>
+    <dgm:pt modelId="{D4DC89AD-B35B-46F8-AE3E-AC04306B1D72}" type="pres">
+      <dgm:prSet presAssocID="{E176D4A6-23B1-45F8-8639-0521E74F02D8}" presName="composite2" presStyleCnt="0"/>
+      <dgm:spPr/>
+    </dgm:pt>
+    <dgm:pt modelId="{00F83B0E-96DC-4A67-8AF0-CF719D3A9CE2}" type="pres">
+      <dgm:prSet presAssocID="{E176D4A6-23B1-45F8-8639-0521E74F02D8}" presName="background2" presStyleLbl="node2" presStyleIdx="1" presStyleCnt="4"/>
+      <dgm:spPr/>
+    </dgm:pt>
+    <dgm:pt modelId="{7E96EB48-7081-44FF-950B-EC8DC6726213}" type="pres">
+      <dgm:prSet presAssocID="{E176D4A6-23B1-45F8-8639-0521E74F02D8}" presName="text2" presStyleLbl="fgAcc2" presStyleIdx="1" presStyleCnt="4">
         <dgm:presLayoutVars>
           <dgm:chPref val="3"/>
         </dgm:presLayoutVars>
@@ -5746,56 +5736,12 @@
         </a:p>
       </dgm:t>
     </dgm:pt>
-    <dgm:pt modelId="{77A5C83E-EBBE-4670-B21F-BDC54345842B}" type="pres">
-      <dgm:prSet presAssocID="{DB08E750-94D2-4C11-9395-3D108CD78B28}" presName="hierChild4" presStyleCnt="0"/>
-      <dgm:spPr/>
-    </dgm:pt>
-    <dgm:pt modelId="{06241058-836F-471E-BAC0-C9A52596F67E}" type="pres">
-      <dgm:prSet presAssocID="{4AFA0BCF-3F76-4A9E-9664-7040D9CE0684}" presName="hierRoot1" presStyleCnt="0"/>
-      <dgm:spPr/>
-    </dgm:pt>
-    <dgm:pt modelId="{B0D26656-1D41-4D19-82F1-9EBABF643EC7}" type="pres">
-      <dgm:prSet presAssocID="{4AFA0BCF-3F76-4A9E-9664-7040D9CE0684}" presName="composite" presStyleCnt="0"/>
-      <dgm:spPr/>
-    </dgm:pt>
-    <dgm:pt modelId="{FBAE84C5-0BCF-42BD-8674-6B8BCF333134}" type="pres">
-      <dgm:prSet presAssocID="{4AFA0BCF-3F76-4A9E-9664-7040D9CE0684}" presName="background" presStyleLbl="node0" presStyleIdx="2" presStyleCnt="3"/>
-      <dgm:spPr/>
-    </dgm:pt>
-    <dgm:pt modelId="{5686BD00-584B-45E0-973F-3786295AE7A8}" type="pres">
-      <dgm:prSet presAssocID="{4AFA0BCF-3F76-4A9E-9664-7040D9CE0684}" presName="text" presStyleLbl="fgAcc0" presStyleIdx="2" presStyleCnt="3">
-        <dgm:presLayoutVars>
-          <dgm:chPref val="3"/>
-        </dgm:presLayoutVars>
-      </dgm:prSet>
-      <dgm:spPr/>
-    </dgm:pt>
-    <dgm:pt modelId="{BBF63285-BA97-49E6-B6E8-0E153148EE6D}" type="pres">
-      <dgm:prSet presAssocID="{4AFA0BCF-3F76-4A9E-9664-7040D9CE0684}" presName="hierChild2" presStyleCnt="0"/>
-      <dgm:spPr/>
-    </dgm:pt>
-    <dgm:pt modelId="{78A1105C-B53B-45B9-ACF8-9DD828A991DA}" type="pres">
-      <dgm:prSet presAssocID="{9FC1897A-6480-485D-9E7D-048D0DD3ED34}" presName="Name10" presStyleLbl="parChTrans1D2" presStyleIdx="3" presStyleCnt="4"/>
-      <dgm:spPr/>
-    </dgm:pt>
-    <dgm:pt modelId="{E829620B-C3AC-4DA3-9E23-63587A4613EC}" type="pres">
-      <dgm:prSet presAssocID="{1D83D59B-98DC-4BA5-9FD2-E98B9B1E3ACD}" presName="hierRoot2" presStyleCnt="0"/>
-      <dgm:spPr/>
-    </dgm:pt>
-    <dgm:pt modelId="{FEB1E709-8B26-447E-959F-58216B4FD85E}" type="pres">
-      <dgm:prSet presAssocID="{1D83D59B-98DC-4BA5-9FD2-E98B9B1E3ACD}" presName="composite2" presStyleCnt="0"/>
-      <dgm:spPr/>
-    </dgm:pt>
-    <dgm:pt modelId="{48EB82C6-FC62-4C56-9902-B8DDC2D85261}" type="pres">
-      <dgm:prSet presAssocID="{1D83D59B-98DC-4BA5-9FD2-E98B9B1E3ACD}" presName="background2" presStyleLbl="node2" presStyleIdx="3" presStyleCnt="4"/>
-      <dgm:spPr/>
-    </dgm:pt>
-    <dgm:pt modelId="{50BBCECB-6377-4732-8F44-FB4C9176D9FF}" type="pres">
-      <dgm:prSet presAssocID="{1D83D59B-98DC-4BA5-9FD2-E98B9B1E3ACD}" presName="text2" presStyleLbl="fgAcc2" presStyleIdx="3" presStyleCnt="4">
-        <dgm:presLayoutVars>
-          <dgm:chPref val="3"/>
-        </dgm:presLayoutVars>
-      </dgm:prSet>
+    <dgm:pt modelId="{E2705C0D-DCE7-4806-B5CE-6334B46F3D72}" type="pres">
+      <dgm:prSet presAssocID="{E176D4A6-23B1-45F8-8639-0521E74F02D8}" presName="hierChild3" presStyleCnt="0"/>
+      <dgm:spPr/>
+    </dgm:pt>
+    <dgm:pt modelId="{BAA9464A-7426-4FCE-B8EB-DF88DC98CE53}" type="pres">
+      <dgm:prSet presAssocID="{210AA213-09A4-401F-84AA-AFF71994B0D6}" presName="Name17" presStyleLbl="parChTrans1D3" presStyleIdx="0" presStyleCnt="3"/>
       <dgm:spPr/>
       <dgm:t>
         <a:bodyPr/>
@@ -5805,6 +5751,221 @@
         </a:p>
       </dgm:t>
     </dgm:pt>
+    <dgm:pt modelId="{6F092B58-2A04-4441-B85C-7AC9C7D1B3E5}" type="pres">
+      <dgm:prSet presAssocID="{75F1D198-E377-4B1E-9480-E53F39B98F96}" presName="hierRoot3" presStyleCnt="0"/>
+      <dgm:spPr/>
+    </dgm:pt>
+    <dgm:pt modelId="{9A11EDEA-6977-497D-922F-FD10596A807E}" type="pres">
+      <dgm:prSet presAssocID="{75F1D198-E377-4B1E-9480-E53F39B98F96}" presName="composite3" presStyleCnt="0"/>
+      <dgm:spPr/>
+    </dgm:pt>
+    <dgm:pt modelId="{3142DC97-2828-415C-9937-F30A104147F6}" type="pres">
+      <dgm:prSet presAssocID="{75F1D198-E377-4B1E-9480-E53F39B98F96}" presName="background3" presStyleLbl="node3" presStyleIdx="0" presStyleCnt="3"/>
+      <dgm:spPr/>
+    </dgm:pt>
+    <dgm:pt modelId="{3AC25D66-E1F4-487E-B166-08DDDC2A0FDA}" type="pres">
+      <dgm:prSet presAssocID="{75F1D198-E377-4B1E-9480-E53F39B98F96}" presName="text3" presStyleLbl="fgAcc3" presStyleIdx="0" presStyleCnt="3">
+        <dgm:presLayoutVars>
+          <dgm:chPref val="3"/>
+        </dgm:presLayoutVars>
+      </dgm:prSet>
+      <dgm:spPr/>
+      <dgm:t>
+        <a:bodyPr/>
+        <a:lstStyle/>
+        <a:p>
+          <a:endParaRPr lang="en-US"/>
+        </a:p>
+      </dgm:t>
+    </dgm:pt>
+    <dgm:pt modelId="{1FC9414F-1630-4C91-BED0-CB2DC41935B6}" type="pres">
+      <dgm:prSet presAssocID="{75F1D198-E377-4B1E-9480-E53F39B98F96}" presName="hierChild4" presStyleCnt="0"/>
+      <dgm:spPr/>
+    </dgm:pt>
+    <dgm:pt modelId="{B706113B-F671-40DD-BBAB-322AE14F6488}" type="pres">
+      <dgm:prSet presAssocID="{50E80EE0-A4DD-47C0-AF86-36F5A9425CC3}" presName="hierRoot1" presStyleCnt="0"/>
+      <dgm:spPr/>
+    </dgm:pt>
+    <dgm:pt modelId="{552ED644-101E-4FE2-9EBF-1FC517A0C839}" type="pres">
+      <dgm:prSet presAssocID="{50E80EE0-A4DD-47C0-AF86-36F5A9425CC3}" presName="composite" presStyleCnt="0"/>
+      <dgm:spPr/>
+    </dgm:pt>
+    <dgm:pt modelId="{343C0B6F-AB84-4647-8D12-F4F20E2875B6}" type="pres">
+      <dgm:prSet presAssocID="{50E80EE0-A4DD-47C0-AF86-36F5A9425CC3}" presName="background" presStyleLbl="node0" presStyleIdx="1" presStyleCnt="3"/>
+      <dgm:spPr/>
+    </dgm:pt>
+    <dgm:pt modelId="{44711A0E-F7D4-4839-8F69-8F00BCAD9C5F}" type="pres">
+      <dgm:prSet presAssocID="{50E80EE0-A4DD-47C0-AF86-36F5A9425CC3}" presName="text" presStyleLbl="fgAcc0" presStyleIdx="1" presStyleCnt="3">
+        <dgm:presLayoutVars>
+          <dgm:chPref val="3"/>
+        </dgm:presLayoutVars>
+      </dgm:prSet>
+      <dgm:spPr/>
+      <dgm:t>
+        <a:bodyPr/>
+        <a:lstStyle/>
+        <a:p>
+          <a:endParaRPr lang="en-US"/>
+        </a:p>
+      </dgm:t>
+    </dgm:pt>
+    <dgm:pt modelId="{E50D9762-5E63-4AD4-BDFF-9EC3A870AD70}" type="pres">
+      <dgm:prSet presAssocID="{50E80EE0-A4DD-47C0-AF86-36F5A9425CC3}" presName="hierChild2" presStyleCnt="0"/>
+      <dgm:spPr/>
+    </dgm:pt>
+    <dgm:pt modelId="{0E60B450-62CE-4945-82D4-E2C344E085E1}" type="pres">
+      <dgm:prSet presAssocID="{D4830123-865B-406D-A862-C0D16419462C}" presName="Name10" presStyleLbl="parChTrans1D2" presStyleIdx="2" presStyleCnt="4"/>
+      <dgm:spPr/>
+      <dgm:t>
+        <a:bodyPr/>
+        <a:lstStyle/>
+        <a:p>
+          <a:endParaRPr lang="en-US"/>
+        </a:p>
+      </dgm:t>
+    </dgm:pt>
+    <dgm:pt modelId="{21416203-3929-439C-985F-9ED931C6F86D}" type="pres">
+      <dgm:prSet presAssocID="{CF02CACD-5214-4A46-984B-DC32F543FA4D}" presName="hierRoot2" presStyleCnt="0"/>
+      <dgm:spPr/>
+    </dgm:pt>
+    <dgm:pt modelId="{FDF1F5F3-57B7-4549-BB10-12753610BCD0}" type="pres">
+      <dgm:prSet presAssocID="{CF02CACD-5214-4A46-984B-DC32F543FA4D}" presName="composite2" presStyleCnt="0"/>
+      <dgm:spPr/>
+    </dgm:pt>
+    <dgm:pt modelId="{A21D24DE-3421-4081-9E9F-D30B62C5A7DA}" type="pres">
+      <dgm:prSet presAssocID="{CF02CACD-5214-4A46-984B-DC32F543FA4D}" presName="background2" presStyleLbl="node2" presStyleIdx="2" presStyleCnt="4"/>
+      <dgm:spPr/>
+    </dgm:pt>
+    <dgm:pt modelId="{EE3A2CD5-60F8-4EE9-953D-C4A6F826B37C}" type="pres">
+      <dgm:prSet presAssocID="{CF02CACD-5214-4A46-984B-DC32F543FA4D}" presName="text2" presStyleLbl="fgAcc2" presStyleIdx="2" presStyleCnt="4">
+        <dgm:presLayoutVars>
+          <dgm:chPref val="3"/>
+        </dgm:presLayoutVars>
+      </dgm:prSet>
+      <dgm:spPr/>
+      <dgm:t>
+        <a:bodyPr/>
+        <a:lstStyle/>
+        <a:p>
+          <a:endParaRPr lang="en-US"/>
+        </a:p>
+      </dgm:t>
+    </dgm:pt>
+    <dgm:pt modelId="{B391353A-4A98-4E32-B3B8-1BB7A24C59E9}" type="pres">
+      <dgm:prSet presAssocID="{CF02CACD-5214-4A46-984B-DC32F543FA4D}" presName="hierChild3" presStyleCnt="0"/>
+      <dgm:spPr/>
+    </dgm:pt>
+    <dgm:pt modelId="{C757932D-7951-4624-82BD-C376A99BA321}" type="pres">
+      <dgm:prSet presAssocID="{1081519C-20CC-45D5-B02A-E770EA067C1F}" presName="Name17" presStyleLbl="parChTrans1D3" presStyleIdx="1" presStyleCnt="3"/>
+      <dgm:spPr/>
+      <dgm:t>
+        <a:bodyPr/>
+        <a:lstStyle/>
+        <a:p>
+          <a:endParaRPr lang="en-US"/>
+        </a:p>
+      </dgm:t>
+    </dgm:pt>
+    <dgm:pt modelId="{B6E00746-F1A4-499C-8355-1AB328D0909D}" type="pres">
+      <dgm:prSet presAssocID="{DB08E750-94D2-4C11-9395-3D108CD78B28}" presName="hierRoot3" presStyleCnt="0"/>
+      <dgm:spPr/>
+    </dgm:pt>
+    <dgm:pt modelId="{0137267E-5713-42DC-AFDC-5F762D5F8865}" type="pres">
+      <dgm:prSet presAssocID="{DB08E750-94D2-4C11-9395-3D108CD78B28}" presName="composite3" presStyleCnt="0"/>
+      <dgm:spPr/>
+    </dgm:pt>
+    <dgm:pt modelId="{11CB2A99-F7EE-49F5-B0DF-A661BAF615CD}" type="pres">
+      <dgm:prSet presAssocID="{DB08E750-94D2-4C11-9395-3D108CD78B28}" presName="background3" presStyleLbl="node3" presStyleIdx="1" presStyleCnt="3"/>
+      <dgm:spPr/>
+    </dgm:pt>
+    <dgm:pt modelId="{A93C7A98-583F-4FFC-9AE9-ACF593FB5064}" type="pres">
+      <dgm:prSet presAssocID="{DB08E750-94D2-4C11-9395-3D108CD78B28}" presName="text3" presStyleLbl="fgAcc3" presStyleIdx="1" presStyleCnt="3">
+        <dgm:presLayoutVars>
+          <dgm:chPref val="3"/>
+        </dgm:presLayoutVars>
+      </dgm:prSet>
+      <dgm:spPr/>
+      <dgm:t>
+        <a:bodyPr/>
+        <a:lstStyle/>
+        <a:p>
+          <a:endParaRPr lang="en-US"/>
+        </a:p>
+      </dgm:t>
+    </dgm:pt>
+    <dgm:pt modelId="{77A5C83E-EBBE-4670-B21F-BDC54345842B}" type="pres">
+      <dgm:prSet presAssocID="{DB08E750-94D2-4C11-9395-3D108CD78B28}" presName="hierChild4" presStyleCnt="0"/>
+      <dgm:spPr/>
+    </dgm:pt>
+    <dgm:pt modelId="{06241058-836F-471E-BAC0-C9A52596F67E}" type="pres">
+      <dgm:prSet presAssocID="{4AFA0BCF-3F76-4A9E-9664-7040D9CE0684}" presName="hierRoot1" presStyleCnt="0"/>
+      <dgm:spPr/>
+    </dgm:pt>
+    <dgm:pt modelId="{B0D26656-1D41-4D19-82F1-9EBABF643EC7}" type="pres">
+      <dgm:prSet presAssocID="{4AFA0BCF-3F76-4A9E-9664-7040D9CE0684}" presName="composite" presStyleCnt="0"/>
+      <dgm:spPr/>
+    </dgm:pt>
+    <dgm:pt modelId="{FBAE84C5-0BCF-42BD-8674-6B8BCF333134}" type="pres">
+      <dgm:prSet presAssocID="{4AFA0BCF-3F76-4A9E-9664-7040D9CE0684}" presName="background" presStyleLbl="node0" presStyleIdx="2" presStyleCnt="3"/>
+      <dgm:spPr/>
+    </dgm:pt>
+    <dgm:pt modelId="{5686BD00-584B-45E0-973F-3786295AE7A8}" type="pres">
+      <dgm:prSet presAssocID="{4AFA0BCF-3F76-4A9E-9664-7040D9CE0684}" presName="text" presStyleLbl="fgAcc0" presStyleIdx="2" presStyleCnt="3">
+        <dgm:presLayoutVars>
+          <dgm:chPref val="3"/>
+        </dgm:presLayoutVars>
+      </dgm:prSet>
+      <dgm:spPr/>
+      <dgm:t>
+        <a:bodyPr/>
+        <a:lstStyle/>
+        <a:p>
+          <a:endParaRPr lang="en-US"/>
+        </a:p>
+      </dgm:t>
+    </dgm:pt>
+    <dgm:pt modelId="{BBF63285-BA97-49E6-B6E8-0E153148EE6D}" type="pres">
+      <dgm:prSet presAssocID="{4AFA0BCF-3F76-4A9E-9664-7040D9CE0684}" presName="hierChild2" presStyleCnt="0"/>
+      <dgm:spPr/>
+    </dgm:pt>
+    <dgm:pt modelId="{78A1105C-B53B-45B9-ACF8-9DD828A991DA}" type="pres">
+      <dgm:prSet presAssocID="{9FC1897A-6480-485D-9E7D-048D0DD3ED34}" presName="Name10" presStyleLbl="parChTrans1D2" presStyleIdx="3" presStyleCnt="4"/>
+      <dgm:spPr/>
+      <dgm:t>
+        <a:bodyPr/>
+        <a:lstStyle/>
+        <a:p>
+          <a:endParaRPr lang="en-US"/>
+        </a:p>
+      </dgm:t>
+    </dgm:pt>
+    <dgm:pt modelId="{E829620B-C3AC-4DA3-9E23-63587A4613EC}" type="pres">
+      <dgm:prSet presAssocID="{1D83D59B-98DC-4BA5-9FD2-E98B9B1E3ACD}" presName="hierRoot2" presStyleCnt="0"/>
+      <dgm:spPr/>
+    </dgm:pt>
+    <dgm:pt modelId="{FEB1E709-8B26-447E-959F-58216B4FD85E}" type="pres">
+      <dgm:prSet presAssocID="{1D83D59B-98DC-4BA5-9FD2-E98B9B1E3ACD}" presName="composite2" presStyleCnt="0"/>
+      <dgm:spPr/>
+    </dgm:pt>
+    <dgm:pt modelId="{48EB82C6-FC62-4C56-9902-B8DDC2D85261}" type="pres">
+      <dgm:prSet presAssocID="{1D83D59B-98DC-4BA5-9FD2-E98B9B1E3ACD}" presName="background2" presStyleLbl="node2" presStyleIdx="3" presStyleCnt="4"/>
+      <dgm:spPr/>
+    </dgm:pt>
+    <dgm:pt modelId="{50BBCECB-6377-4732-8F44-FB4C9176D9FF}" type="pres">
+      <dgm:prSet presAssocID="{1D83D59B-98DC-4BA5-9FD2-E98B9B1E3ACD}" presName="text2" presStyleLbl="fgAcc2" presStyleIdx="3" presStyleCnt="4">
+        <dgm:presLayoutVars>
+          <dgm:chPref val="3"/>
+        </dgm:presLayoutVars>
+      </dgm:prSet>
+      <dgm:spPr/>
+      <dgm:t>
+        <a:bodyPr/>
+        <a:lstStyle/>
+        <a:p>
+          <a:endParaRPr lang="en-US"/>
+        </a:p>
+      </dgm:t>
+    </dgm:pt>
     <dgm:pt modelId="{66100288-9EEB-4794-A0CA-3CFD1C01EDB9}" type="pres">
       <dgm:prSet presAssocID="{1D83D59B-98DC-4BA5-9FD2-E98B9B1E3ACD}" presName="hierChild3" presStyleCnt="0"/>
       <dgm:spPr/>
@@ -5812,6 +5973,13 @@
     <dgm:pt modelId="{94272433-050F-47EA-8C1B-9FE85CA17316}" type="pres">
       <dgm:prSet presAssocID="{28C6D3A4-CFA9-44A4-91EF-9DEE449B54FD}" presName="Name17" presStyleLbl="parChTrans1D3" presStyleIdx="2" presStyleCnt="3"/>
       <dgm:spPr/>
+      <dgm:t>
+        <a:bodyPr/>
+        <a:lstStyle/>
+        <a:p>
+          <a:endParaRPr lang="en-US"/>
+        </a:p>
+      </dgm:t>
     </dgm:pt>
     <dgm:pt modelId="{2C32728B-C044-4E88-8550-40BDB2B05BEC}" type="pres">
       <dgm:prSet presAssocID="{1FE07398-AF54-4D97-975B-A3A2C0058016}" presName="hierRoot3" presStyleCnt="0"/>
@@ -5832,6 +6000,13 @@
         </dgm:presLayoutVars>
       </dgm:prSet>
       <dgm:spPr/>
+      <dgm:t>
+        <a:bodyPr/>
+        <a:lstStyle/>
+        <a:p>
+          <a:endParaRPr lang="en-US"/>
+        </a:p>
+      </dgm:t>
     </dgm:pt>
     <dgm:pt modelId="{65461300-E252-43A6-A66A-70E5847216DB}" type="pres">
       <dgm:prSet presAssocID="{1FE07398-AF54-4D97-975B-A3A2C0058016}" presName="hierChild4" presStyleCnt="0"/>
@@ -5839,34 +6014,34 @@
     </dgm:pt>
   </dgm:ptLst>
   <dgm:cxnLst>
-    <dgm:cxn modelId="{D2A87544-D9F4-44CE-BC99-0521C9E9EF16}" type="presOf" srcId="{A414F3A0-F3D0-48C7-BD5E-C973BD4DA5FC}" destId="{6C24B679-A224-47EA-987A-C973994C4BF6}" srcOrd="0" destOrd="0" presId="urn:microsoft.com/office/officeart/2005/8/layout/hierarchy1"/>
+    <dgm:cxn modelId="{83C3C5AF-88F9-4206-8B46-1DD3BE4EE214}" srcId="{A414F3A0-F3D0-48C7-BD5E-C973BD4DA5FC}" destId="{DD351C4C-72E9-4E05-8DC7-951FBBE48B55}" srcOrd="0" destOrd="0" parTransId="{434D147A-963A-4E4A-A913-C410E6C829B9}" sibTransId="{4E4DA8F2-F873-4FAE-8DE0-E56B52C5B5AA}"/>
+    <dgm:cxn modelId="{6552F9E4-AE7E-4091-AD2C-BDF6E9FAF1E0}" type="presOf" srcId="{E176D4A6-23B1-45F8-8639-0521E74F02D8}" destId="{7E96EB48-7081-44FF-950B-EC8DC6726213}" srcOrd="0" destOrd="0" presId="urn:microsoft.com/office/officeart/2005/8/layout/hierarchy1"/>
     <dgm:cxn modelId="{01CEB5AF-BD2A-4C67-B375-1A59B608C007}" srcId="{AF829859-61F7-4201-8323-ABD140313E8F}" destId="{A414F3A0-F3D0-48C7-BD5E-C973BD4DA5FC}" srcOrd="0" destOrd="0" parTransId="{EDCF52CB-D464-4D7F-AB0F-B35D0BDA5651}" sibTransId="{C179DFEE-2BB5-43E0-ADF6-AF3A69E786FC}"/>
-    <dgm:cxn modelId="{FA10F2F1-EE09-4F7F-B970-4CD21A63E88C}" type="presOf" srcId="{434D147A-963A-4E4A-A913-C410E6C829B9}" destId="{1A16012F-D7C1-44F5-9D61-12EE6B937EAA}" srcOrd="0" destOrd="0" presId="urn:microsoft.com/office/officeart/2005/8/layout/hierarchy1"/>
-    <dgm:cxn modelId="{B7E25D90-4F48-4F50-BA70-7AC7935FE577}" type="presOf" srcId="{5B972C33-620B-4D06-A769-D30144C88AD2}" destId="{B61A23CF-FEB6-4EA8-B741-96881DC2FC32}" srcOrd="0" destOrd="0" presId="urn:microsoft.com/office/officeart/2005/8/layout/hierarchy1"/>
     <dgm:cxn modelId="{4B3F05C4-FD30-4810-87DC-43993F90EA24}" type="presOf" srcId="{210AA213-09A4-401F-84AA-AFF71994B0D6}" destId="{BAA9464A-7426-4FCE-B8EB-DF88DC98CE53}" srcOrd="0" destOrd="0" presId="urn:microsoft.com/office/officeart/2005/8/layout/hierarchy1"/>
-    <dgm:cxn modelId="{2BD0506F-4E28-49A0-AC2F-5D1C8E4CEAE7}" srcId="{4AFA0BCF-3F76-4A9E-9664-7040D9CE0684}" destId="{1D83D59B-98DC-4BA5-9FD2-E98B9B1E3ACD}" srcOrd="0" destOrd="0" parTransId="{9FC1897A-6480-485D-9E7D-048D0DD3ED34}" sibTransId="{7A5F4BD7-A279-49CB-A533-140E8CFB347A}"/>
-    <dgm:cxn modelId="{23B779F7-81AC-4618-960A-E3C4DBA4C06B}" type="presOf" srcId="{9FC1897A-6480-485D-9E7D-048D0DD3ED34}" destId="{78A1105C-B53B-45B9-ACF8-9DD828A991DA}" srcOrd="0" destOrd="0" presId="urn:microsoft.com/office/officeart/2005/8/layout/hierarchy1"/>
-    <dgm:cxn modelId="{83AAD55C-AAA9-4F64-A361-A1B6AA25D2DB}" type="presOf" srcId="{AF829859-61F7-4201-8323-ABD140313E8F}" destId="{50AE0911-3195-437C-9119-7F816C8A5E95}" srcOrd="0" destOrd="0" presId="urn:microsoft.com/office/officeart/2005/8/layout/hierarchy1"/>
-    <dgm:cxn modelId="{83C3C5AF-88F9-4206-8B46-1DD3BE4EE214}" srcId="{A414F3A0-F3D0-48C7-BD5E-C973BD4DA5FC}" destId="{DD351C4C-72E9-4E05-8DC7-951FBBE48B55}" srcOrd="0" destOrd="0" parTransId="{434D147A-963A-4E4A-A913-C410E6C829B9}" sibTransId="{4E4DA8F2-F873-4FAE-8DE0-E56B52C5B5AA}"/>
-    <dgm:cxn modelId="{E08EDB9E-E72B-47FC-B054-F05013E35335}" srcId="{AF829859-61F7-4201-8323-ABD140313E8F}" destId="{50E80EE0-A4DD-47C0-AF86-36F5A9425CC3}" srcOrd="1" destOrd="0" parTransId="{37196A59-8A05-408E-8081-A896B92CDAE6}" sibTransId="{120DCC16-057E-4097-80A3-06DCD7725CF4}"/>
     <dgm:cxn modelId="{E4A1C278-1712-467F-951E-20F226917102}" type="presOf" srcId="{DD351C4C-72E9-4E05-8DC7-951FBBE48B55}" destId="{32A0E7CE-AD8E-4FDF-A9AE-B903F6897885}" srcOrd="0" destOrd="0" presId="urn:microsoft.com/office/officeart/2005/8/layout/hierarchy1"/>
     <dgm:cxn modelId="{1C116D68-AAA9-4E16-82EE-C2C79619A2BD}" type="presOf" srcId="{28C6D3A4-CFA9-44A4-91EF-9DEE449B54FD}" destId="{94272433-050F-47EA-8C1B-9FE85CA17316}" srcOrd="0" destOrd="0" presId="urn:microsoft.com/office/officeart/2005/8/layout/hierarchy1"/>
+    <dgm:cxn modelId="{2B150C46-4247-4152-9328-0B54CA43702B}" srcId="{50E80EE0-A4DD-47C0-AF86-36F5A9425CC3}" destId="{CF02CACD-5214-4A46-984B-DC32F543FA4D}" srcOrd="0" destOrd="0" parTransId="{D4830123-865B-406D-A862-C0D16419462C}" sibTransId="{734D32F3-A2FC-4F87-AAC7-8B4034F7C089}"/>
+    <dgm:cxn modelId="{655646E6-32CC-4B70-A5F5-9E2AFD1F9A8E}" type="presOf" srcId="{D4830123-865B-406D-A862-C0D16419462C}" destId="{0E60B450-62CE-4945-82D4-E2C344E085E1}" srcOrd="0" destOrd="0" presId="urn:microsoft.com/office/officeart/2005/8/layout/hierarchy1"/>
+    <dgm:cxn modelId="{B7E25D90-4F48-4F50-BA70-7AC7935FE577}" type="presOf" srcId="{5B972C33-620B-4D06-A769-D30144C88AD2}" destId="{B61A23CF-FEB6-4EA8-B741-96881DC2FC32}" srcOrd="0" destOrd="0" presId="urn:microsoft.com/office/officeart/2005/8/layout/hierarchy1"/>
+    <dgm:cxn modelId="{37E78410-5F0D-4656-B171-AD07DD1F60A1}" type="presOf" srcId="{1D83D59B-98DC-4BA5-9FD2-E98B9B1E3ACD}" destId="{50BBCECB-6377-4732-8F44-FB4C9176D9FF}" srcOrd="0" destOrd="0" presId="urn:microsoft.com/office/officeart/2005/8/layout/hierarchy1"/>
+    <dgm:cxn modelId="{C17AEDC9-9BC9-4ADA-96D7-13F0559E7034}" srcId="{E176D4A6-23B1-45F8-8639-0521E74F02D8}" destId="{75F1D198-E377-4B1E-9480-E53F39B98F96}" srcOrd="0" destOrd="0" parTransId="{210AA213-09A4-401F-84AA-AFF71994B0D6}" sibTransId="{5DF6C354-F844-485E-8992-05ED82520393}"/>
+    <dgm:cxn modelId="{3D4806BF-CFEC-4D09-BFE7-9F41FEA9075F}" srcId="{CF02CACD-5214-4A46-984B-DC32F543FA4D}" destId="{DB08E750-94D2-4C11-9395-3D108CD78B28}" srcOrd="0" destOrd="0" parTransId="{1081519C-20CC-45D5-B02A-E770EA067C1F}" sibTransId="{B5C03D0C-5A2A-41B5-9190-1B4F013CC9A5}"/>
     <dgm:cxn modelId="{FC9D7D90-1ADA-431E-9257-CD62F23A7311}" srcId="{1D83D59B-98DC-4BA5-9FD2-E98B9B1E3ACD}" destId="{1FE07398-AF54-4D97-975B-A3A2C0058016}" srcOrd="0" destOrd="0" parTransId="{28C6D3A4-CFA9-44A4-91EF-9DEE449B54FD}" sibTransId="{BA3795BF-7F39-4E7B-AD15-C9712FC1079C}"/>
-    <dgm:cxn modelId="{2B150C46-4247-4152-9328-0B54CA43702B}" srcId="{50E80EE0-A4DD-47C0-AF86-36F5A9425CC3}" destId="{CF02CACD-5214-4A46-984B-DC32F543FA4D}" srcOrd="0" destOrd="0" parTransId="{D4830123-865B-406D-A862-C0D16419462C}" sibTransId="{734D32F3-A2FC-4F87-AAC7-8B4034F7C089}"/>
     <dgm:cxn modelId="{33F68C53-6AC2-4BE5-846E-C52CEC5C2D9B}" type="presOf" srcId="{50E80EE0-A4DD-47C0-AF86-36F5A9425CC3}" destId="{44711A0E-F7D4-4839-8F69-8F00BCAD9C5F}" srcOrd="0" destOrd="0" presId="urn:microsoft.com/office/officeart/2005/8/layout/hierarchy1"/>
-    <dgm:cxn modelId="{C17AEDC9-9BC9-4ADA-96D7-13F0559E7034}" srcId="{E176D4A6-23B1-45F8-8639-0521E74F02D8}" destId="{75F1D198-E377-4B1E-9480-E53F39B98F96}" srcOrd="0" destOrd="0" parTransId="{210AA213-09A4-401F-84AA-AFF71994B0D6}" sibTransId="{5DF6C354-F844-485E-8992-05ED82520393}"/>
+    <dgm:cxn modelId="{E08EDB9E-E72B-47FC-B054-F05013E35335}" srcId="{AF829859-61F7-4201-8323-ABD140313E8F}" destId="{50E80EE0-A4DD-47C0-AF86-36F5A9425CC3}" srcOrd="1" destOrd="0" parTransId="{37196A59-8A05-408E-8081-A896B92CDAE6}" sibTransId="{120DCC16-057E-4097-80A3-06DCD7725CF4}"/>
+    <dgm:cxn modelId="{23B779F7-81AC-4618-960A-E3C4DBA4C06B}" type="presOf" srcId="{9FC1897A-6480-485D-9E7D-048D0DD3ED34}" destId="{78A1105C-B53B-45B9-ACF8-9DD828A991DA}" srcOrd="0" destOrd="0" presId="urn:microsoft.com/office/officeart/2005/8/layout/hierarchy1"/>
+    <dgm:cxn modelId="{2BD0506F-4E28-49A0-AC2F-5D1C8E4CEAE7}" srcId="{4AFA0BCF-3F76-4A9E-9664-7040D9CE0684}" destId="{1D83D59B-98DC-4BA5-9FD2-E98B9B1E3ACD}" srcOrd="0" destOrd="0" parTransId="{9FC1897A-6480-485D-9E7D-048D0DD3ED34}" sibTransId="{7A5F4BD7-A279-49CB-A533-140E8CFB347A}"/>
+    <dgm:cxn modelId="{83AAD55C-AAA9-4F64-A361-A1B6AA25D2DB}" type="presOf" srcId="{AF829859-61F7-4201-8323-ABD140313E8F}" destId="{50AE0911-3195-437C-9119-7F816C8A5E95}" srcOrd="0" destOrd="0" presId="urn:microsoft.com/office/officeart/2005/8/layout/hierarchy1"/>
+    <dgm:cxn modelId="{FA10F2F1-EE09-4F7F-B970-4CD21A63E88C}" type="presOf" srcId="{434D147A-963A-4E4A-A913-C410E6C829B9}" destId="{1A16012F-D7C1-44F5-9D61-12EE6B937EAA}" srcOrd="0" destOrd="0" presId="urn:microsoft.com/office/officeart/2005/8/layout/hierarchy1"/>
+    <dgm:cxn modelId="{CE4CB1B4-6888-46EE-860A-E1AACBC7364D}" srcId="{A414F3A0-F3D0-48C7-BD5E-C973BD4DA5FC}" destId="{E176D4A6-23B1-45F8-8639-0521E74F02D8}" srcOrd="1" destOrd="0" parTransId="{5B972C33-620B-4D06-A769-D30144C88AD2}" sibTransId="{446B8507-2614-4842-BE67-D3CAA520C94F}"/>
+    <dgm:cxn modelId="{DE5BF208-788E-4C3D-A775-2F763E86EEFB}" type="presOf" srcId="{75F1D198-E377-4B1E-9480-E53F39B98F96}" destId="{3AC25D66-E1F4-487E-B166-08DDDC2A0FDA}" srcOrd="0" destOrd="0" presId="urn:microsoft.com/office/officeart/2005/8/layout/hierarchy1"/>
+    <dgm:cxn modelId="{884010A3-E654-4B9C-8DF9-9D8D72011C43}" type="presOf" srcId="{CF02CACD-5214-4A46-984B-DC32F543FA4D}" destId="{EE3A2CD5-60F8-4EE9-953D-C4A6F826B37C}" srcOrd="0" destOrd="0" presId="urn:microsoft.com/office/officeart/2005/8/layout/hierarchy1"/>
+    <dgm:cxn modelId="{BE4EDFDA-DB3D-4600-B1A4-ED934BAB4864}" type="presOf" srcId="{1FE07398-AF54-4D97-975B-A3A2C0058016}" destId="{6615E3C8-E1E4-4C77-8C60-867150195CF6}" srcOrd="0" destOrd="0" presId="urn:microsoft.com/office/officeart/2005/8/layout/hierarchy1"/>
     <dgm:cxn modelId="{B20BEB39-6202-4933-8DC1-6CE189E15796}" type="presOf" srcId="{DB08E750-94D2-4C11-9395-3D108CD78B28}" destId="{A93C7A98-583F-4FFC-9AE9-ACF593FB5064}" srcOrd="0" destOrd="0" presId="urn:microsoft.com/office/officeart/2005/8/layout/hierarchy1"/>
-    <dgm:cxn modelId="{655646E6-32CC-4B70-A5F5-9E2AFD1F9A8E}" type="presOf" srcId="{D4830123-865B-406D-A862-C0D16419462C}" destId="{0E60B450-62CE-4945-82D4-E2C344E085E1}" srcOrd="0" destOrd="0" presId="urn:microsoft.com/office/officeart/2005/8/layout/hierarchy1"/>
-    <dgm:cxn modelId="{884010A3-E654-4B9C-8DF9-9D8D72011C43}" type="presOf" srcId="{CF02CACD-5214-4A46-984B-DC32F543FA4D}" destId="{EE3A2CD5-60F8-4EE9-953D-C4A6F826B37C}" srcOrd="0" destOrd="0" presId="urn:microsoft.com/office/officeart/2005/8/layout/hierarchy1"/>
+    <dgm:cxn modelId="{DBC0F4F0-E900-49FB-880F-BFC1AA4C4433}" type="presOf" srcId="{1081519C-20CC-45D5-B02A-E770EA067C1F}" destId="{C757932D-7951-4624-82BD-C376A99BA321}" srcOrd="0" destOrd="0" presId="urn:microsoft.com/office/officeart/2005/8/layout/hierarchy1"/>
+    <dgm:cxn modelId="{D2A87544-D9F4-44CE-BC99-0521C9E9EF16}" type="presOf" srcId="{A414F3A0-F3D0-48C7-BD5E-C973BD4DA5FC}" destId="{6C24B679-A224-47EA-987A-C973994C4BF6}" srcOrd="0" destOrd="0" presId="urn:microsoft.com/office/officeart/2005/8/layout/hierarchy1"/>
     <dgm:cxn modelId="{A230359A-72E5-4AEB-BD51-6D01FB28A070}" srcId="{AF829859-61F7-4201-8323-ABD140313E8F}" destId="{4AFA0BCF-3F76-4A9E-9664-7040D9CE0684}" srcOrd="2" destOrd="0" parTransId="{59E1F62D-6E5A-4033-A063-F00BE8A36645}" sibTransId="{F052597A-91E1-4D1C-A292-AFF6BEB69735}"/>
-    <dgm:cxn modelId="{37E78410-5F0D-4656-B171-AD07DD1F60A1}" type="presOf" srcId="{1D83D59B-98DC-4BA5-9FD2-E98B9B1E3ACD}" destId="{50BBCECB-6377-4732-8F44-FB4C9176D9FF}" srcOrd="0" destOrd="0" presId="urn:microsoft.com/office/officeart/2005/8/layout/hierarchy1"/>
-    <dgm:cxn modelId="{DE5BF208-788E-4C3D-A775-2F763E86EEFB}" type="presOf" srcId="{75F1D198-E377-4B1E-9480-E53F39B98F96}" destId="{3AC25D66-E1F4-487E-B166-08DDDC2A0FDA}" srcOrd="0" destOrd="0" presId="urn:microsoft.com/office/officeart/2005/8/layout/hierarchy1"/>
-    <dgm:cxn modelId="{BE4EDFDA-DB3D-4600-B1A4-ED934BAB4864}" type="presOf" srcId="{1FE07398-AF54-4D97-975B-A3A2C0058016}" destId="{6615E3C8-E1E4-4C77-8C60-867150195CF6}" srcOrd="0" destOrd="0" presId="urn:microsoft.com/office/officeart/2005/8/layout/hierarchy1"/>
     <dgm:cxn modelId="{748338C3-B496-46F4-BB3D-A883A8672749}" type="presOf" srcId="{4AFA0BCF-3F76-4A9E-9664-7040D9CE0684}" destId="{5686BD00-584B-45E0-973F-3786295AE7A8}" srcOrd="0" destOrd="0" presId="urn:microsoft.com/office/officeart/2005/8/layout/hierarchy1"/>
-    <dgm:cxn modelId="{6552F9E4-AE7E-4091-AD2C-BDF6E9FAF1E0}" type="presOf" srcId="{E176D4A6-23B1-45F8-8639-0521E74F02D8}" destId="{7E96EB48-7081-44FF-950B-EC8DC6726213}" srcOrd="0" destOrd="0" presId="urn:microsoft.com/office/officeart/2005/8/layout/hierarchy1"/>
-    <dgm:cxn modelId="{CE4CB1B4-6888-46EE-860A-E1AACBC7364D}" srcId="{A414F3A0-F3D0-48C7-BD5E-C973BD4DA5FC}" destId="{E176D4A6-23B1-45F8-8639-0521E74F02D8}" srcOrd="1" destOrd="0" parTransId="{5B972C33-620B-4D06-A769-D30144C88AD2}" sibTransId="{446B8507-2614-4842-BE67-D3CAA520C94F}"/>
-    <dgm:cxn modelId="{3D4806BF-CFEC-4D09-BFE7-9F41FEA9075F}" srcId="{CF02CACD-5214-4A46-984B-DC32F543FA4D}" destId="{DB08E750-94D2-4C11-9395-3D108CD78B28}" srcOrd="0" destOrd="0" parTransId="{1081519C-20CC-45D5-B02A-E770EA067C1F}" sibTransId="{B5C03D0C-5A2A-41B5-9190-1B4F013CC9A5}"/>
-    <dgm:cxn modelId="{DBC0F4F0-E900-49FB-880F-BFC1AA4C4433}" type="presOf" srcId="{1081519C-20CC-45D5-B02A-E770EA067C1F}" destId="{C757932D-7951-4624-82BD-C376A99BA321}" srcOrd="0" destOrd="0" presId="urn:microsoft.com/office/officeart/2005/8/layout/hierarchy1"/>
     <dgm:cxn modelId="{F455A3F6-D1DA-4C1C-9EBB-6E04903D64AD}" type="presParOf" srcId="{50AE0911-3195-437C-9119-7F816C8A5E95}" destId="{C6113C20-630F-49F5-B2AF-74CFA5E0F025}" srcOrd="0" destOrd="0" presId="urn:microsoft.com/office/officeart/2005/8/layout/hierarchy1"/>
     <dgm:cxn modelId="{4B8D2CB5-E389-41BC-B7E0-54AB6C07228B}" type="presParOf" srcId="{C6113C20-630F-49F5-B2AF-74CFA5E0F025}" destId="{9385CF6E-0152-40BE-9849-6653EE0F2BDD}" srcOrd="0" destOrd="0" presId="urn:microsoft.com/office/officeart/2005/8/layout/hierarchy1"/>
     <dgm:cxn modelId="{83171ED3-CDD2-4ED5-B918-8A9359CBA0CD}" type="presParOf" srcId="{9385CF6E-0152-40BE-9849-6653EE0F2BDD}" destId="{EA82BF5B-4228-479A-AB7B-7847B2199AE5}" srcOrd="0" destOrd="0" presId="urn:microsoft.com/office/officeart/2005/8/layout/hierarchy1"/>
@@ -6604,6 +6779,88 @@
         </a:p>
       </dgm:t>
     </dgm:pt>
+    <dgm:pt modelId="{63C696C5-07BD-420C-8016-3E5DDE8B8832}">
+      <dgm:prSet phldrT="[Text]"/>
+      <dgm:spPr>
+        <a:solidFill>
+          <a:srgbClr val="00B0F0">
+            <a:alpha val="90000"/>
+          </a:srgbClr>
+        </a:solidFill>
+      </dgm:spPr>
+      <dgm:t>
+        <a:bodyPr/>
+        <a:lstStyle/>
+        <a:p>
+          <a:r>
+            <a:rPr lang="en-US" dirty="0" err="1" smtClean="0">
+              <a:solidFill>
+                <a:schemeClr val="bg1">
+                  <a:lumMod val="95000"/>
+                </a:schemeClr>
+              </a:solidFill>
+            </a:rPr>
+            <a:t>YếnTT</a:t>
+          </a:r>
+          <a:endParaRPr lang="en-US" dirty="0">
+            <a:solidFill>
+              <a:schemeClr val="bg1">
+                <a:lumMod val="95000"/>
+              </a:schemeClr>
+            </a:solidFill>
+          </a:endParaRPr>
+        </a:p>
+      </dgm:t>
+    </dgm:pt>
+    <dgm:pt modelId="{053C239E-BF2B-45C5-A2D7-9A14D0E866A3}" type="parTrans" cxnId="{9FAC9FDE-7CB8-4A98-BE3B-8A729D97D333}">
+      <dgm:prSet/>
+      <dgm:spPr/>
+    </dgm:pt>
+    <dgm:pt modelId="{617BAF96-6F92-435D-802D-ED857D1D6DC6}" type="sibTrans" cxnId="{9FAC9FDE-7CB8-4A98-BE3B-8A729D97D333}">
+      <dgm:prSet/>
+      <dgm:spPr/>
+    </dgm:pt>
+    <dgm:pt modelId="{1C2627F7-A448-4AA5-96EB-2FA250463777}">
+      <dgm:prSet phldrT="[Text]"/>
+      <dgm:spPr>
+        <a:solidFill>
+          <a:srgbClr val="7030A0">
+            <a:alpha val="90000"/>
+          </a:srgbClr>
+        </a:solidFill>
+      </dgm:spPr>
+      <dgm:t>
+        <a:bodyPr/>
+        <a:lstStyle/>
+        <a:p>
+          <a:r>
+            <a:rPr lang="en-US" dirty="0" err="1" smtClean="0">
+              <a:solidFill>
+                <a:schemeClr val="bg1">
+                  <a:lumMod val="95000"/>
+                </a:schemeClr>
+              </a:solidFill>
+            </a:rPr>
+            <a:t>YếnTT</a:t>
+          </a:r>
+          <a:endParaRPr lang="en-US" dirty="0">
+            <a:solidFill>
+              <a:schemeClr val="bg1">
+                <a:lumMod val="95000"/>
+              </a:schemeClr>
+            </a:solidFill>
+          </a:endParaRPr>
+        </a:p>
+      </dgm:t>
+    </dgm:pt>
+    <dgm:pt modelId="{026FF09E-DBCF-486C-949F-0F7EEE49230D}" type="parTrans" cxnId="{0BFFB86E-6980-4035-9D63-9BD83E45A92E}">
+      <dgm:prSet/>
+      <dgm:spPr/>
+    </dgm:pt>
+    <dgm:pt modelId="{2C449019-D56A-4686-A70B-E63CA8F3CE85}" type="sibTrans" cxnId="{0BFFB86E-6980-4035-9D63-9BD83E45A92E}">
+      <dgm:prSet/>
+      <dgm:spPr/>
+    </dgm:pt>
     <dgm:pt modelId="{50AE0911-3195-437C-9119-7F816C8A5E95}" type="pres">
       <dgm:prSet presAssocID="{AF829859-61F7-4201-8323-ABD140313E8F}" presName="hierChild1" presStyleCnt="0">
         <dgm:presLayoutVars>
@@ -6615,26 +6872,6 @@
         </dgm:presLayoutVars>
       </dgm:prSet>
       <dgm:spPr/>
-    </dgm:pt>
-    <dgm:pt modelId="{83417A64-8025-4DF4-B86A-F57A74BC2319}" type="pres">
-      <dgm:prSet presAssocID="{C4FE5C8C-C5F0-4202-9075-A3C4D79FB02C}" presName="hierRoot1" presStyleCnt="0"/>
-      <dgm:spPr/>
-    </dgm:pt>
-    <dgm:pt modelId="{7B6A031D-0D3E-438E-B9E0-D75CDB256A2A}" type="pres">
-      <dgm:prSet presAssocID="{C4FE5C8C-C5F0-4202-9075-A3C4D79FB02C}" presName="composite" presStyleCnt="0"/>
-      <dgm:spPr/>
-    </dgm:pt>
-    <dgm:pt modelId="{41AC87DF-859D-456D-8A0C-3F6E4C6AC6E1}" type="pres">
-      <dgm:prSet presAssocID="{C4FE5C8C-C5F0-4202-9075-A3C4D79FB02C}" presName="background" presStyleLbl="node0" presStyleIdx="0" presStyleCnt="1"/>
-      <dgm:spPr/>
-    </dgm:pt>
-    <dgm:pt modelId="{E2E2CEF2-EA91-467F-89EE-9810B62BA7DC}" type="pres">
-      <dgm:prSet presAssocID="{C4FE5C8C-C5F0-4202-9075-A3C4D79FB02C}" presName="text" presStyleLbl="fgAcc0" presStyleIdx="0" presStyleCnt="1">
-        <dgm:presLayoutVars>
-          <dgm:chPref val="3"/>
-        </dgm:presLayoutVars>
-      </dgm:prSet>
-      <dgm:spPr/>
       <dgm:t>
         <a:bodyPr/>
         <a:lstStyle/>
@@ -6643,112 +6880,20 @@
         </a:p>
       </dgm:t>
     </dgm:pt>
-    <dgm:pt modelId="{36221A64-3144-44B8-99A6-68A266EF2B82}" type="pres">
-      <dgm:prSet presAssocID="{C4FE5C8C-C5F0-4202-9075-A3C4D79FB02C}" presName="hierChild2" presStyleCnt="0"/>
-      <dgm:spPr/>
-    </dgm:pt>
-    <dgm:pt modelId="{62D384A6-4D1E-4C91-B86B-0AA0996C5D63}" type="pres">
-      <dgm:prSet presAssocID="{EDCF52CB-D464-4D7F-AB0F-B35D0BDA5651}" presName="Name10" presStyleLbl="parChTrans1D2" presStyleIdx="0" presStyleCnt="4"/>
-      <dgm:spPr/>
-    </dgm:pt>
-    <dgm:pt modelId="{8D5ABC5C-8523-4DCA-8C32-24BBA69B4EDE}" type="pres">
-      <dgm:prSet presAssocID="{A414F3A0-F3D0-48C7-BD5E-C973BD4DA5FC}" presName="hierRoot2" presStyleCnt="0"/>
-      <dgm:spPr/>
-    </dgm:pt>
-    <dgm:pt modelId="{63BABA2A-CF65-47F8-86BD-72F60CA1D893}" type="pres">
-      <dgm:prSet presAssocID="{A414F3A0-F3D0-48C7-BD5E-C973BD4DA5FC}" presName="composite2" presStyleCnt="0"/>
-      <dgm:spPr/>
-    </dgm:pt>
-    <dgm:pt modelId="{09A45363-90FF-410E-8416-5384626D2D19}" type="pres">
-      <dgm:prSet presAssocID="{A414F3A0-F3D0-48C7-BD5E-C973BD4DA5FC}" presName="background2" presStyleLbl="node2" presStyleIdx="0" presStyleCnt="4"/>
-      <dgm:spPr/>
-    </dgm:pt>
-    <dgm:pt modelId="{2A9EA194-D71D-4004-A3E0-9175E3AD804A}" type="pres">
-      <dgm:prSet presAssocID="{A414F3A0-F3D0-48C7-BD5E-C973BD4DA5FC}" presName="text2" presStyleLbl="fgAcc2" presStyleIdx="0" presStyleCnt="4">
-        <dgm:presLayoutVars>
-          <dgm:chPref val="3"/>
-        </dgm:presLayoutVars>
-      </dgm:prSet>
-      <dgm:spPr/>
-    </dgm:pt>
-    <dgm:pt modelId="{BACF521B-D0EA-45AC-BCD5-4B0551763555}" type="pres">
-      <dgm:prSet presAssocID="{A414F3A0-F3D0-48C7-BD5E-C973BD4DA5FC}" presName="hierChild3" presStyleCnt="0"/>
-      <dgm:spPr/>
-    </dgm:pt>
-    <dgm:pt modelId="{9CF20209-245F-4EDA-9764-33CBDD2D501E}" type="pres">
-      <dgm:prSet presAssocID="{434D147A-963A-4E4A-A913-C410E6C829B9}" presName="Name17" presStyleLbl="parChTrans1D3" presStyleIdx="0" presStyleCnt="7"/>
-      <dgm:spPr/>
-    </dgm:pt>
-    <dgm:pt modelId="{FE6A1CD9-5FE3-4FC4-9C1F-62E75B895081}" type="pres">
-      <dgm:prSet presAssocID="{DD351C4C-72E9-4E05-8DC7-951FBBE48B55}" presName="hierRoot3" presStyleCnt="0"/>
-      <dgm:spPr/>
-    </dgm:pt>
-    <dgm:pt modelId="{19AE87F5-4AF1-4B4D-A5B0-5B2B9B9BFD11}" type="pres">
-      <dgm:prSet presAssocID="{DD351C4C-72E9-4E05-8DC7-951FBBE48B55}" presName="composite3" presStyleCnt="0"/>
-      <dgm:spPr/>
-    </dgm:pt>
-    <dgm:pt modelId="{29A602F0-612B-4619-A605-81BEB9EB63EA}" type="pres">
-      <dgm:prSet presAssocID="{DD351C4C-72E9-4E05-8DC7-951FBBE48B55}" presName="background3" presStyleLbl="node3" presStyleIdx="0" presStyleCnt="7"/>
-      <dgm:spPr/>
-    </dgm:pt>
-    <dgm:pt modelId="{5ECD72DD-A15C-44EA-A5DF-3D6DCF4BF897}" type="pres">
-      <dgm:prSet presAssocID="{DD351C4C-72E9-4E05-8DC7-951FBBE48B55}" presName="text3" presStyleLbl="fgAcc3" presStyleIdx="0" presStyleCnt="7">
-        <dgm:presLayoutVars>
-          <dgm:chPref val="3"/>
-        </dgm:presLayoutVars>
-      </dgm:prSet>
-      <dgm:spPr/>
-    </dgm:pt>
-    <dgm:pt modelId="{DD40B91A-C0DA-45E7-97BA-D81EEFB59140}" type="pres">
-      <dgm:prSet presAssocID="{DD351C4C-72E9-4E05-8DC7-951FBBE48B55}" presName="hierChild4" presStyleCnt="0"/>
-      <dgm:spPr/>
-    </dgm:pt>
-    <dgm:pt modelId="{54298CE8-D607-4EF1-99DB-56E778E6E051}" type="pres">
-      <dgm:prSet presAssocID="{5B972C33-620B-4D06-A769-D30144C88AD2}" presName="Name17" presStyleLbl="parChTrans1D3" presStyleIdx="1" presStyleCnt="7"/>
-      <dgm:spPr/>
-    </dgm:pt>
-    <dgm:pt modelId="{C5C568B7-4B31-4058-B70E-14C261AFC65C}" type="pres">
-      <dgm:prSet presAssocID="{E176D4A6-23B1-45F8-8639-0521E74F02D8}" presName="hierRoot3" presStyleCnt="0"/>
-      <dgm:spPr/>
-    </dgm:pt>
-    <dgm:pt modelId="{634211A4-9E92-4BB3-AF06-C6AD4141FB5F}" type="pres">
-      <dgm:prSet presAssocID="{E176D4A6-23B1-45F8-8639-0521E74F02D8}" presName="composite3" presStyleCnt="0"/>
-      <dgm:spPr/>
-    </dgm:pt>
-    <dgm:pt modelId="{132DB6EA-FA51-4876-9DEE-F086ECA9C32A}" type="pres">
-      <dgm:prSet presAssocID="{E176D4A6-23B1-45F8-8639-0521E74F02D8}" presName="background3" presStyleLbl="node3" presStyleIdx="1" presStyleCnt="7"/>
-      <dgm:spPr/>
-    </dgm:pt>
-    <dgm:pt modelId="{D44BB619-B5EC-4378-9406-0D139ECCE68B}" type="pres">
-      <dgm:prSet presAssocID="{E176D4A6-23B1-45F8-8639-0521E74F02D8}" presName="text3" presStyleLbl="fgAcc3" presStyleIdx="1" presStyleCnt="7">
-        <dgm:presLayoutVars>
-          <dgm:chPref val="3"/>
-        </dgm:presLayoutVars>
-      </dgm:prSet>
-      <dgm:spPr/>
-    </dgm:pt>
-    <dgm:pt modelId="{A7CDD74C-E4F6-4390-8108-DFE87B8BF1F9}" type="pres">
-      <dgm:prSet presAssocID="{E176D4A6-23B1-45F8-8639-0521E74F02D8}" presName="hierChild4" presStyleCnt="0"/>
-      <dgm:spPr/>
-    </dgm:pt>
-    <dgm:pt modelId="{BBB183F3-7B4F-4580-9BC4-B55C041C5063}" type="pres">
-      <dgm:prSet presAssocID="{37196A59-8A05-408E-8081-A896B92CDAE6}" presName="Name10" presStyleLbl="parChTrans1D2" presStyleIdx="1" presStyleCnt="4"/>
-      <dgm:spPr/>
-    </dgm:pt>
-    <dgm:pt modelId="{112C5BD5-BD42-47B2-A653-FADBD6E845E6}" type="pres">
-      <dgm:prSet presAssocID="{50E80EE0-A4DD-47C0-AF86-36F5A9425CC3}" presName="hierRoot2" presStyleCnt="0"/>
-      <dgm:spPr/>
-    </dgm:pt>
-    <dgm:pt modelId="{17965762-7990-49E1-9686-86B4DBEDE020}" type="pres">
-      <dgm:prSet presAssocID="{50E80EE0-A4DD-47C0-AF86-36F5A9425CC3}" presName="composite2" presStyleCnt="0"/>
-      <dgm:spPr/>
-    </dgm:pt>
-    <dgm:pt modelId="{231F7E50-8598-4090-9D1C-14CBCB0AC042}" type="pres">
-      <dgm:prSet presAssocID="{50E80EE0-A4DD-47C0-AF86-36F5A9425CC3}" presName="background2" presStyleLbl="node2" presStyleIdx="1" presStyleCnt="4"/>
-      <dgm:spPr/>
-    </dgm:pt>
-    <dgm:pt modelId="{892C6C42-5060-433C-9DD2-2286DE0167C2}" type="pres">
-      <dgm:prSet presAssocID="{50E80EE0-A4DD-47C0-AF86-36F5A9425CC3}" presName="text2" presStyleLbl="fgAcc2" presStyleIdx="1" presStyleCnt="4">
+    <dgm:pt modelId="{83417A64-8025-4DF4-B86A-F57A74BC2319}" type="pres">
+      <dgm:prSet presAssocID="{C4FE5C8C-C5F0-4202-9075-A3C4D79FB02C}" presName="hierRoot1" presStyleCnt="0"/>
+      <dgm:spPr/>
+    </dgm:pt>
+    <dgm:pt modelId="{7B6A031D-0D3E-438E-B9E0-D75CDB256A2A}" type="pres">
+      <dgm:prSet presAssocID="{C4FE5C8C-C5F0-4202-9075-A3C4D79FB02C}" presName="composite" presStyleCnt="0"/>
+      <dgm:spPr/>
+    </dgm:pt>
+    <dgm:pt modelId="{41AC87DF-859D-456D-8A0C-3F6E4C6AC6E1}" type="pres">
+      <dgm:prSet presAssocID="{C4FE5C8C-C5F0-4202-9075-A3C4D79FB02C}" presName="background" presStyleLbl="node0" presStyleIdx="0" presStyleCnt="1"/>
+      <dgm:spPr/>
+    </dgm:pt>
+    <dgm:pt modelId="{E2E2CEF2-EA91-467F-89EE-9810B62BA7DC}" type="pres">
+      <dgm:prSet presAssocID="{C4FE5C8C-C5F0-4202-9075-A3C4D79FB02C}" presName="text" presStyleLbl="fgAcc0" presStyleIdx="0" presStyleCnt="1">
         <dgm:presLayoutVars>
           <dgm:chPref val="3"/>
         </dgm:presLayoutVars>
@@ -6762,60 +6907,12 @@
         </a:p>
       </dgm:t>
     </dgm:pt>
-    <dgm:pt modelId="{1189B2E4-39F2-44A1-9D4F-3975D0BEF01C}" type="pres">
-      <dgm:prSet presAssocID="{50E80EE0-A4DD-47C0-AF86-36F5A9425CC3}" presName="hierChild3" presStyleCnt="0"/>
-      <dgm:spPr/>
-    </dgm:pt>
-    <dgm:pt modelId="{1B3ED58B-D34A-44D0-9577-E58646AC7A19}" type="pres">
-      <dgm:prSet presAssocID="{D4830123-865B-406D-A862-C0D16419462C}" presName="Name17" presStyleLbl="parChTrans1D3" presStyleIdx="2" presStyleCnt="7"/>
-      <dgm:spPr/>
-    </dgm:pt>
-    <dgm:pt modelId="{581384E6-7AA1-4B74-9627-C312197539F5}" type="pres">
-      <dgm:prSet presAssocID="{CF02CACD-5214-4A46-984B-DC32F543FA4D}" presName="hierRoot3" presStyleCnt="0"/>
-      <dgm:spPr/>
-    </dgm:pt>
-    <dgm:pt modelId="{9EB78029-A669-4040-B0A8-171710DA6489}" type="pres">
-      <dgm:prSet presAssocID="{CF02CACD-5214-4A46-984B-DC32F543FA4D}" presName="composite3" presStyleCnt="0"/>
-      <dgm:spPr/>
-    </dgm:pt>
-    <dgm:pt modelId="{B3CC3B55-A248-479E-BDA0-8B119091B116}" type="pres">
-      <dgm:prSet presAssocID="{CF02CACD-5214-4A46-984B-DC32F543FA4D}" presName="background3" presStyleLbl="node3" presStyleIdx="2" presStyleCnt="7"/>
-      <dgm:spPr/>
-    </dgm:pt>
-    <dgm:pt modelId="{11628CE3-4FE4-4A63-9E6F-3C23CDD49E54}" type="pres">
-      <dgm:prSet presAssocID="{CF02CACD-5214-4A46-984B-DC32F543FA4D}" presName="text3" presStyleLbl="fgAcc3" presStyleIdx="2" presStyleCnt="7">
-        <dgm:presLayoutVars>
-          <dgm:chPref val="3"/>
-        </dgm:presLayoutVars>
-      </dgm:prSet>
-      <dgm:spPr/>
-    </dgm:pt>
-    <dgm:pt modelId="{8AA88BF0-E0C4-413C-80B9-BD3E2F4FECB1}" type="pres">
-      <dgm:prSet presAssocID="{CF02CACD-5214-4A46-984B-DC32F543FA4D}" presName="hierChild4" presStyleCnt="0"/>
-      <dgm:spPr/>
-    </dgm:pt>
-    <dgm:pt modelId="{F11E8542-670B-4C31-9321-CE1749F6A240}" type="pres">
-      <dgm:prSet presAssocID="{59E1F62D-6E5A-4033-A063-F00BE8A36645}" presName="Name10" presStyleLbl="parChTrans1D2" presStyleIdx="2" presStyleCnt="4"/>
-      <dgm:spPr/>
-    </dgm:pt>
-    <dgm:pt modelId="{EBBD0B80-74ED-4AB2-9005-4A8E53EB22CA}" type="pres">
-      <dgm:prSet presAssocID="{4AFA0BCF-3F76-4A9E-9664-7040D9CE0684}" presName="hierRoot2" presStyleCnt="0"/>
-      <dgm:spPr/>
-    </dgm:pt>
-    <dgm:pt modelId="{938A9991-E987-46BF-8CEC-C8A77EA834C0}" type="pres">
-      <dgm:prSet presAssocID="{4AFA0BCF-3F76-4A9E-9664-7040D9CE0684}" presName="composite2" presStyleCnt="0"/>
-      <dgm:spPr/>
-    </dgm:pt>
-    <dgm:pt modelId="{98BFD3C5-31B2-4AA9-90B8-E09186227960}" type="pres">
-      <dgm:prSet presAssocID="{4AFA0BCF-3F76-4A9E-9664-7040D9CE0684}" presName="background2" presStyleLbl="node2" presStyleIdx="2" presStyleCnt="4"/>
-      <dgm:spPr/>
-    </dgm:pt>
-    <dgm:pt modelId="{1EB26671-3605-41EF-81D5-2B5EC94C22CD}" type="pres">
-      <dgm:prSet presAssocID="{4AFA0BCF-3F76-4A9E-9664-7040D9CE0684}" presName="text2" presStyleLbl="fgAcc2" presStyleIdx="2" presStyleCnt="4">
-        <dgm:presLayoutVars>
-          <dgm:chPref val="3"/>
-        </dgm:presLayoutVars>
-      </dgm:prSet>
+    <dgm:pt modelId="{36221A64-3144-44B8-99A6-68A266EF2B82}" type="pres">
+      <dgm:prSet presAssocID="{C4FE5C8C-C5F0-4202-9075-A3C4D79FB02C}" presName="hierChild2" presStyleCnt="0"/>
+      <dgm:spPr/>
+    </dgm:pt>
+    <dgm:pt modelId="{62D384A6-4D1E-4C91-B86B-0AA0996C5D63}" type="pres">
+      <dgm:prSet presAssocID="{EDCF52CB-D464-4D7F-AB0F-B35D0BDA5651}" presName="Name10" presStyleLbl="parChTrans1D2" presStyleIdx="0" presStyleCnt="4"/>
       <dgm:spPr/>
       <dgm:t>
         <a:bodyPr/>
@@ -6825,56 +6922,20 @@
         </a:p>
       </dgm:t>
     </dgm:pt>
-    <dgm:pt modelId="{97E4EB3B-9066-4CE5-A7B4-4DFBBCFE1302}" type="pres">
-      <dgm:prSet presAssocID="{4AFA0BCF-3F76-4A9E-9664-7040D9CE0684}" presName="hierChild3" presStyleCnt="0"/>
-      <dgm:spPr/>
-    </dgm:pt>
-    <dgm:pt modelId="{46137AA4-6786-4C01-A081-9B0DA8B28B5C}" type="pres">
-      <dgm:prSet presAssocID="{9FC1897A-6480-485D-9E7D-048D0DD3ED34}" presName="Name17" presStyleLbl="parChTrans1D3" presStyleIdx="3" presStyleCnt="7"/>
-      <dgm:spPr/>
-    </dgm:pt>
-    <dgm:pt modelId="{2133F7F7-C7BB-47DD-935C-1CB94D7D1D72}" type="pres">
-      <dgm:prSet presAssocID="{1D83D59B-98DC-4BA5-9FD2-E98B9B1E3ACD}" presName="hierRoot3" presStyleCnt="0"/>
-      <dgm:spPr/>
-    </dgm:pt>
-    <dgm:pt modelId="{22C0B05D-7E0E-4467-973B-15DB4E1F4FDB}" type="pres">
-      <dgm:prSet presAssocID="{1D83D59B-98DC-4BA5-9FD2-E98B9B1E3ACD}" presName="composite3" presStyleCnt="0"/>
-      <dgm:spPr/>
-    </dgm:pt>
-    <dgm:pt modelId="{93EBB00C-A530-4F32-97E6-709AFD6597E9}" type="pres">
-      <dgm:prSet presAssocID="{1D83D59B-98DC-4BA5-9FD2-E98B9B1E3ACD}" presName="background3" presStyleLbl="node3" presStyleIdx="3" presStyleCnt="7"/>
-      <dgm:spPr/>
-    </dgm:pt>
-    <dgm:pt modelId="{AA9179AC-72FA-4C01-BB7C-497E14465A99}" type="pres">
-      <dgm:prSet presAssocID="{1D83D59B-98DC-4BA5-9FD2-E98B9B1E3ACD}" presName="text3" presStyleLbl="fgAcc3" presStyleIdx="3" presStyleCnt="7">
-        <dgm:presLayoutVars>
-          <dgm:chPref val="3"/>
-        </dgm:presLayoutVars>
-      </dgm:prSet>
-      <dgm:spPr/>
-    </dgm:pt>
-    <dgm:pt modelId="{65D38ABD-5032-4336-90C5-AD39582B773A}" type="pres">
-      <dgm:prSet presAssocID="{1D83D59B-98DC-4BA5-9FD2-E98B9B1E3ACD}" presName="hierChild4" presStyleCnt="0"/>
-      <dgm:spPr/>
-    </dgm:pt>
-    <dgm:pt modelId="{94272433-050F-47EA-8C1B-9FE85CA17316}" type="pres">
-      <dgm:prSet presAssocID="{28C6D3A4-CFA9-44A4-91EF-9DEE449B54FD}" presName="Name17" presStyleLbl="parChTrans1D3" presStyleIdx="4" presStyleCnt="7"/>
-      <dgm:spPr/>
-    </dgm:pt>
-    <dgm:pt modelId="{2C32728B-C044-4E88-8550-40BDB2B05BEC}" type="pres">
-      <dgm:prSet presAssocID="{1FE07398-AF54-4D97-975B-A3A2C0058016}" presName="hierRoot3" presStyleCnt="0"/>
-      <dgm:spPr/>
-    </dgm:pt>
-    <dgm:pt modelId="{BE80245C-1D7C-4FD4-BBE9-A45ED316A1AC}" type="pres">
-      <dgm:prSet presAssocID="{1FE07398-AF54-4D97-975B-A3A2C0058016}" presName="composite3" presStyleCnt="0"/>
-      <dgm:spPr/>
-    </dgm:pt>
-    <dgm:pt modelId="{154431B7-4955-47E2-A31C-EF26EDFC279C}" type="pres">
-      <dgm:prSet presAssocID="{1FE07398-AF54-4D97-975B-A3A2C0058016}" presName="background3" presStyleLbl="node3" presStyleIdx="4" presStyleCnt="7"/>
-      <dgm:spPr/>
-    </dgm:pt>
-    <dgm:pt modelId="{6615E3C8-E1E4-4C77-8C60-867150195CF6}" type="pres">
-      <dgm:prSet presAssocID="{1FE07398-AF54-4D97-975B-A3A2C0058016}" presName="text3" presStyleLbl="fgAcc3" presStyleIdx="4" presStyleCnt="7">
+    <dgm:pt modelId="{8D5ABC5C-8523-4DCA-8C32-24BBA69B4EDE}" type="pres">
+      <dgm:prSet presAssocID="{A414F3A0-F3D0-48C7-BD5E-C973BD4DA5FC}" presName="hierRoot2" presStyleCnt="0"/>
+      <dgm:spPr/>
+    </dgm:pt>
+    <dgm:pt modelId="{63BABA2A-CF65-47F8-86BD-72F60CA1D893}" type="pres">
+      <dgm:prSet presAssocID="{A414F3A0-F3D0-48C7-BD5E-C973BD4DA5FC}" presName="composite2" presStyleCnt="0"/>
+      <dgm:spPr/>
+    </dgm:pt>
+    <dgm:pt modelId="{09A45363-90FF-410E-8416-5384626D2D19}" type="pres">
+      <dgm:prSet presAssocID="{A414F3A0-F3D0-48C7-BD5E-C973BD4DA5FC}" presName="background2" presStyleLbl="node2" presStyleIdx="0" presStyleCnt="4"/>
+      <dgm:spPr/>
+    </dgm:pt>
+    <dgm:pt modelId="{2A9EA194-D71D-4004-A3E0-9175E3AD804A}" type="pres">
+      <dgm:prSet presAssocID="{A414F3A0-F3D0-48C7-BD5E-C973BD4DA5FC}" presName="text2" presStyleLbl="fgAcc2" presStyleIdx="0" presStyleCnt="4">
         <dgm:presLayoutVars>
           <dgm:chPref val="3"/>
         </dgm:presLayoutVars>
@@ -6888,60 +6949,12 @@
         </a:p>
       </dgm:t>
     </dgm:pt>
-    <dgm:pt modelId="{65461300-E252-43A6-A66A-70E5847216DB}" type="pres">
-      <dgm:prSet presAssocID="{1FE07398-AF54-4D97-975B-A3A2C0058016}" presName="hierChild4" presStyleCnt="0"/>
-      <dgm:spPr/>
-    </dgm:pt>
-    <dgm:pt modelId="{536711E3-A80A-449E-B48D-F5FC6634461D}" type="pres">
-      <dgm:prSet presAssocID="{4EAE041A-2C1A-4B18-B2B8-BF22937FB36B}" presName="Name17" presStyleLbl="parChTrans1D3" presStyleIdx="5" presStyleCnt="7"/>
-      <dgm:spPr/>
-    </dgm:pt>
-    <dgm:pt modelId="{3408C42B-3A85-4734-A553-0D94E149DB9E}" type="pres">
-      <dgm:prSet presAssocID="{B08EDF0A-F286-4E82-8065-3B0AC5E4D9A5}" presName="hierRoot3" presStyleCnt="0"/>
-      <dgm:spPr/>
-    </dgm:pt>
-    <dgm:pt modelId="{8B8AA2C8-1281-41EA-BC1E-7726824782D8}" type="pres">
-      <dgm:prSet presAssocID="{B08EDF0A-F286-4E82-8065-3B0AC5E4D9A5}" presName="composite3" presStyleCnt="0"/>
-      <dgm:spPr/>
-    </dgm:pt>
-    <dgm:pt modelId="{6AE09336-FD27-4347-B366-7BAEBB03AE82}" type="pres">
-      <dgm:prSet presAssocID="{B08EDF0A-F286-4E82-8065-3B0AC5E4D9A5}" presName="background3" presStyleLbl="node3" presStyleIdx="5" presStyleCnt="7"/>
-      <dgm:spPr/>
-    </dgm:pt>
-    <dgm:pt modelId="{4873AE97-C020-4FCC-85D0-2A8AA08A1EE7}" type="pres">
-      <dgm:prSet presAssocID="{B08EDF0A-F286-4E82-8065-3B0AC5E4D9A5}" presName="text3" presStyleLbl="fgAcc3" presStyleIdx="5" presStyleCnt="7">
-        <dgm:presLayoutVars>
-          <dgm:chPref val="3"/>
-        </dgm:presLayoutVars>
-      </dgm:prSet>
-      <dgm:spPr/>
-    </dgm:pt>
-    <dgm:pt modelId="{520D8464-459F-4286-8FCD-C6F30C7FD64B}" type="pres">
-      <dgm:prSet presAssocID="{B08EDF0A-F286-4E82-8065-3B0AC5E4D9A5}" presName="hierChild4" presStyleCnt="0"/>
-      <dgm:spPr/>
-    </dgm:pt>
-    <dgm:pt modelId="{99053230-842C-47DC-A3CE-0DFCE161DD0D}" type="pres">
-      <dgm:prSet presAssocID="{5757562E-EC33-4594-94F4-7E7D4C8D111E}" presName="Name10" presStyleLbl="parChTrans1D2" presStyleIdx="3" presStyleCnt="4"/>
-      <dgm:spPr/>
-    </dgm:pt>
-    <dgm:pt modelId="{691731E6-AF1D-492F-ABC5-594956B61865}" type="pres">
-      <dgm:prSet presAssocID="{D78D3523-5030-4AF5-8C8A-63ABEC2E528E}" presName="hierRoot2" presStyleCnt="0"/>
-      <dgm:spPr/>
-    </dgm:pt>
-    <dgm:pt modelId="{B3FA8080-CC01-4ACE-A7F5-3857FCC58138}" type="pres">
-      <dgm:prSet presAssocID="{D78D3523-5030-4AF5-8C8A-63ABEC2E528E}" presName="composite2" presStyleCnt="0"/>
-      <dgm:spPr/>
-    </dgm:pt>
-    <dgm:pt modelId="{94B1AC97-30F1-499E-A7B4-B87DDBE371B1}" type="pres">
-      <dgm:prSet presAssocID="{D78D3523-5030-4AF5-8C8A-63ABEC2E528E}" presName="background2" presStyleLbl="node2" presStyleIdx="3" presStyleCnt="4"/>
-      <dgm:spPr/>
-    </dgm:pt>
-    <dgm:pt modelId="{665FF436-E6A1-4DEF-B412-BDBD9FCFA2A2}" type="pres">
-      <dgm:prSet presAssocID="{D78D3523-5030-4AF5-8C8A-63ABEC2E528E}" presName="text2" presStyleLbl="fgAcc2" presStyleIdx="3" presStyleCnt="4">
-        <dgm:presLayoutVars>
-          <dgm:chPref val="3"/>
-        </dgm:presLayoutVars>
-      </dgm:prSet>
+    <dgm:pt modelId="{BACF521B-D0EA-45AC-BCD5-4B0551763555}" type="pres">
+      <dgm:prSet presAssocID="{A414F3A0-F3D0-48C7-BD5E-C973BD4DA5FC}" presName="hierChild3" presStyleCnt="0"/>
+      <dgm:spPr/>
+    </dgm:pt>
+    <dgm:pt modelId="{9CF20209-245F-4EDA-9764-33CBDD2D501E}" type="pres">
+      <dgm:prSet presAssocID="{434D147A-963A-4E4A-A913-C410E6C829B9}" presName="Name17" presStyleLbl="parChTrans1D3" presStyleIdx="0" presStyleCnt="9"/>
       <dgm:spPr/>
       <dgm:t>
         <a:bodyPr/>
@@ -6951,28 +6964,20 @@
         </a:p>
       </dgm:t>
     </dgm:pt>
-    <dgm:pt modelId="{7DBEE065-21FC-4AA6-9032-5EC60D6E2F68}" type="pres">
-      <dgm:prSet presAssocID="{D78D3523-5030-4AF5-8C8A-63ABEC2E528E}" presName="hierChild3" presStyleCnt="0"/>
-      <dgm:spPr/>
-    </dgm:pt>
-    <dgm:pt modelId="{15393D26-DABA-4FB9-90DA-2700D2CCBB60}" type="pres">
-      <dgm:prSet presAssocID="{4A16BB1F-0A33-48F0-B90E-7BDB067E5DBF}" presName="Name17" presStyleLbl="parChTrans1D3" presStyleIdx="6" presStyleCnt="7"/>
-      <dgm:spPr/>
-    </dgm:pt>
-    <dgm:pt modelId="{B8B13942-BA20-49EB-80D5-A1F1D20781DD}" type="pres">
-      <dgm:prSet presAssocID="{1268D9A6-1C5D-4525-8BCE-F95BA0099FE2}" presName="hierRoot3" presStyleCnt="0"/>
-      <dgm:spPr/>
-    </dgm:pt>
-    <dgm:pt modelId="{C94059DB-2AE1-4D47-B234-1EDCC19D1D45}" type="pres">
-      <dgm:prSet presAssocID="{1268D9A6-1C5D-4525-8BCE-F95BA0099FE2}" presName="composite3" presStyleCnt="0"/>
-      <dgm:spPr/>
-    </dgm:pt>
-    <dgm:pt modelId="{3C69D9D9-0BEA-4613-A5F4-B78C8A66307D}" type="pres">
-      <dgm:prSet presAssocID="{1268D9A6-1C5D-4525-8BCE-F95BA0099FE2}" presName="background3" presStyleLbl="node3" presStyleIdx="6" presStyleCnt="7"/>
-      <dgm:spPr/>
-    </dgm:pt>
-    <dgm:pt modelId="{DDC8F10D-32D0-48B7-9A78-9483E263C534}" type="pres">
-      <dgm:prSet presAssocID="{1268D9A6-1C5D-4525-8BCE-F95BA0099FE2}" presName="text3" presStyleLbl="fgAcc3" presStyleIdx="6" presStyleCnt="7">
+    <dgm:pt modelId="{FE6A1CD9-5FE3-4FC4-9C1F-62E75B895081}" type="pres">
+      <dgm:prSet presAssocID="{DD351C4C-72E9-4E05-8DC7-951FBBE48B55}" presName="hierRoot3" presStyleCnt="0"/>
+      <dgm:spPr/>
+    </dgm:pt>
+    <dgm:pt modelId="{19AE87F5-4AF1-4B4D-A5B0-5B2B9B9BFD11}" type="pres">
+      <dgm:prSet presAssocID="{DD351C4C-72E9-4E05-8DC7-951FBBE48B55}" presName="composite3" presStyleCnt="0"/>
+      <dgm:spPr/>
+    </dgm:pt>
+    <dgm:pt modelId="{29A602F0-612B-4619-A605-81BEB9EB63EA}" type="pres">
+      <dgm:prSet presAssocID="{DD351C4C-72E9-4E05-8DC7-951FBBE48B55}" presName="background3" presStyleLbl="node3" presStyleIdx="0" presStyleCnt="9"/>
+      <dgm:spPr/>
+    </dgm:pt>
+    <dgm:pt modelId="{5ECD72DD-A15C-44EA-A5DF-3D6DCF4BF897}" type="pres">
+      <dgm:prSet presAssocID="{DD351C4C-72E9-4E05-8DC7-951FBBE48B55}" presName="text3" presStyleLbl="fgAcc3" presStyleIdx="0" presStyleCnt="9">
         <dgm:presLayoutVars>
           <dgm:chPref val="3"/>
         </dgm:presLayoutVars>
@@ -6986,48 +6991,502 @@
         </a:p>
       </dgm:t>
     </dgm:pt>
+    <dgm:pt modelId="{DD40B91A-C0DA-45E7-97BA-D81EEFB59140}" type="pres">
+      <dgm:prSet presAssocID="{DD351C4C-72E9-4E05-8DC7-951FBBE48B55}" presName="hierChild4" presStyleCnt="0"/>
+      <dgm:spPr/>
+    </dgm:pt>
+    <dgm:pt modelId="{54298CE8-D607-4EF1-99DB-56E778E6E051}" type="pres">
+      <dgm:prSet presAssocID="{5B972C33-620B-4D06-A769-D30144C88AD2}" presName="Name17" presStyleLbl="parChTrans1D3" presStyleIdx="1" presStyleCnt="9"/>
+      <dgm:spPr/>
+      <dgm:t>
+        <a:bodyPr/>
+        <a:lstStyle/>
+        <a:p>
+          <a:endParaRPr lang="en-US"/>
+        </a:p>
+      </dgm:t>
+    </dgm:pt>
+    <dgm:pt modelId="{C5C568B7-4B31-4058-B70E-14C261AFC65C}" type="pres">
+      <dgm:prSet presAssocID="{E176D4A6-23B1-45F8-8639-0521E74F02D8}" presName="hierRoot3" presStyleCnt="0"/>
+      <dgm:spPr/>
+    </dgm:pt>
+    <dgm:pt modelId="{634211A4-9E92-4BB3-AF06-C6AD4141FB5F}" type="pres">
+      <dgm:prSet presAssocID="{E176D4A6-23B1-45F8-8639-0521E74F02D8}" presName="composite3" presStyleCnt="0"/>
+      <dgm:spPr/>
+    </dgm:pt>
+    <dgm:pt modelId="{132DB6EA-FA51-4876-9DEE-F086ECA9C32A}" type="pres">
+      <dgm:prSet presAssocID="{E176D4A6-23B1-45F8-8639-0521E74F02D8}" presName="background3" presStyleLbl="node3" presStyleIdx="1" presStyleCnt="9"/>
+      <dgm:spPr/>
+    </dgm:pt>
+    <dgm:pt modelId="{D44BB619-B5EC-4378-9406-0D139ECCE68B}" type="pres">
+      <dgm:prSet presAssocID="{E176D4A6-23B1-45F8-8639-0521E74F02D8}" presName="text3" presStyleLbl="fgAcc3" presStyleIdx="1" presStyleCnt="9">
+        <dgm:presLayoutVars>
+          <dgm:chPref val="3"/>
+        </dgm:presLayoutVars>
+      </dgm:prSet>
+      <dgm:spPr/>
+      <dgm:t>
+        <a:bodyPr/>
+        <a:lstStyle/>
+        <a:p>
+          <a:endParaRPr lang="en-US"/>
+        </a:p>
+      </dgm:t>
+    </dgm:pt>
+    <dgm:pt modelId="{A7CDD74C-E4F6-4390-8108-DFE87B8BF1F9}" type="pres">
+      <dgm:prSet presAssocID="{E176D4A6-23B1-45F8-8639-0521E74F02D8}" presName="hierChild4" presStyleCnt="0"/>
+      <dgm:spPr/>
+    </dgm:pt>
+    <dgm:pt modelId="{BBB183F3-7B4F-4580-9BC4-B55C041C5063}" type="pres">
+      <dgm:prSet presAssocID="{37196A59-8A05-408E-8081-A896B92CDAE6}" presName="Name10" presStyleLbl="parChTrans1D2" presStyleIdx="1" presStyleCnt="4"/>
+      <dgm:spPr/>
+      <dgm:t>
+        <a:bodyPr/>
+        <a:lstStyle/>
+        <a:p>
+          <a:endParaRPr lang="en-US"/>
+        </a:p>
+      </dgm:t>
+    </dgm:pt>
+    <dgm:pt modelId="{112C5BD5-BD42-47B2-A653-FADBD6E845E6}" type="pres">
+      <dgm:prSet presAssocID="{50E80EE0-A4DD-47C0-AF86-36F5A9425CC3}" presName="hierRoot2" presStyleCnt="0"/>
+      <dgm:spPr/>
+    </dgm:pt>
+    <dgm:pt modelId="{17965762-7990-49E1-9686-86B4DBEDE020}" type="pres">
+      <dgm:prSet presAssocID="{50E80EE0-A4DD-47C0-AF86-36F5A9425CC3}" presName="composite2" presStyleCnt="0"/>
+      <dgm:spPr/>
+    </dgm:pt>
+    <dgm:pt modelId="{231F7E50-8598-4090-9D1C-14CBCB0AC042}" type="pres">
+      <dgm:prSet presAssocID="{50E80EE0-A4DD-47C0-AF86-36F5A9425CC3}" presName="background2" presStyleLbl="node2" presStyleIdx="1" presStyleCnt="4"/>
+      <dgm:spPr/>
+    </dgm:pt>
+    <dgm:pt modelId="{892C6C42-5060-433C-9DD2-2286DE0167C2}" type="pres">
+      <dgm:prSet presAssocID="{50E80EE0-A4DD-47C0-AF86-36F5A9425CC3}" presName="text2" presStyleLbl="fgAcc2" presStyleIdx="1" presStyleCnt="4">
+        <dgm:presLayoutVars>
+          <dgm:chPref val="3"/>
+        </dgm:presLayoutVars>
+      </dgm:prSet>
+      <dgm:spPr/>
+      <dgm:t>
+        <a:bodyPr/>
+        <a:lstStyle/>
+        <a:p>
+          <a:endParaRPr lang="en-US"/>
+        </a:p>
+      </dgm:t>
+    </dgm:pt>
+    <dgm:pt modelId="{1189B2E4-39F2-44A1-9D4F-3975D0BEF01C}" type="pres">
+      <dgm:prSet presAssocID="{50E80EE0-A4DD-47C0-AF86-36F5A9425CC3}" presName="hierChild3" presStyleCnt="0"/>
+      <dgm:spPr/>
+    </dgm:pt>
+    <dgm:pt modelId="{1B3ED58B-D34A-44D0-9577-E58646AC7A19}" type="pres">
+      <dgm:prSet presAssocID="{D4830123-865B-406D-A862-C0D16419462C}" presName="Name17" presStyleLbl="parChTrans1D3" presStyleIdx="2" presStyleCnt="9"/>
+      <dgm:spPr/>
+      <dgm:t>
+        <a:bodyPr/>
+        <a:lstStyle/>
+        <a:p>
+          <a:endParaRPr lang="en-US"/>
+        </a:p>
+      </dgm:t>
+    </dgm:pt>
+    <dgm:pt modelId="{581384E6-7AA1-4B74-9627-C312197539F5}" type="pres">
+      <dgm:prSet presAssocID="{CF02CACD-5214-4A46-984B-DC32F543FA4D}" presName="hierRoot3" presStyleCnt="0"/>
+      <dgm:spPr/>
+    </dgm:pt>
+    <dgm:pt modelId="{9EB78029-A669-4040-B0A8-171710DA6489}" type="pres">
+      <dgm:prSet presAssocID="{CF02CACD-5214-4A46-984B-DC32F543FA4D}" presName="composite3" presStyleCnt="0"/>
+      <dgm:spPr/>
+    </dgm:pt>
+    <dgm:pt modelId="{B3CC3B55-A248-479E-BDA0-8B119091B116}" type="pres">
+      <dgm:prSet presAssocID="{CF02CACD-5214-4A46-984B-DC32F543FA4D}" presName="background3" presStyleLbl="node3" presStyleIdx="2" presStyleCnt="9"/>
+      <dgm:spPr/>
+    </dgm:pt>
+    <dgm:pt modelId="{11628CE3-4FE4-4A63-9E6F-3C23CDD49E54}" type="pres">
+      <dgm:prSet presAssocID="{CF02CACD-5214-4A46-984B-DC32F543FA4D}" presName="text3" presStyleLbl="fgAcc3" presStyleIdx="2" presStyleCnt="9">
+        <dgm:presLayoutVars>
+          <dgm:chPref val="3"/>
+        </dgm:presLayoutVars>
+      </dgm:prSet>
+      <dgm:spPr/>
+      <dgm:t>
+        <a:bodyPr/>
+        <a:lstStyle/>
+        <a:p>
+          <a:endParaRPr lang="en-US"/>
+        </a:p>
+      </dgm:t>
+    </dgm:pt>
+    <dgm:pt modelId="{8AA88BF0-E0C4-413C-80B9-BD3E2F4FECB1}" type="pres">
+      <dgm:prSet presAssocID="{CF02CACD-5214-4A46-984B-DC32F543FA4D}" presName="hierChild4" presStyleCnt="0"/>
+      <dgm:spPr/>
+    </dgm:pt>
+    <dgm:pt modelId="{8CF190DC-55BF-4F5C-9A2F-88258F63CAFE}" type="pres">
+      <dgm:prSet presAssocID="{053C239E-BF2B-45C5-A2D7-9A14D0E866A3}" presName="Name17" presStyleLbl="parChTrans1D3" presStyleIdx="3" presStyleCnt="9"/>
+      <dgm:spPr/>
+    </dgm:pt>
+    <dgm:pt modelId="{84A5E146-83F6-49C2-89E3-A1AD808C63AE}" type="pres">
+      <dgm:prSet presAssocID="{63C696C5-07BD-420C-8016-3E5DDE8B8832}" presName="hierRoot3" presStyleCnt="0"/>
+      <dgm:spPr/>
+    </dgm:pt>
+    <dgm:pt modelId="{3B89A7C7-87BD-457E-A0F8-9C99F65E84BF}" type="pres">
+      <dgm:prSet presAssocID="{63C696C5-07BD-420C-8016-3E5DDE8B8832}" presName="composite3" presStyleCnt="0"/>
+      <dgm:spPr/>
+    </dgm:pt>
+    <dgm:pt modelId="{1A89049A-5504-430F-8BF5-7C03D6330046}" type="pres">
+      <dgm:prSet presAssocID="{63C696C5-07BD-420C-8016-3E5DDE8B8832}" presName="background3" presStyleLbl="node3" presStyleIdx="3" presStyleCnt="9"/>
+      <dgm:spPr/>
+    </dgm:pt>
+    <dgm:pt modelId="{190029D3-CF5D-4F20-906E-7ABEAD252E9E}" type="pres">
+      <dgm:prSet presAssocID="{63C696C5-07BD-420C-8016-3E5DDE8B8832}" presName="text3" presStyleLbl="fgAcc3" presStyleIdx="3" presStyleCnt="9">
+        <dgm:presLayoutVars>
+          <dgm:chPref val="3"/>
+        </dgm:presLayoutVars>
+      </dgm:prSet>
+      <dgm:spPr/>
+      <dgm:t>
+        <a:bodyPr/>
+        <a:lstStyle/>
+        <a:p>
+          <a:endParaRPr lang="en-US"/>
+        </a:p>
+      </dgm:t>
+    </dgm:pt>
+    <dgm:pt modelId="{65F9DBE1-9979-41AB-8747-7C4F4F19D3CA}" type="pres">
+      <dgm:prSet presAssocID="{63C696C5-07BD-420C-8016-3E5DDE8B8832}" presName="hierChild4" presStyleCnt="0"/>
+      <dgm:spPr/>
+    </dgm:pt>
+    <dgm:pt modelId="{F11E8542-670B-4C31-9321-CE1749F6A240}" type="pres">
+      <dgm:prSet presAssocID="{59E1F62D-6E5A-4033-A063-F00BE8A36645}" presName="Name10" presStyleLbl="parChTrans1D2" presStyleIdx="2" presStyleCnt="4"/>
+      <dgm:spPr/>
+      <dgm:t>
+        <a:bodyPr/>
+        <a:lstStyle/>
+        <a:p>
+          <a:endParaRPr lang="en-US"/>
+        </a:p>
+      </dgm:t>
+    </dgm:pt>
+    <dgm:pt modelId="{EBBD0B80-74ED-4AB2-9005-4A8E53EB22CA}" type="pres">
+      <dgm:prSet presAssocID="{4AFA0BCF-3F76-4A9E-9664-7040D9CE0684}" presName="hierRoot2" presStyleCnt="0"/>
+      <dgm:spPr/>
+    </dgm:pt>
+    <dgm:pt modelId="{938A9991-E987-46BF-8CEC-C8A77EA834C0}" type="pres">
+      <dgm:prSet presAssocID="{4AFA0BCF-3F76-4A9E-9664-7040D9CE0684}" presName="composite2" presStyleCnt="0"/>
+      <dgm:spPr/>
+    </dgm:pt>
+    <dgm:pt modelId="{98BFD3C5-31B2-4AA9-90B8-E09186227960}" type="pres">
+      <dgm:prSet presAssocID="{4AFA0BCF-3F76-4A9E-9664-7040D9CE0684}" presName="background2" presStyleLbl="node2" presStyleIdx="2" presStyleCnt="4"/>
+      <dgm:spPr/>
+    </dgm:pt>
+    <dgm:pt modelId="{1EB26671-3605-41EF-81D5-2B5EC94C22CD}" type="pres">
+      <dgm:prSet presAssocID="{4AFA0BCF-3F76-4A9E-9664-7040D9CE0684}" presName="text2" presStyleLbl="fgAcc2" presStyleIdx="2" presStyleCnt="4">
+        <dgm:presLayoutVars>
+          <dgm:chPref val="3"/>
+        </dgm:presLayoutVars>
+      </dgm:prSet>
+      <dgm:spPr/>
+      <dgm:t>
+        <a:bodyPr/>
+        <a:lstStyle/>
+        <a:p>
+          <a:endParaRPr lang="en-US"/>
+        </a:p>
+      </dgm:t>
+    </dgm:pt>
+    <dgm:pt modelId="{97E4EB3B-9066-4CE5-A7B4-4DFBBCFE1302}" type="pres">
+      <dgm:prSet presAssocID="{4AFA0BCF-3F76-4A9E-9664-7040D9CE0684}" presName="hierChild3" presStyleCnt="0"/>
+      <dgm:spPr/>
+    </dgm:pt>
+    <dgm:pt modelId="{46137AA4-6786-4C01-A081-9B0DA8B28B5C}" type="pres">
+      <dgm:prSet presAssocID="{9FC1897A-6480-485D-9E7D-048D0DD3ED34}" presName="Name17" presStyleLbl="parChTrans1D3" presStyleIdx="4" presStyleCnt="9"/>
+      <dgm:spPr/>
+      <dgm:t>
+        <a:bodyPr/>
+        <a:lstStyle/>
+        <a:p>
+          <a:endParaRPr lang="en-US"/>
+        </a:p>
+      </dgm:t>
+    </dgm:pt>
+    <dgm:pt modelId="{2133F7F7-C7BB-47DD-935C-1CB94D7D1D72}" type="pres">
+      <dgm:prSet presAssocID="{1D83D59B-98DC-4BA5-9FD2-E98B9B1E3ACD}" presName="hierRoot3" presStyleCnt="0"/>
+      <dgm:spPr/>
+    </dgm:pt>
+    <dgm:pt modelId="{22C0B05D-7E0E-4467-973B-15DB4E1F4FDB}" type="pres">
+      <dgm:prSet presAssocID="{1D83D59B-98DC-4BA5-9FD2-E98B9B1E3ACD}" presName="composite3" presStyleCnt="0"/>
+      <dgm:spPr/>
+    </dgm:pt>
+    <dgm:pt modelId="{93EBB00C-A530-4F32-97E6-709AFD6597E9}" type="pres">
+      <dgm:prSet presAssocID="{1D83D59B-98DC-4BA5-9FD2-E98B9B1E3ACD}" presName="background3" presStyleLbl="node3" presStyleIdx="4" presStyleCnt="9"/>
+      <dgm:spPr/>
+    </dgm:pt>
+    <dgm:pt modelId="{AA9179AC-72FA-4C01-BB7C-497E14465A99}" type="pres">
+      <dgm:prSet presAssocID="{1D83D59B-98DC-4BA5-9FD2-E98B9B1E3ACD}" presName="text3" presStyleLbl="fgAcc3" presStyleIdx="4" presStyleCnt="9">
+        <dgm:presLayoutVars>
+          <dgm:chPref val="3"/>
+        </dgm:presLayoutVars>
+      </dgm:prSet>
+      <dgm:spPr/>
+      <dgm:t>
+        <a:bodyPr/>
+        <a:lstStyle/>
+        <a:p>
+          <a:endParaRPr lang="en-US"/>
+        </a:p>
+      </dgm:t>
+    </dgm:pt>
+    <dgm:pt modelId="{65D38ABD-5032-4336-90C5-AD39582B773A}" type="pres">
+      <dgm:prSet presAssocID="{1D83D59B-98DC-4BA5-9FD2-E98B9B1E3ACD}" presName="hierChild4" presStyleCnt="0"/>
+      <dgm:spPr/>
+    </dgm:pt>
+    <dgm:pt modelId="{94272433-050F-47EA-8C1B-9FE85CA17316}" type="pres">
+      <dgm:prSet presAssocID="{28C6D3A4-CFA9-44A4-91EF-9DEE449B54FD}" presName="Name17" presStyleLbl="parChTrans1D3" presStyleIdx="5" presStyleCnt="9"/>
+      <dgm:spPr/>
+      <dgm:t>
+        <a:bodyPr/>
+        <a:lstStyle/>
+        <a:p>
+          <a:endParaRPr lang="en-US"/>
+        </a:p>
+      </dgm:t>
+    </dgm:pt>
+    <dgm:pt modelId="{2C32728B-C044-4E88-8550-40BDB2B05BEC}" type="pres">
+      <dgm:prSet presAssocID="{1FE07398-AF54-4D97-975B-A3A2C0058016}" presName="hierRoot3" presStyleCnt="0"/>
+      <dgm:spPr/>
+    </dgm:pt>
+    <dgm:pt modelId="{BE80245C-1D7C-4FD4-BBE9-A45ED316A1AC}" type="pres">
+      <dgm:prSet presAssocID="{1FE07398-AF54-4D97-975B-A3A2C0058016}" presName="composite3" presStyleCnt="0"/>
+      <dgm:spPr/>
+    </dgm:pt>
+    <dgm:pt modelId="{154431B7-4955-47E2-A31C-EF26EDFC279C}" type="pres">
+      <dgm:prSet presAssocID="{1FE07398-AF54-4D97-975B-A3A2C0058016}" presName="background3" presStyleLbl="node3" presStyleIdx="5" presStyleCnt="9"/>
+      <dgm:spPr/>
+    </dgm:pt>
+    <dgm:pt modelId="{6615E3C8-E1E4-4C77-8C60-867150195CF6}" type="pres">
+      <dgm:prSet presAssocID="{1FE07398-AF54-4D97-975B-A3A2C0058016}" presName="text3" presStyleLbl="fgAcc3" presStyleIdx="5" presStyleCnt="9">
+        <dgm:presLayoutVars>
+          <dgm:chPref val="3"/>
+        </dgm:presLayoutVars>
+      </dgm:prSet>
+      <dgm:spPr/>
+      <dgm:t>
+        <a:bodyPr/>
+        <a:lstStyle/>
+        <a:p>
+          <a:endParaRPr lang="en-US"/>
+        </a:p>
+      </dgm:t>
+    </dgm:pt>
+    <dgm:pt modelId="{65461300-E252-43A6-A66A-70E5847216DB}" type="pres">
+      <dgm:prSet presAssocID="{1FE07398-AF54-4D97-975B-A3A2C0058016}" presName="hierChild4" presStyleCnt="0"/>
+      <dgm:spPr/>
+    </dgm:pt>
+    <dgm:pt modelId="{536711E3-A80A-449E-B48D-F5FC6634461D}" type="pres">
+      <dgm:prSet presAssocID="{4EAE041A-2C1A-4B18-B2B8-BF22937FB36B}" presName="Name17" presStyleLbl="parChTrans1D3" presStyleIdx="6" presStyleCnt="9"/>
+      <dgm:spPr/>
+      <dgm:t>
+        <a:bodyPr/>
+        <a:lstStyle/>
+        <a:p>
+          <a:endParaRPr lang="en-US"/>
+        </a:p>
+      </dgm:t>
+    </dgm:pt>
+    <dgm:pt modelId="{3408C42B-3A85-4734-A553-0D94E149DB9E}" type="pres">
+      <dgm:prSet presAssocID="{B08EDF0A-F286-4E82-8065-3B0AC5E4D9A5}" presName="hierRoot3" presStyleCnt="0"/>
+      <dgm:spPr/>
+    </dgm:pt>
+    <dgm:pt modelId="{8B8AA2C8-1281-41EA-BC1E-7726824782D8}" type="pres">
+      <dgm:prSet presAssocID="{B08EDF0A-F286-4E82-8065-3B0AC5E4D9A5}" presName="composite3" presStyleCnt="0"/>
+      <dgm:spPr/>
+    </dgm:pt>
+    <dgm:pt modelId="{6AE09336-FD27-4347-B366-7BAEBB03AE82}" type="pres">
+      <dgm:prSet presAssocID="{B08EDF0A-F286-4E82-8065-3B0AC5E4D9A5}" presName="background3" presStyleLbl="node3" presStyleIdx="6" presStyleCnt="9"/>
+      <dgm:spPr/>
+    </dgm:pt>
+    <dgm:pt modelId="{4873AE97-C020-4FCC-85D0-2A8AA08A1EE7}" type="pres">
+      <dgm:prSet presAssocID="{B08EDF0A-F286-4E82-8065-3B0AC5E4D9A5}" presName="text3" presStyleLbl="fgAcc3" presStyleIdx="6" presStyleCnt="9">
+        <dgm:presLayoutVars>
+          <dgm:chPref val="3"/>
+        </dgm:presLayoutVars>
+      </dgm:prSet>
+      <dgm:spPr/>
+      <dgm:t>
+        <a:bodyPr/>
+        <a:lstStyle/>
+        <a:p>
+          <a:endParaRPr lang="en-US"/>
+        </a:p>
+      </dgm:t>
+    </dgm:pt>
+    <dgm:pt modelId="{520D8464-459F-4286-8FCD-C6F30C7FD64B}" type="pres">
+      <dgm:prSet presAssocID="{B08EDF0A-F286-4E82-8065-3B0AC5E4D9A5}" presName="hierChild4" presStyleCnt="0"/>
+      <dgm:spPr/>
+    </dgm:pt>
+    <dgm:pt modelId="{08944219-5135-414B-9E47-A9E57E91536A}" type="pres">
+      <dgm:prSet presAssocID="{026FF09E-DBCF-486C-949F-0F7EEE49230D}" presName="Name17" presStyleLbl="parChTrans1D3" presStyleIdx="7" presStyleCnt="9"/>
+      <dgm:spPr/>
+    </dgm:pt>
+    <dgm:pt modelId="{512D6CDC-7EB3-456F-85A2-FE96099AB4D4}" type="pres">
+      <dgm:prSet presAssocID="{1C2627F7-A448-4AA5-96EB-2FA250463777}" presName="hierRoot3" presStyleCnt="0"/>
+      <dgm:spPr/>
+    </dgm:pt>
+    <dgm:pt modelId="{40B3B295-C2D2-4BA5-8DE8-D26BE285BB6A}" type="pres">
+      <dgm:prSet presAssocID="{1C2627F7-A448-4AA5-96EB-2FA250463777}" presName="composite3" presStyleCnt="0"/>
+      <dgm:spPr/>
+    </dgm:pt>
+    <dgm:pt modelId="{5706623D-2CC6-4897-8122-2A1A8E8EFF35}" type="pres">
+      <dgm:prSet presAssocID="{1C2627F7-A448-4AA5-96EB-2FA250463777}" presName="background3" presStyleLbl="node3" presStyleIdx="7" presStyleCnt="9"/>
+      <dgm:spPr/>
+    </dgm:pt>
+    <dgm:pt modelId="{798F6B39-52BD-410A-BC57-4520A5F482F8}" type="pres">
+      <dgm:prSet presAssocID="{1C2627F7-A448-4AA5-96EB-2FA250463777}" presName="text3" presStyleLbl="fgAcc3" presStyleIdx="7" presStyleCnt="9">
+        <dgm:presLayoutVars>
+          <dgm:chPref val="3"/>
+        </dgm:presLayoutVars>
+      </dgm:prSet>
+      <dgm:spPr/>
+      <dgm:t>
+        <a:bodyPr/>
+        <a:lstStyle/>
+        <a:p>
+          <a:endParaRPr lang="en-US"/>
+        </a:p>
+      </dgm:t>
+    </dgm:pt>
+    <dgm:pt modelId="{CA64CC64-DF94-48EF-A06E-B5968C506B58}" type="pres">
+      <dgm:prSet presAssocID="{1C2627F7-A448-4AA5-96EB-2FA250463777}" presName="hierChild4" presStyleCnt="0"/>
+      <dgm:spPr/>
+    </dgm:pt>
+    <dgm:pt modelId="{99053230-842C-47DC-A3CE-0DFCE161DD0D}" type="pres">
+      <dgm:prSet presAssocID="{5757562E-EC33-4594-94F4-7E7D4C8D111E}" presName="Name10" presStyleLbl="parChTrans1D2" presStyleIdx="3" presStyleCnt="4"/>
+      <dgm:spPr/>
+      <dgm:t>
+        <a:bodyPr/>
+        <a:lstStyle/>
+        <a:p>
+          <a:endParaRPr lang="en-US"/>
+        </a:p>
+      </dgm:t>
+    </dgm:pt>
+    <dgm:pt modelId="{691731E6-AF1D-492F-ABC5-594956B61865}" type="pres">
+      <dgm:prSet presAssocID="{D78D3523-5030-4AF5-8C8A-63ABEC2E528E}" presName="hierRoot2" presStyleCnt="0"/>
+      <dgm:spPr/>
+    </dgm:pt>
+    <dgm:pt modelId="{B3FA8080-CC01-4ACE-A7F5-3857FCC58138}" type="pres">
+      <dgm:prSet presAssocID="{D78D3523-5030-4AF5-8C8A-63ABEC2E528E}" presName="composite2" presStyleCnt="0"/>
+      <dgm:spPr/>
+    </dgm:pt>
+    <dgm:pt modelId="{94B1AC97-30F1-499E-A7B4-B87DDBE371B1}" type="pres">
+      <dgm:prSet presAssocID="{D78D3523-5030-4AF5-8C8A-63ABEC2E528E}" presName="background2" presStyleLbl="node2" presStyleIdx="3" presStyleCnt="4"/>
+      <dgm:spPr/>
+    </dgm:pt>
+    <dgm:pt modelId="{665FF436-E6A1-4DEF-B412-BDBD9FCFA2A2}" type="pres">
+      <dgm:prSet presAssocID="{D78D3523-5030-4AF5-8C8A-63ABEC2E528E}" presName="text2" presStyleLbl="fgAcc2" presStyleIdx="3" presStyleCnt="4">
+        <dgm:presLayoutVars>
+          <dgm:chPref val="3"/>
+        </dgm:presLayoutVars>
+      </dgm:prSet>
+      <dgm:spPr/>
+      <dgm:t>
+        <a:bodyPr/>
+        <a:lstStyle/>
+        <a:p>
+          <a:endParaRPr lang="en-US"/>
+        </a:p>
+      </dgm:t>
+    </dgm:pt>
+    <dgm:pt modelId="{7DBEE065-21FC-4AA6-9032-5EC60D6E2F68}" type="pres">
+      <dgm:prSet presAssocID="{D78D3523-5030-4AF5-8C8A-63ABEC2E528E}" presName="hierChild3" presStyleCnt="0"/>
+      <dgm:spPr/>
+    </dgm:pt>
+    <dgm:pt modelId="{15393D26-DABA-4FB9-90DA-2700D2CCBB60}" type="pres">
+      <dgm:prSet presAssocID="{4A16BB1F-0A33-48F0-B90E-7BDB067E5DBF}" presName="Name17" presStyleLbl="parChTrans1D3" presStyleIdx="8" presStyleCnt="9"/>
+      <dgm:spPr/>
+      <dgm:t>
+        <a:bodyPr/>
+        <a:lstStyle/>
+        <a:p>
+          <a:endParaRPr lang="en-US"/>
+        </a:p>
+      </dgm:t>
+    </dgm:pt>
+    <dgm:pt modelId="{B8B13942-BA20-49EB-80D5-A1F1D20781DD}" type="pres">
+      <dgm:prSet presAssocID="{1268D9A6-1C5D-4525-8BCE-F95BA0099FE2}" presName="hierRoot3" presStyleCnt="0"/>
+      <dgm:spPr/>
+    </dgm:pt>
+    <dgm:pt modelId="{C94059DB-2AE1-4D47-B234-1EDCC19D1D45}" type="pres">
+      <dgm:prSet presAssocID="{1268D9A6-1C5D-4525-8BCE-F95BA0099FE2}" presName="composite3" presStyleCnt="0"/>
+      <dgm:spPr/>
+    </dgm:pt>
+    <dgm:pt modelId="{3C69D9D9-0BEA-4613-A5F4-B78C8A66307D}" type="pres">
+      <dgm:prSet presAssocID="{1268D9A6-1C5D-4525-8BCE-F95BA0099FE2}" presName="background3" presStyleLbl="node3" presStyleIdx="8" presStyleCnt="9"/>
+      <dgm:spPr/>
+    </dgm:pt>
+    <dgm:pt modelId="{DDC8F10D-32D0-48B7-9A78-9483E263C534}" type="pres">
+      <dgm:prSet presAssocID="{1268D9A6-1C5D-4525-8BCE-F95BA0099FE2}" presName="text3" presStyleLbl="fgAcc3" presStyleIdx="8" presStyleCnt="9">
+        <dgm:presLayoutVars>
+          <dgm:chPref val="3"/>
+        </dgm:presLayoutVars>
+      </dgm:prSet>
+      <dgm:spPr/>
+      <dgm:t>
+        <a:bodyPr/>
+        <a:lstStyle/>
+        <a:p>
+          <a:endParaRPr lang="en-US"/>
+        </a:p>
+      </dgm:t>
+    </dgm:pt>
     <dgm:pt modelId="{3E6E3783-7CFE-47F9-A4F2-628036AC26E2}" type="pres">
       <dgm:prSet presAssocID="{1268D9A6-1C5D-4525-8BCE-F95BA0099FE2}" presName="hierChild4" presStyleCnt="0"/>
       <dgm:spPr/>
     </dgm:pt>
   </dgm:ptLst>
   <dgm:cxnLst>
+    <dgm:cxn modelId="{DFEFD675-B35F-46FA-829D-F1779470C706}" type="presOf" srcId="{B08EDF0A-F286-4E82-8065-3B0AC5E4D9A5}" destId="{4873AE97-C020-4FCC-85D0-2A8AA08A1EE7}" srcOrd="0" destOrd="0" presId="urn:microsoft.com/office/officeart/2005/8/layout/hierarchy1"/>
+    <dgm:cxn modelId="{4CDA8B8A-940A-431A-AA1A-B56EAA81B0A8}" type="presOf" srcId="{50E80EE0-A4DD-47C0-AF86-36F5A9425CC3}" destId="{892C6C42-5060-433C-9DD2-2286DE0167C2}" srcOrd="0" destOrd="0" presId="urn:microsoft.com/office/officeart/2005/8/layout/hierarchy1"/>
+    <dgm:cxn modelId="{AC21D35A-E713-4210-B5E4-34B07DC6DED8}" type="presOf" srcId="{4A16BB1F-0A33-48F0-B90E-7BDB067E5DBF}" destId="{15393D26-DABA-4FB9-90DA-2700D2CCBB60}" srcOrd="0" destOrd="0" presId="urn:microsoft.com/office/officeart/2005/8/layout/hierarchy1"/>
+    <dgm:cxn modelId="{25678C81-7DD8-4C58-A60E-D139DB8CD9E1}" type="presOf" srcId="{D4830123-865B-406D-A862-C0D16419462C}" destId="{1B3ED58B-D34A-44D0-9577-E58646AC7A19}" srcOrd="0" destOrd="0" presId="urn:microsoft.com/office/officeart/2005/8/layout/hierarchy1"/>
+    <dgm:cxn modelId="{01CEB5AF-BD2A-4C67-B375-1A59B608C007}" srcId="{C4FE5C8C-C5F0-4202-9075-A3C4D79FB02C}" destId="{A414F3A0-F3D0-48C7-BD5E-C973BD4DA5FC}" srcOrd="0" destOrd="0" parTransId="{EDCF52CB-D464-4D7F-AB0F-B35D0BDA5651}" sibTransId="{C179DFEE-2BB5-43E0-ADF6-AF3A69E786FC}"/>
+    <dgm:cxn modelId="{EA74CE0A-1C2B-436E-BE25-B69450958013}" type="presOf" srcId="{CF02CACD-5214-4A46-984B-DC32F543FA4D}" destId="{11628CE3-4FE4-4A63-9E6F-3C23CDD49E54}" srcOrd="0" destOrd="0" presId="urn:microsoft.com/office/officeart/2005/8/layout/hierarchy1"/>
+    <dgm:cxn modelId="{2B150C46-4247-4152-9328-0B54CA43702B}" srcId="{50E80EE0-A4DD-47C0-AF86-36F5A9425CC3}" destId="{CF02CACD-5214-4A46-984B-DC32F543FA4D}" srcOrd="0" destOrd="0" parTransId="{D4830123-865B-406D-A862-C0D16419462C}" sibTransId="{734D32F3-A2FC-4F87-AAC7-8B4034F7C089}"/>
+    <dgm:cxn modelId="{7A4736F5-E08E-4679-BA68-87A5269F8D89}" type="presOf" srcId="{1268D9A6-1C5D-4525-8BCE-F95BA0099FE2}" destId="{DDC8F10D-32D0-48B7-9A78-9483E263C534}" srcOrd="0" destOrd="0" presId="urn:microsoft.com/office/officeart/2005/8/layout/hierarchy1"/>
+    <dgm:cxn modelId="{49935385-3B61-4DEC-963D-163236FE6EB7}" srcId="{C4FE5C8C-C5F0-4202-9075-A3C4D79FB02C}" destId="{D78D3523-5030-4AF5-8C8A-63ABEC2E528E}" srcOrd="3" destOrd="0" parTransId="{5757562E-EC33-4594-94F4-7E7D4C8D111E}" sibTransId="{2F827FD8-D6A9-4D4A-A77B-09DF091FAB37}"/>
+    <dgm:cxn modelId="{954B53D5-FA35-4764-842F-87A6A1337AB6}" type="presOf" srcId="{C4FE5C8C-C5F0-4202-9075-A3C4D79FB02C}" destId="{E2E2CEF2-EA91-467F-89EE-9810B62BA7DC}" srcOrd="0" destOrd="0" presId="urn:microsoft.com/office/officeart/2005/8/layout/hierarchy1"/>
+    <dgm:cxn modelId="{15487858-AA27-4254-90AA-8EDFD34EEA48}" type="presOf" srcId="{E176D4A6-23B1-45F8-8639-0521E74F02D8}" destId="{D44BB619-B5EC-4378-9406-0D139ECCE68B}" srcOrd="0" destOrd="0" presId="urn:microsoft.com/office/officeart/2005/8/layout/hierarchy1"/>
+    <dgm:cxn modelId="{31704396-2C07-4074-9C49-1053145576AE}" type="presOf" srcId="{4AFA0BCF-3F76-4A9E-9664-7040D9CE0684}" destId="{1EB26671-3605-41EF-81D5-2B5EC94C22CD}" srcOrd="0" destOrd="0" presId="urn:microsoft.com/office/officeart/2005/8/layout/hierarchy1"/>
     <dgm:cxn modelId="{59174B3E-CCB9-4655-8540-DE2F87DCDB80}" type="presOf" srcId="{1D83D59B-98DC-4BA5-9FD2-E98B9B1E3ACD}" destId="{AA9179AC-72FA-4C01-BB7C-497E14465A99}" srcOrd="0" destOrd="0" presId="urn:microsoft.com/office/officeart/2005/8/layout/hierarchy1"/>
-    <dgm:cxn modelId="{29868DFC-A2B8-4AE9-9199-3FBD5BA378F5}" type="presOf" srcId="{434D147A-963A-4E4A-A913-C410E6C829B9}" destId="{9CF20209-245F-4EDA-9764-33CBDD2D501E}" srcOrd="0" destOrd="0" presId="urn:microsoft.com/office/officeart/2005/8/layout/hierarchy1"/>
+    <dgm:cxn modelId="{9E1C9B3C-335B-4441-BF42-7D18AF93A038}" type="presOf" srcId="{28C6D3A4-CFA9-44A4-91EF-9DEE449B54FD}" destId="{94272433-050F-47EA-8C1B-9FE85CA17316}" srcOrd="0" destOrd="0" presId="urn:microsoft.com/office/officeart/2005/8/layout/hierarchy1"/>
+    <dgm:cxn modelId="{37A6415B-36CB-46BA-9D39-ED07D4CCDC7A}" type="presOf" srcId="{5B972C33-620B-4D06-A769-D30144C88AD2}" destId="{54298CE8-D607-4EF1-99DB-56E778E6E051}" srcOrd="0" destOrd="0" presId="urn:microsoft.com/office/officeart/2005/8/layout/hierarchy1"/>
+    <dgm:cxn modelId="{F90717E3-4AD1-49F6-8850-2EB3586416C0}" type="presOf" srcId="{37196A59-8A05-408E-8081-A896B92CDAE6}" destId="{BBB183F3-7B4F-4580-9BC4-B55C041C5063}" srcOrd="0" destOrd="0" presId="urn:microsoft.com/office/officeart/2005/8/layout/hierarchy1"/>
+    <dgm:cxn modelId="{0BFFB86E-6980-4035-9D63-9BD83E45A92E}" srcId="{4AFA0BCF-3F76-4A9E-9664-7040D9CE0684}" destId="{1C2627F7-A448-4AA5-96EB-2FA250463777}" srcOrd="3" destOrd="0" parTransId="{026FF09E-DBCF-486C-949F-0F7EEE49230D}" sibTransId="{2C449019-D56A-4686-A70B-E63CA8F3CE85}"/>
+    <dgm:cxn modelId="{A230359A-72E5-4AEB-BD51-6D01FB28A070}" srcId="{C4FE5C8C-C5F0-4202-9075-A3C4D79FB02C}" destId="{4AFA0BCF-3F76-4A9E-9664-7040D9CE0684}" srcOrd="2" destOrd="0" parTransId="{59E1F62D-6E5A-4033-A063-F00BE8A36645}" sibTransId="{F052597A-91E1-4D1C-A292-AFF6BEB69735}"/>
+    <dgm:cxn modelId="{FC9D7D90-1ADA-431E-9257-CD62F23A7311}" srcId="{4AFA0BCF-3F76-4A9E-9664-7040D9CE0684}" destId="{1FE07398-AF54-4D97-975B-A3A2C0058016}" srcOrd="1" destOrd="0" parTransId="{28C6D3A4-CFA9-44A4-91EF-9DEE449B54FD}" sibTransId="{BA3795BF-7F39-4E7B-AD15-C9712FC1079C}"/>
+    <dgm:cxn modelId="{CE4CB1B4-6888-46EE-860A-E1AACBC7364D}" srcId="{A414F3A0-F3D0-48C7-BD5E-C973BD4DA5FC}" destId="{E176D4A6-23B1-45F8-8639-0521E74F02D8}" srcOrd="1" destOrd="0" parTransId="{5B972C33-620B-4D06-A769-D30144C88AD2}" sibTransId="{446B8507-2614-4842-BE67-D3CAA520C94F}"/>
+    <dgm:cxn modelId="{3CD4F185-507C-4029-87FB-840AB98E1FB1}" type="presOf" srcId="{D78D3523-5030-4AF5-8C8A-63ABEC2E528E}" destId="{665FF436-E6A1-4DEF-B412-BDBD9FCFA2A2}" srcOrd="0" destOrd="0" presId="urn:microsoft.com/office/officeart/2005/8/layout/hierarchy1"/>
+    <dgm:cxn modelId="{0142DEA1-1AA3-4BF7-B1F3-9449878A2BCB}" type="presOf" srcId="{053C239E-BF2B-45C5-A2D7-9A14D0E866A3}" destId="{8CF190DC-55BF-4F5C-9A2F-88258F63CAFE}" srcOrd="0" destOrd="0" presId="urn:microsoft.com/office/officeart/2005/8/layout/hierarchy1"/>
+    <dgm:cxn modelId="{C920D167-8902-447F-B704-15D39A8C068C}" srcId="{D78D3523-5030-4AF5-8C8A-63ABEC2E528E}" destId="{1268D9A6-1C5D-4525-8BCE-F95BA0099FE2}" srcOrd="0" destOrd="0" parTransId="{4A16BB1F-0A33-48F0-B90E-7BDB067E5DBF}" sibTransId="{F3594267-3723-4EF9-BAC2-63217F264343}"/>
+    <dgm:cxn modelId="{5A59D8E5-941E-4EE1-B785-2BAD60F3C967}" type="presOf" srcId="{9FC1897A-6480-485D-9E7D-048D0DD3ED34}" destId="{46137AA4-6786-4C01-A081-9B0DA8B28B5C}" srcOrd="0" destOrd="0" presId="urn:microsoft.com/office/officeart/2005/8/layout/hierarchy1"/>
+    <dgm:cxn modelId="{A7C52BBF-D16A-4358-B255-8AB50AAB348D}" type="presOf" srcId="{1FE07398-AF54-4D97-975B-A3A2C0058016}" destId="{6615E3C8-E1E4-4C77-8C60-867150195CF6}" srcOrd="0" destOrd="0" presId="urn:microsoft.com/office/officeart/2005/8/layout/hierarchy1"/>
+    <dgm:cxn modelId="{FFBE3ED4-1325-4EB0-929C-3905ADE175A6}" srcId="{AF829859-61F7-4201-8323-ABD140313E8F}" destId="{C4FE5C8C-C5F0-4202-9075-A3C4D79FB02C}" srcOrd="0" destOrd="0" parTransId="{8B909053-67F6-4143-AEA3-012B09A34130}" sibTransId="{2E396F87-2586-4005-B8A6-9F28BDD49A4F}"/>
+    <dgm:cxn modelId="{44FE4924-ACEC-4E53-8E63-33A17FB3C01F}" type="presOf" srcId="{59E1F62D-6E5A-4033-A063-F00BE8A36645}" destId="{F11E8542-670B-4C31-9321-CE1749F6A240}" srcOrd="0" destOrd="0" presId="urn:microsoft.com/office/officeart/2005/8/layout/hierarchy1"/>
+    <dgm:cxn modelId="{E08EDB9E-E72B-47FC-B054-F05013E35335}" srcId="{C4FE5C8C-C5F0-4202-9075-A3C4D79FB02C}" destId="{50E80EE0-A4DD-47C0-AF86-36F5A9425CC3}" srcOrd="1" destOrd="0" parTransId="{37196A59-8A05-408E-8081-A896B92CDAE6}" sibTransId="{120DCC16-057E-4097-80A3-06DCD7725CF4}"/>
+    <dgm:cxn modelId="{2355455D-D385-4F18-8AF9-47DBDB833B13}" type="presOf" srcId="{63C696C5-07BD-420C-8016-3E5DDE8B8832}" destId="{190029D3-CF5D-4F20-906E-7ABEAD252E9E}" srcOrd="0" destOrd="0" presId="urn:microsoft.com/office/officeart/2005/8/layout/hierarchy1"/>
+    <dgm:cxn modelId="{B013F9EB-7674-456B-8597-70A72F02EDA9}" type="presOf" srcId="{EDCF52CB-D464-4D7F-AB0F-B35D0BDA5651}" destId="{62D384A6-4D1E-4C91-B86B-0AA0996C5D63}" srcOrd="0" destOrd="0" presId="urn:microsoft.com/office/officeart/2005/8/layout/hierarchy1"/>
+    <dgm:cxn modelId="{2BD0506F-4E28-49A0-AC2F-5D1C8E4CEAE7}" srcId="{4AFA0BCF-3F76-4A9E-9664-7040D9CE0684}" destId="{1D83D59B-98DC-4BA5-9FD2-E98B9B1E3ACD}" srcOrd="0" destOrd="0" parTransId="{9FC1897A-6480-485D-9E7D-048D0DD3ED34}" sibTransId="{7A5F4BD7-A279-49CB-A533-140E8CFB347A}"/>
+    <dgm:cxn modelId="{C043220A-9D61-490A-8910-ED150A98103E}" type="presOf" srcId="{4EAE041A-2C1A-4B18-B2B8-BF22937FB36B}" destId="{536711E3-A80A-449E-B48D-F5FC6634461D}" srcOrd="0" destOrd="0" presId="urn:microsoft.com/office/officeart/2005/8/layout/hierarchy1"/>
     <dgm:cxn modelId="{CFB20B97-CAFF-4D71-951F-8B9F7A7FE679}" type="presOf" srcId="{DD351C4C-72E9-4E05-8DC7-951FBBE48B55}" destId="{5ECD72DD-A15C-44EA-A5DF-3D6DCF4BF897}" srcOrd="0" destOrd="0" presId="urn:microsoft.com/office/officeart/2005/8/layout/hierarchy1"/>
-    <dgm:cxn modelId="{F90717E3-4AD1-49F6-8850-2EB3586416C0}" type="presOf" srcId="{37196A59-8A05-408E-8081-A896B92CDAE6}" destId="{BBB183F3-7B4F-4580-9BC4-B55C041C5063}" srcOrd="0" destOrd="0" presId="urn:microsoft.com/office/officeart/2005/8/layout/hierarchy1"/>
-    <dgm:cxn modelId="{2B150C46-4247-4152-9328-0B54CA43702B}" srcId="{50E80EE0-A4DD-47C0-AF86-36F5A9425CC3}" destId="{CF02CACD-5214-4A46-984B-DC32F543FA4D}" srcOrd="0" destOrd="0" parTransId="{D4830123-865B-406D-A862-C0D16419462C}" sibTransId="{734D32F3-A2FC-4F87-AAC7-8B4034F7C089}"/>
-    <dgm:cxn modelId="{15487858-AA27-4254-90AA-8EDFD34EEA48}" type="presOf" srcId="{E176D4A6-23B1-45F8-8639-0521E74F02D8}" destId="{D44BB619-B5EC-4378-9406-0D139ECCE68B}" srcOrd="0" destOrd="0" presId="urn:microsoft.com/office/officeart/2005/8/layout/hierarchy1"/>
-    <dgm:cxn modelId="{E08EDB9E-E72B-47FC-B054-F05013E35335}" srcId="{C4FE5C8C-C5F0-4202-9075-A3C4D79FB02C}" destId="{50E80EE0-A4DD-47C0-AF86-36F5A9425CC3}" srcOrd="1" destOrd="0" parTransId="{37196A59-8A05-408E-8081-A896B92CDAE6}" sibTransId="{120DCC16-057E-4097-80A3-06DCD7725CF4}"/>
-    <dgm:cxn modelId="{3CD4F185-507C-4029-87FB-840AB98E1FB1}" type="presOf" srcId="{D78D3523-5030-4AF5-8C8A-63ABEC2E528E}" destId="{665FF436-E6A1-4DEF-B412-BDBD9FCFA2A2}" srcOrd="0" destOrd="0" presId="urn:microsoft.com/office/officeart/2005/8/layout/hierarchy1"/>
-    <dgm:cxn modelId="{2BD0506F-4E28-49A0-AC2F-5D1C8E4CEAE7}" srcId="{4AFA0BCF-3F76-4A9E-9664-7040D9CE0684}" destId="{1D83D59B-98DC-4BA5-9FD2-E98B9B1E3ACD}" srcOrd="0" destOrd="0" parTransId="{9FC1897A-6480-485D-9E7D-048D0DD3ED34}" sibTransId="{7A5F4BD7-A279-49CB-A533-140E8CFB347A}"/>
-    <dgm:cxn modelId="{37A6415B-36CB-46BA-9D39-ED07D4CCDC7A}" type="presOf" srcId="{5B972C33-620B-4D06-A769-D30144C88AD2}" destId="{54298CE8-D607-4EF1-99DB-56E778E6E051}" srcOrd="0" destOrd="0" presId="urn:microsoft.com/office/officeart/2005/8/layout/hierarchy1"/>
-    <dgm:cxn modelId="{B013F9EB-7674-456B-8597-70A72F02EDA9}" type="presOf" srcId="{EDCF52CB-D464-4D7F-AB0F-B35D0BDA5651}" destId="{62D384A6-4D1E-4C91-B86B-0AA0996C5D63}" srcOrd="0" destOrd="0" presId="urn:microsoft.com/office/officeart/2005/8/layout/hierarchy1"/>
-    <dgm:cxn modelId="{CE4CB1B4-6888-46EE-860A-E1AACBC7364D}" srcId="{A414F3A0-F3D0-48C7-BD5E-C973BD4DA5FC}" destId="{E176D4A6-23B1-45F8-8639-0521E74F02D8}" srcOrd="1" destOrd="0" parTransId="{5B972C33-620B-4D06-A769-D30144C88AD2}" sibTransId="{446B8507-2614-4842-BE67-D3CAA520C94F}"/>
-    <dgm:cxn modelId="{49935385-3B61-4DEC-963D-163236FE6EB7}" srcId="{C4FE5C8C-C5F0-4202-9075-A3C4D79FB02C}" destId="{D78D3523-5030-4AF5-8C8A-63ABEC2E528E}" srcOrd="3" destOrd="0" parTransId="{5757562E-EC33-4594-94F4-7E7D4C8D111E}" sibTransId="{2F827FD8-D6A9-4D4A-A77B-09DF091FAB37}"/>
     <dgm:cxn modelId="{239E8AA2-3A33-47FC-AF70-16440ACAAD58}" type="presOf" srcId="{A414F3A0-F3D0-48C7-BD5E-C973BD4DA5FC}" destId="{2A9EA194-D71D-4004-A3E0-9175E3AD804A}" srcOrd="0" destOrd="0" presId="urn:microsoft.com/office/officeart/2005/8/layout/hierarchy1"/>
     <dgm:cxn modelId="{88AC0845-3372-4778-8562-A5A42F842356}" srcId="{4AFA0BCF-3F76-4A9E-9664-7040D9CE0684}" destId="{B08EDF0A-F286-4E82-8065-3B0AC5E4D9A5}" srcOrd="2" destOrd="0" parTransId="{4EAE041A-2C1A-4B18-B2B8-BF22937FB36B}" sibTransId="{5D0726C4-8EA1-46BD-90B1-02EDB34ED539}"/>
-    <dgm:cxn modelId="{5A59D8E5-941E-4EE1-B785-2BAD60F3C967}" type="presOf" srcId="{9FC1897A-6480-485D-9E7D-048D0DD3ED34}" destId="{46137AA4-6786-4C01-A081-9B0DA8B28B5C}" srcOrd="0" destOrd="0" presId="urn:microsoft.com/office/officeart/2005/8/layout/hierarchy1"/>
-    <dgm:cxn modelId="{FFBE3ED4-1325-4EB0-929C-3905ADE175A6}" srcId="{AF829859-61F7-4201-8323-ABD140313E8F}" destId="{C4FE5C8C-C5F0-4202-9075-A3C4D79FB02C}" srcOrd="0" destOrd="0" parTransId="{8B909053-67F6-4143-AEA3-012B09A34130}" sibTransId="{2E396F87-2586-4005-B8A6-9F28BDD49A4F}"/>
-    <dgm:cxn modelId="{7A4736F5-E08E-4679-BA68-87A5269F8D89}" type="presOf" srcId="{1268D9A6-1C5D-4525-8BCE-F95BA0099FE2}" destId="{DDC8F10D-32D0-48B7-9A78-9483E263C534}" srcOrd="0" destOrd="0" presId="urn:microsoft.com/office/officeart/2005/8/layout/hierarchy1"/>
-    <dgm:cxn modelId="{44FE4924-ACEC-4E53-8E63-33A17FB3C01F}" type="presOf" srcId="{59E1F62D-6E5A-4033-A063-F00BE8A36645}" destId="{F11E8542-670B-4C31-9321-CE1749F6A240}" srcOrd="0" destOrd="0" presId="urn:microsoft.com/office/officeart/2005/8/layout/hierarchy1"/>
-    <dgm:cxn modelId="{EA74CE0A-1C2B-436E-BE25-B69450958013}" type="presOf" srcId="{CF02CACD-5214-4A46-984B-DC32F543FA4D}" destId="{11628CE3-4FE4-4A63-9E6F-3C23CDD49E54}" srcOrd="0" destOrd="0" presId="urn:microsoft.com/office/officeart/2005/8/layout/hierarchy1"/>
-    <dgm:cxn modelId="{954B53D5-FA35-4764-842F-87A6A1337AB6}" type="presOf" srcId="{C4FE5C8C-C5F0-4202-9075-A3C4D79FB02C}" destId="{E2E2CEF2-EA91-467F-89EE-9810B62BA7DC}" srcOrd="0" destOrd="0" presId="urn:microsoft.com/office/officeart/2005/8/layout/hierarchy1"/>
-    <dgm:cxn modelId="{9E1C9B3C-335B-4441-BF42-7D18AF93A038}" type="presOf" srcId="{28C6D3A4-CFA9-44A4-91EF-9DEE449B54FD}" destId="{94272433-050F-47EA-8C1B-9FE85CA17316}" srcOrd="0" destOrd="0" presId="urn:microsoft.com/office/officeart/2005/8/layout/hierarchy1"/>
-    <dgm:cxn modelId="{A230359A-72E5-4AEB-BD51-6D01FB28A070}" srcId="{C4FE5C8C-C5F0-4202-9075-A3C4D79FB02C}" destId="{4AFA0BCF-3F76-4A9E-9664-7040D9CE0684}" srcOrd="2" destOrd="0" parTransId="{59E1F62D-6E5A-4033-A063-F00BE8A36645}" sibTransId="{F052597A-91E1-4D1C-A292-AFF6BEB69735}"/>
-    <dgm:cxn modelId="{C920D167-8902-447F-B704-15D39A8C068C}" srcId="{D78D3523-5030-4AF5-8C8A-63ABEC2E528E}" destId="{1268D9A6-1C5D-4525-8BCE-F95BA0099FE2}" srcOrd="0" destOrd="0" parTransId="{4A16BB1F-0A33-48F0-B90E-7BDB067E5DBF}" sibTransId="{F3594267-3723-4EF9-BAC2-63217F264343}"/>
-    <dgm:cxn modelId="{01CEB5AF-BD2A-4C67-B375-1A59B608C007}" srcId="{C4FE5C8C-C5F0-4202-9075-A3C4D79FB02C}" destId="{A414F3A0-F3D0-48C7-BD5E-C973BD4DA5FC}" srcOrd="0" destOrd="0" parTransId="{EDCF52CB-D464-4D7F-AB0F-B35D0BDA5651}" sibTransId="{C179DFEE-2BB5-43E0-ADF6-AF3A69E786FC}"/>
-    <dgm:cxn modelId="{25678C81-7DD8-4C58-A60E-D139DB8CD9E1}" type="presOf" srcId="{D4830123-865B-406D-A862-C0D16419462C}" destId="{1B3ED58B-D34A-44D0-9577-E58646AC7A19}" srcOrd="0" destOrd="0" presId="urn:microsoft.com/office/officeart/2005/8/layout/hierarchy1"/>
-    <dgm:cxn modelId="{C043220A-9D61-490A-8910-ED150A98103E}" type="presOf" srcId="{4EAE041A-2C1A-4B18-B2B8-BF22937FB36B}" destId="{536711E3-A80A-449E-B48D-F5FC6634461D}" srcOrd="0" destOrd="0" presId="urn:microsoft.com/office/officeart/2005/8/layout/hierarchy1"/>
-    <dgm:cxn modelId="{31704396-2C07-4074-9C49-1053145576AE}" type="presOf" srcId="{4AFA0BCF-3F76-4A9E-9664-7040D9CE0684}" destId="{1EB26671-3605-41EF-81D5-2B5EC94C22CD}" srcOrd="0" destOrd="0" presId="urn:microsoft.com/office/officeart/2005/8/layout/hierarchy1"/>
-    <dgm:cxn modelId="{DFEFD675-B35F-46FA-829D-F1779470C706}" type="presOf" srcId="{B08EDF0A-F286-4E82-8065-3B0AC5E4D9A5}" destId="{4873AE97-C020-4FCC-85D0-2A8AA08A1EE7}" srcOrd="0" destOrd="0" presId="urn:microsoft.com/office/officeart/2005/8/layout/hierarchy1"/>
-    <dgm:cxn modelId="{83C3C5AF-88F9-4206-8B46-1DD3BE4EE214}" srcId="{A414F3A0-F3D0-48C7-BD5E-C973BD4DA5FC}" destId="{DD351C4C-72E9-4E05-8DC7-951FBBE48B55}" srcOrd="0" destOrd="0" parTransId="{434D147A-963A-4E4A-A913-C410E6C829B9}" sibTransId="{4E4DA8F2-F873-4FAE-8DE0-E56B52C5B5AA}"/>
-    <dgm:cxn modelId="{A7C52BBF-D16A-4358-B255-8AB50AAB348D}" type="presOf" srcId="{1FE07398-AF54-4D97-975B-A3A2C0058016}" destId="{6615E3C8-E1E4-4C77-8C60-867150195CF6}" srcOrd="0" destOrd="0" presId="urn:microsoft.com/office/officeart/2005/8/layout/hierarchy1"/>
-    <dgm:cxn modelId="{AC21D35A-E713-4210-B5E4-34B07DC6DED8}" type="presOf" srcId="{4A16BB1F-0A33-48F0-B90E-7BDB067E5DBF}" destId="{15393D26-DABA-4FB9-90DA-2700D2CCBB60}" srcOrd="0" destOrd="0" presId="urn:microsoft.com/office/officeart/2005/8/layout/hierarchy1"/>
-    <dgm:cxn modelId="{FC9D7D90-1ADA-431E-9257-CD62F23A7311}" srcId="{4AFA0BCF-3F76-4A9E-9664-7040D9CE0684}" destId="{1FE07398-AF54-4D97-975B-A3A2C0058016}" srcOrd="1" destOrd="0" parTransId="{28C6D3A4-CFA9-44A4-91EF-9DEE449B54FD}" sibTransId="{BA3795BF-7F39-4E7B-AD15-C9712FC1079C}"/>
-    <dgm:cxn modelId="{4CDA8B8A-940A-431A-AA1A-B56EAA81B0A8}" type="presOf" srcId="{50E80EE0-A4DD-47C0-AF86-36F5A9425CC3}" destId="{892C6C42-5060-433C-9DD2-2286DE0167C2}" srcOrd="0" destOrd="0" presId="urn:microsoft.com/office/officeart/2005/8/layout/hierarchy1"/>
+    <dgm:cxn modelId="{34C5E3BA-3C29-4D6D-8A24-1204EF162599}" type="presOf" srcId="{026FF09E-DBCF-486C-949F-0F7EEE49230D}" destId="{08944219-5135-414B-9E47-A9E57E91536A}" srcOrd="0" destOrd="0" presId="urn:microsoft.com/office/officeart/2005/8/layout/hierarchy1"/>
+    <dgm:cxn modelId="{29868DFC-A2B8-4AE9-9199-3FBD5BA378F5}" type="presOf" srcId="{434D147A-963A-4E4A-A913-C410E6C829B9}" destId="{9CF20209-245F-4EDA-9764-33CBDD2D501E}" srcOrd="0" destOrd="0" presId="urn:microsoft.com/office/officeart/2005/8/layout/hierarchy1"/>
     <dgm:cxn modelId="{3651B70E-C5BC-4A2F-9F70-953692EC670D}" type="presOf" srcId="{AF829859-61F7-4201-8323-ABD140313E8F}" destId="{50AE0911-3195-437C-9119-7F816C8A5E95}" srcOrd="0" destOrd="0" presId="urn:microsoft.com/office/officeart/2005/8/layout/hierarchy1"/>
     <dgm:cxn modelId="{1319027A-C2A7-49C2-9AB1-7392120D9F59}" type="presOf" srcId="{5757562E-EC33-4594-94F4-7E7D4C8D111E}" destId="{99053230-842C-47DC-A3CE-0DFCE161DD0D}" srcOrd="0" destOrd="0" presId="urn:microsoft.com/office/officeart/2005/8/layout/hierarchy1"/>
+    <dgm:cxn modelId="{5E4F7F30-ADD8-4898-8EC4-D9B700281C6F}" type="presOf" srcId="{1C2627F7-A448-4AA5-96EB-2FA250463777}" destId="{798F6B39-52BD-410A-BC57-4520A5F482F8}" srcOrd="0" destOrd="0" presId="urn:microsoft.com/office/officeart/2005/8/layout/hierarchy1"/>
+    <dgm:cxn modelId="{83C3C5AF-88F9-4206-8B46-1DD3BE4EE214}" srcId="{A414F3A0-F3D0-48C7-BD5E-C973BD4DA5FC}" destId="{DD351C4C-72E9-4E05-8DC7-951FBBE48B55}" srcOrd="0" destOrd="0" parTransId="{434D147A-963A-4E4A-A913-C410E6C829B9}" sibTransId="{4E4DA8F2-F873-4FAE-8DE0-E56B52C5B5AA}"/>
+    <dgm:cxn modelId="{9FAC9FDE-7CB8-4A98-BE3B-8A729D97D333}" srcId="{50E80EE0-A4DD-47C0-AF86-36F5A9425CC3}" destId="{63C696C5-07BD-420C-8016-3E5DDE8B8832}" srcOrd="1" destOrd="0" parTransId="{053C239E-BF2B-45C5-A2D7-9A14D0E866A3}" sibTransId="{617BAF96-6F92-435D-802D-ED857D1D6DC6}"/>
     <dgm:cxn modelId="{8BF73618-687B-4AE2-9946-7FEE24DB9432}" type="presParOf" srcId="{50AE0911-3195-437C-9119-7F816C8A5E95}" destId="{83417A64-8025-4DF4-B86A-F57A74BC2319}" srcOrd="0" destOrd="0" presId="urn:microsoft.com/office/officeart/2005/8/layout/hierarchy1"/>
     <dgm:cxn modelId="{E35A6805-5955-4539-AF1B-428D42506162}" type="presParOf" srcId="{83417A64-8025-4DF4-B86A-F57A74BC2319}" destId="{7B6A031D-0D3E-438E-B9E0-D75CDB256A2A}" srcOrd="0" destOrd="0" presId="urn:microsoft.com/office/officeart/2005/8/layout/hierarchy1"/>
     <dgm:cxn modelId="{15FF0ABE-8D84-45B4-AF8C-B034DA4065EA}" type="presParOf" srcId="{7B6A031D-0D3E-438E-B9E0-D75CDB256A2A}" destId="{41AC87DF-859D-456D-8A0C-3F6E4C6AC6E1}" srcOrd="0" destOrd="0" presId="urn:microsoft.com/office/officeart/2005/8/layout/hierarchy1"/>
@@ -7063,6 +7522,12 @@
     <dgm:cxn modelId="{BC4E6919-22B4-4C35-B0FD-05206C25FA45}" type="presParOf" srcId="{9EB78029-A669-4040-B0A8-171710DA6489}" destId="{B3CC3B55-A248-479E-BDA0-8B119091B116}" srcOrd="0" destOrd="0" presId="urn:microsoft.com/office/officeart/2005/8/layout/hierarchy1"/>
     <dgm:cxn modelId="{1DC84A31-0910-4C64-8EE1-2BB3978F901D}" type="presParOf" srcId="{9EB78029-A669-4040-B0A8-171710DA6489}" destId="{11628CE3-4FE4-4A63-9E6F-3C23CDD49E54}" srcOrd="1" destOrd="0" presId="urn:microsoft.com/office/officeart/2005/8/layout/hierarchy1"/>
     <dgm:cxn modelId="{69AEEDD2-1AC4-4A39-9225-9EA57A3E2689}" type="presParOf" srcId="{581384E6-7AA1-4B74-9627-C312197539F5}" destId="{8AA88BF0-E0C4-413C-80B9-BD3E2F4FECB1}" srcOrd="1" destOrd="0" presId="urn:microsoft.com/office/officeart/2005/8/layout/hierarchy1"/>
+    <dgm:cxn modelId="{52CB3A1B-2F86-4F92-AB30-F1EB44DA3B90}" type="presParOf" srcId="{1189B2E4-39F2-44A1-9D4F-3975D0BEF01C}" destId="{8CF190DC-55BF-4F5C-9A2F-88258F63CAFE}" srcOrd="2" destOrd="0" presId="urn:microsoft.com/office/officeart/2005/8/layout/hierarchy1"/>
+    <dgm:cxn modelId="{549857D8-68F3-438A-A706-B581010FCAFC}" type="presParOf" srcId="{1189B2E4-39F2-44A1-9D4F-3975D0BEF01C}" destId="{84A5E146-83F6-49C2-89E3-A1AD808C63AE}" srcOrd="3" destOrd="0" presId="urn:microsoft.com/office/officeart/2005/8/layout/hierarchy1"/>
+    <dgm:cxn modelId="{74F040C6-887B-4E62-A25C-52AC7EC0E9AC}" type="presParOf" srcId="{84A5E146-83F6-49C2-89E3-A1AD808C63AE}" destId="{3B89A7C7-87BD-457E-A0F8-9C99F65E84BF}" srcOrd="0" destOrd="0" presId="urn:microsoft.com/office/officeart/2005/8/layout/hierarchy1"/>
+    <dgm:cxn modelId="{65FCF7A1-E5AA-4554-8B13-7311E279CE15}" type="presParOf" srcId="{3B89A7C7-87BD-457E-A0F8-9C99F65E84BF}" destId="{1A89049A-5504-430F-8BF5-7C03D6330046}" srcOrd="0" destOrd="0" presId="urn:microsoft.com/office/officeart/2005/8/layout/hierarchy1"/>
+    <dgm:cxn modelId="{6804A1C2-F83B-4612-BFD7-5CEDDBF28AD1}" type="presParOf" srcId="{3B89A7C7-87BD-457E-A0F8-9C99F65E84BF}" destId="{190029D3-CF5D-4F20-906E-7ABEAD252E9E}" srcOrd="1" destOrd="0" presId="urn:microsoft.com/office/officeart/2005/8/layout/hierarchy1"/>
+    <dgm:cxn modelId="{99C6F869-368C-4C32-A08E-FAC48BB91A2B}" type="presParOf" srcId="{84A5E146-83F6-49C2-89E3-A1AD808C63AE}" destId="{65F9DBE1-9979-41AB-8747-7C4F4F19D3CA}" srcOrd="1" destOrd="0" presId="urn:microsoft.com/office/officeart/2005/8/layout/hierarchy1"/>
     <dgm:cxn modelId="{22F4AB12-1F4B-4EDF-B43E-365F9BAD3AA9}" type="presParOf" srcId="{36221A64-3144-44B8-99A6-68A266EF2B82}" destId="{F11E8542-670B-4C31-9321-CE1749F6A240}" srcOrd="4" destOrd="0" presId="urn:microsoft.com/office/officeart/2005/8/layout/hierarchy1"/>
     <dgm:cxn modelId="{7F17C391-2CB9-4159-B600-9203E95FCEFD}" type="presParOf" srcId="{36221A64-3144-44B8-99A6-68A266EF2B82}" destId="{EBBD0B80-74ED-4AB2-9005-4A8E53EB22CA}" srcOrd="5" destOrd="0" presId="urn:microsoft.com/office/officeart/2005/8/layout/hierarchy1"/>
     <dgm:cxn modelId="{EF5ED7A7-5071-46C2-AF71-29319D5A88F8}" type="presParOf" srcId="{EBBD0B80-74ED-4AB2-9005-4A8E53EB22CA}" destId="{938A9991-E987-46BF-8CEC-C8A77EA834C0}" srcOrd="0" destOrd="0" presId="urn:microsoft.com/office/officeart/2005/8/layout/hierarchy1"/>
@@ -7087,6 +7552,12 @@
     <dgm:cxn modelId="{F848AE66-1114-4858-BE79-04CACF82E1C6}" type="presParOf" srcId="{8B8AA2C8-1281-41EA-BC1E-7726824782D8}" destId="{6AE09336-FD27-4347-B366-7BAEBB03AE82}" srcOrd="0" destOrd="0" presId="urn:microsoft.com/office/officeart/2005/8/layout/hierarchy1"/>
     <dgm:cxn modelId="{F228C96C-6017-4D19-813E-FBA7ADF328DD}" type="presParOf" srcId="{8B8AA2C8-1281-41EA-BC1E-7726824782D8}" destId="{4873AE97-C020-4FCC-85D0-2A8AA08A1EE7}" srcOrd="1" destOrd="0" presId="urn:microsoft.com/office/officeart/2005/8/layout/hierarchy1"/>
     <dgm:cxn modelId="{DA5F7578-5328-4E0A-AF48-D1E017EA83EC}" type="presParOf" srcId="{3408C42B-3A85-4734-A553-0D94E149DB9E}" destId="{520D8464-459F-4286-8FCD-C6F30C7FD64B}" srcOrd="1" destOrd="0" presId="urn:microsoft.com/office/officeart/2005/8/layout/hierarchy1"/>
+    <dgm:cxn modelId="{591006EB-AFE2-4CD1-960B-4FEE6E12EA42}" type="presParOf" srcId="{97E4EB3B-9066-4CE5-A7B4-4DFBBCFE1302}" destId="{08944219-5135-414B-9E47-A9E57E91536A}" srcOrd="6" destOrd="0" presId="urn:microsoft.com/office/officeart/2005/8/layout/hierarchy1"/>
+    <dgm:cxn modelId="{CA7A0F59-7565-43A0-900B-D2DA9C4ABE4E}" type="presParOf" srcId="{97E4EB3B-9066-4CE5-A7B4-4DFBBCFE1302}" destId="{512D6CDC-7EB3-456F-85A2-FE96099AB4D4}" srcOrd="7" destOrd="0" presId="urn:microsoft.com/office/officeart/2005/8/layout/hierarchy1"/>
+    <dgm:cxn modelId="{A7CABA3A-9BDB-48B1-A5C8-E94392B62480}" type="presParOf" srcId="{512D6CDC-7EB3-456F-85A2-FE96099AB4D4}" destId="{40B3B295-C2D2-4BA5-8DE8-D26BE285BB6A}" srcOrd="0" destOrd="0" presId="urn:microsoft.com/office/officeart/2005/8/layout/hierarchy1"/>
+    <dgm:cxn modelId="{F272FAB2-C9D0-46FC-A2DF-322322E2C6E1}" type="presParOf" srcId="{40B3B295-C2D2-4BA5-8DE8-D26BE285BB6A}" destId="{5706623D-2CC6-4897-8122-2A1A8E8EFF35}" srcOrd="0" destOrd="0" presId="urn:microsoft.com/office/officeart/2005/8/layout/hierarchy1"/>
+    <dgm:cxn modelId="{6202D78B-3770-4A75-A157-E5C56EC78354}" type="presParOf" srcId="{40B3B295-C2D2-4BA5-8DE8-D26BE285BB6A}" destId="{798F6B39-52BD-410A-BC57-4520A5F482F8}" srcOrd="1" destOrd="0" presId="urn:microsoft.com/office/officeart/2005/8/layout/hierarchy1"/>
+    <dgm:cxn modelId="{EA1304D1-9E83-46C0-98DF-142AB5AC12FB}" type="presParOf" srcId="{512D6CDC-7EB3-456F-85A2-FE96099AB4D4}" destId="{CA64CC64-DF94-48EF-A06E-B5968C506B58}" srcOrd="1" destOrd="0" presId="urn:microsoft.com/office/officeart/2005/8/layout/hierarchy1"/>
     <dgm:cxn modelId="{9B362C57-EDF3-4B9B-8B54-6434B094538D}" type="presParOf" srcId="{36221A64-3144-44B8-99A6-68A266EF2B82}" destId="{99053230-842C-47DC-A3CE-0DFCE161DD0D}" srcOrd="6" destOrd="0" presId="urn:microsoft.com/office/officeart/2005/8/layout/hierarchy1"/>
     <dgm:cxn modelId="{46B3075B-C899-490B-927D-E8218877D48B}" type="presParOf" srcId="{36221A64-3144-44B8-99A6-68A266EF2B82}" destId="{691731E6-AF1D-492F-ABC5-594956B61865}" srcOrd="7" destOrd="0" presId="urn:microsoft.com/office/officeart/2005/8/layout/hierarchy1"/>
     <dgm:cxn modelId="{79ED5BCA-C233-4C0A-BBF2-33BC108C68E6}" type="presParOf" srcId="{691731E6-AF1D-492F-ABC5-594956B61865}" destId="{B3FA8080-CC01-4ACE-A7F5-3857FCC58138}" srcOrd="0" destOrd="0" presId="urn:microsoft.com/office/officeart/2005/8/layout/hierarchy1"/>
@@ -7482,6 +7953,13 @@
         </dgm:presLayoutVars>
       </dgm:prSet>
       <dgm:spPr/>
+      <dgm:t>
+        <a:bodyPr/>
+        <a:lstStyle/>
+        <a:p>
+          <a:endParaRPr lang="en-US"/>
+        </a:p>
+      </dgm:t>
     </dgm:pt>
   </dgm:ptLst>
   <dgm:cxnLst>
@@ -7496,8 +7974,8 @@
     <dgm:cxn modelId="{DFF04B8D-FA8A-45E0-9172-2F7C107B8514}" type="presOf" srcId="{E2A2FC19-1699-4D5D-BC5B-8184E3BB5836}" destId="{6EE1AD01-DC59-4CFD-9369-07BB1364D650}" srcOrd="0" destOrd="0" presId="urn:microsoft.com/office/officeart/2005/8/layout/chevron1"/>
     <dgm:cxn modelId="{DFD492CE-D6A4-4885-8018-3220D58B147E}" srcId="{A6EAE4B1-877D-42DB-A5CB-A9EE9AC3805E}" destId="{F0D13FA7-1932-4E7F-994C-C8C62B249AB7}" srcOrd="2" destOrd="0" parTransId="{FE2FFB95-F698-45E1-8F34-F5DEB194D341}" sibTransId="{4FFB8C0F-3EFD-4557-9038-64E25CA29686}"/>
     <dgm:cxn modelId="{1FCA605B-4461-45EC-99BA-168F9C87B018}" srcId="{A6EAE4B1-877D-42DB-A5CB-A9EE9AC3805E}" destId="{3C0B2BFF-0787-4238-818F-7B195CA491BD}" srcOrd="0" destOrd="0" parTransId="{1DB87269-9E7F-4321-B4C7-89671824F09A}" sibTransId="{9EEDD691-E61D-41CA-BE65-957A67E0E2E6}"/>
+    <dgm:cxn modelId="{9154521A-C956-4A28-BD4A-1A100F103F72}" srcId="{A6EAE4B1-877D-42DB-A5CB-A9EE9AC3805E}" destId="{BCDB2AF0-EB19-4E19-A992-47C378A25E99}" srcOrd="1" destOrd="0" parTransId="{93573811-B71D-4CE2-A0D3-C79A18915081}" sibTransId="{60DE0289-CF81-4C64-A90B-CA1A51C90884}"/>
     <dgm:cxn modelId="{53E8B6B7-B3B2-4114-BE6B-B3CC4AEF6B60}" srcId="{A6EAE4B1-877D-42DB-A5CB-A9EE9AC3805E}" destId="{0746D09A-358D-4B48-B2B8-795CF9522C53}" srcOrd="3" destOrd="0" parTransId="{EDA600CC-02A8-442B-9C8A-E020B9853CD4}" sibTransId="{A223E834-D462-415F-9910-9AC824E73EAC}"/>
-    <dgm:cxn modelId="{9154521A-C956-4A28-BD4A-1A100F103F72}" srcId="{A6EAE4B1-877D-42DB-A5CB-A9EE9AC3805E}" destId="{BCDB2AF0-EB19-4E19-A992-47C378A25E99}" srcOrd="1" destOrd="0" parTransId="{93573811-B71D-4CE2-A0D3-C79A18915081}" sibTransId="{60DE0289-CF81-4C64-A90B-CA1A51C90884}"/>
     <dgm:cxn modelId="{94469146-0433-4ED1-B8A3-B3735141397F}" type="presParOf" srcId="{B5B4D244-990D-416B-BD61-E19906533B59}" destId="{4572A491-6279-4B35-B711-D1A5BD229640}" srcOrd="0" destOrd="0" presId="urn:microsoft.com/office/officeart/2005/8/layout/chevron1"/>
     <dgm:cxn modelId="{729B9C55-9D61-46AB-9F1A-2AAB6E7D582C}" type="presParOf" srcId="{B5B4D244-990D-416B-BD61-E19906533B59}" destId="{A5AD145C-D260-488E-8B4B-2E83F9CF76EB}" srcOrd="1" destOrd="0" presId="urn:microsoft.com/office/officeart/2005/8/layout/chevron1"/>
     <dgm:cxn modelId="{3A45E807-2594-4822-A7A3-43009FA97AFB}" type="presParOf" srcId="{B5B4D244-990D-416B-BD61-E19906533B59}" destId="{1113AE68-48EA-4935-AFF7-309EC9966265}" srcOrd="2" destOrd="0" presId="urn:microsoft.com/office/officeart/2005/8/layout/chevron1"/>
@@ -15456,7 +15934,8 @@
           <a:p>
             <a:fld id="{EBF26831-3069-4282-AA8E-ACC810DA8E34}" type="datetimeFigureOut">
               <a:rPr lang="en-US" smtClean="0"/>
-              <a:t>2/2/2012</a:t>
+              <a:pPr/>
+              <a:t>2/4/2012</a:t>
             </a:fld>
             <a:endParaRPr lang="en-US"/>
           </a:p>
@@ -15617,6 +16096,7 @@
           <a:p>
             <a:fld id="{057378C6-1D33-424F-9940-3044A27190E1}" type="slidenum">
               <a:rPr lang="en-US" smtClean="0"/>
+              <a:pPr/>
               <a:t>‹#›</a:t>
             </a:fld>
             <a:endParaRPr lang="en-US"/>
@@ -15788,6 +16268,7 @@
           <a:p>
             <a:fld id="{057378C6-1D33-424F-9940-3044A27190E1}" type="slidenum">
               <a:rPr lang="en-US" smtClean="0"/>
+              <a:pPr/>
               <a:t>9</a:t>
             </a:fld>
             <a:endParaRPr lang="en-US"/>
@@ -18814,7 +19295,6 @@
               <a:rPr lang="en-US" smtClean="0"/>
               <a:t>Fifth level</a:t>
             </a:r>
-            <a:endParaRPr lang="en-US" smtClean="0"/>
           </a:p>
         </p:txBody>
       </p:sp>
@@ -18992,7 +19472,6 @@
               <a:rPr lang="en-US" smtClean="0"/>
               <a:t>Click to edit Master title style</a:t>
             </a:r>
-            <a:endParaRPr lang="en-US" smtClean="0"/>
           </a:p>
         </p:txBody>
       </p:sp>
@@ -19744,11 +20223,7 @@
           <a:p>
             <a:r>
               <a:rPr lang="en-US" dirty="0" smtClean="0"/>
-              <a:t>2.</a:t>
-            </a:r>
-            <a:r>
-              <a:rPr lang="en-US" dirty="0" smtClean="0"/>
-              <a:t>Project hierarchy</a:t>
+              <a:t>2.Project hierarchy</a:t>
             </a:r>
             <a:endParaRPr lang="en-US" dirty="0"/>
           </a:p>
@@ -19880,7 +20355,6 @@
               <a:rPr lang="en-US" b="1" dirty="0" smtClean="0"/>
               <a:t> the team work:</a:t>
             </a:r>
-            <a:endParaRPr lang="en-US" b="1" dirty="0" smtClean="0"/>
           </a:p>
           <a:p>
             <a:pPr lvl="1"/>
@@ -20025,11 +20499,7 @@
           <a:p>
             <a:r>
               <a:rPr lang="en-US" dirty="0" smtClean="0"/>
-              <a:t>3.</a:t>
-            </a:r>
-            <a:r>
-              <a:rPr lang="en-US" dirty="0" smtClean="0"/>
-              <a:t>Team hierarchy</a:t>
+              <a:t>3.Team hierarchy</a:t>
             </a:r>
             <a:endParaRPr lang="en-US" dirty="0"/>
           </a:p>
@@ -22120,11 +22590,7 @@
           <a:p>
             <a:r>
               <a:rPr lang="en-US" dirty="0" smtClean="0"/>
-              <a:t>1.</a:t>
-            </a:r>
-            <a:r>
-              <a:rPr lang="en-US" dirty="0" smtClean="0"/>
-              <a:t>Norms in project</a:t>
+              <a:t>1.Norms in project</a:t>
             </a:r>
             <a:endParaRPr lang="en-US" dirty="0"/>
           </a:p>
@@ -22289,11 +22755,7 @@
           <a:p>
             <a:r>
               <a:rPr lang="en-US" dirty="0" smtClean="0"/>
-              <a:t>1.</a:t>
-            </a:r>
-            <a:r>
-              <a:rPr lang="en-US" dirty="0" smtClean="0"/>
-              <a:t>Norms in project</a:t>
+              <a:t>1.Norms in project</a:t>
             </a:r>
             <a:endParaRPr lang="en-US" dirty="0"/>
           </a:p>
@@ -22451,11 +22913,7 @@
           <a:p>
             <a:r>
               <a:rPr lang="en-US" dirty="0" smtClean="0"/>
-              <a:t>1.</a:t>
-            </a:r>
-            <a:r>
-              <a:rPr lang="en-US" dirty="0" smtClean="0"/>
-              <a:t>Norms in project</a:t>
+              <a:t>1.Norms in project</a:t>
             </a:r>
             <a:endParaRPr lang="en-US" dirty="0"/>
           </a:p>
@@ -22616,11 +23074,7 @@
           <a:p>
             <a:r>
               <a:rPr lang="en-US" dirty="0" smtClean="0"/>
-              <a:t>1.</a:t>
-            </a:r>
-            <a:r>
-              <a:rPr lang="en-US" dirty="0" smtClean="0"/>
-              <a:t>Norms in project</a:t>
+              <a:t>1.Norms in project</a:t>
             </a:r>
             <a:endParaRPr lang="en-US" dirty="0"/>
           </a:p>
@@ -23092,11 +23546,7 @@
           <a:p>
             <a:r>
               <a:rPr lang="en-US" dirty="0" smtClean="0"/>
-              <a:t>2.</a:t>
-            </a:r>
-            <a:r>
-              <a:rPr lang="en-US" dirty="0" smtClean="0"/>
-              <a:t>Project hierarchy</a:t>
+              <a:t>2.Project hierarchy</a:t>
             </a:r>
             <a:endParaRPr lang="en-US" dirty="0"/>
           </a:p>

</xml_diff>

<commit_message>
update phan viec của phong ngay 7/2
</commit_message>
<xml_diff>
--- a/Document/00.Other/FUFO_First_Plan.pptx
+++ b/Document/00.Other/FUFO_First_Plan.pptx
@@ -6724,61 +6724,6 @@
         </a:p>
       </dgm:t>
     </dgm:pt>
-    <dgm:pt modelId="{1268D9A6-1C5D-4525-8BCE-F95BA0099FE2}">
-      <dgm:prSet phldrT="[Text]"/>
-      <dgm:spPr>
-        <a:solidFill>
-          <a:srgbClr val="DA36AF">
-            <a:alpha val="90000"/>
-          </a:srgbClr>
-        </a:solidFill>
-      </dgm:spPr>
-      <dgm:t>
-        <a:bodyPr/>
-        <a:lstStyle/>
-        <a:p>
-          <a:r>
-            <a:rPr lang="en-US" dirty="0" err="1" smtClean="0">
-              <a:solidFill>
-                <a:schemeClr val="bg1">
-                  <a:lumMod val="95000"/>
-                </a:schemeClr>
-              </a:solidFill>
-            </a:rPr>
-            <a:t>DươngLTH</a:t>
-          </a:r>
-          <a:endParaRPr lang="en-US" dirty="0">
-            <a:solidFill>
-              <a:schemeClr val="bg1">
-                <a:lumMod val="95000"/>
-              </a:schemeClr>
-            </a:solidFill>
-          </a:endParaRPr>
-        </a:p>
-      </dgm:t>
-    </dgm:pt>
-    <dgm:pt modelId="{4A16BB1F-0A33-48F0-B90E-7BDB067E5DBF}" type="parTrans" cxnId="{C920D167-8902-447F-B704-15D39A8C068C}">
-      <dgm:prSet/>
-      <dgm:spPr/>
-      <dgm:t>
-        <a:bodyPr/>
-        <a:lstStyle/>
-        <a:p>
-          <a:endParaRPr lang="en-US"/>
-        </a:p>
-      </dgm:t>
-    </dgm:pt>
-    <dgm:pt modelId="{F3594267-3723-4EF9-BAC2-63217F264343}" type="sibTrans" cxnId="{C920D167-8902-447F-B704-15D39A8C068C}">
-      <dgm:prSet/>
-      <dgm:spPr/>
-      <dgm:t>
-        <a:bodyPr/>
-        <a:lstStyle/>
-        <a:p>
-          <a:endParaRPr lang="en-US"/>
-        </a:p>
-      </dgm:t>
-    </dgm:pt>
     <dgm:pt modelId="{63C696C5-07BD-420C-8016-3E5DDE8B8832}">
       <dgm:prSet phldrT="[Text]"/>
       <dgm:spPr>
@@ -6815,10 +6760,24 @@
     <dgm:pt modelId="{053C239E-BF2B-45C5-A2D7-9A14D0E866A3}" type="parTrans" cxnId="{9FAC9FDE-7CB8-4A98-BE3B-8A729D97D333}">
       <dgm:prSet/>
       <dgm:spPr/>
+      <dgm:t>
+        <a:bodyPr/>
+        <a:lstStyle/>
+        <a:p>
+          <a:endParaRPr lang="en-US"/>
+        </a:p>
+      </dgm:t>
     </dgm:pt>
     <dgm:pt modelId="{617BAF96-6F92-435D-802D-ED857D1D6DC6}" type="sibTrans" cxnId="{9FAC9FDE-7CB8-4A98-BE3B-8A729D97D333}">
       <dgm:prSet/>
       <dgm:spPr/>
+      <dgm:t>
+        <a:bodyPr/>
+        <a:lstStyle/>
+        <a:p>
+          <a:endParaRPr lang="en-US"/>
+        </a:p>
+      </dgm:t>
     </dgm:pt>
     <dgm:pt modelId="{1C2627F7-A448-4AA5-96EB-2FA250463777}">
       <dgm:prSet phldrT="[Text]"/>
@@ -6856,10 +6815,24 @@
     <dgm:pt modelId="{026FF09E-DBCF-486C-949F-0F7EEE49230D}" type="parTrans" cxnId="{0BFFB86E-6980-4035-9D63-9BD83E45A92E}">
       <dgm:prSet/>
       <dgm:spPr/>
+      <dgm:t>
+        <a:bodyPr/>
+        <a:lstStyle/>
+        <a:p>
+          <a:endParaRPr lang="en-US"/>
+        </a:p>
+      </dgm:t>
     </dgm:pt>
     <dgm:pt modelId="{2C449019-D56A-4686-A70B-E63CA8F3CE85}" type="sibTrans" cxnId="{0BFFB86E-6980-4035-9D63-9BD83E45A92E}">
       <dgm:prSet/>
       <dgm:spPr/>
+      <dgm:t>
+        <a:bodyPr/>
+        <a:lstStyle/>
+        <a:p>
+          <a:endParaRPr lang="en-US"/>
+        </a:p>
+      </dgm:t>
     </dgm:pt>
     <dgm:pt modelId="{50AE0911-3195-437C-9119-7F816C8A5E95}" type="pres">
       <dgm:prSet presAssocID="{AF829859-61F7-4201-8323-ABD140313E8F}" presName="hierChild1" presStyleCnt="0">
@@ -6954,7 +6927,7 @@
       <dgm:spPr/>
     </dgm:pt>
     <dgm:pt modelId="{9CF20209-245F-4EDA-9764-33CBDD2D501E}" type="pres">
-      <dgm:prSet presAssocID="{434D147A-963A-4E4A-A913-C410E6C829B9}" presName="Name17" presStyleLbl="parChTrans1D3" presStyleIdx="0" presStyleCnt="9"/>
+      <dgm:prSet presAssocID="{434D147A-963A-4E4A-A913-C410E6C829B9}" presName="Name17" presStyleLbl="parChTrans1D3" presStyleIdx="0" presStyleCnt="8"/>
       <dgm:spPr/>
       <dgm:t>
         <a:bodyPr/>
@@ -6973,11 +6946,11 @@
       <dgm:spPr/>
     </dgm:pt>
     <dgm:pt modelId="{29A602F0-612B-4619-A605-81BEB9EB63EA}" type="pres">
-      <dgm:prSet presAssocID="{DD351C4C-72E9-4E05-8DC7-951FBBE48B55}" presName="background3" presStyleLbl="node3" presStyleIdx="0" presStyleCnt="9"/>
+      <dgm:prSet presAssocID="{DD351C4C-72E9-4E05-8DC7-951FBBE48B55}" presName="background3" presStyleLbl="node3" presStyleIdx="0" presStyleCnt="8"/>
       <dgm:spPr/>
     </dgm:pt>
     <dgm:pt modelId="{5ECD72DD-A15C-44EA-A5DF-3D6DCF4BF897}" type="pres">
-      <dgm:prSet presAssocID="{DD351C4C-72E9-4E05-8DC7-951FBBE48B55}" presName="text3" presStyleLbl="fgAcc3" presStyleIdx="0" presStyleCnt="9">
+      <dgm:prSet presAssocID="{DD351C4C-72E9-4E05-8DC7-951FBBE48B55}" presName="text3" presStyleLbl="fgAcc3" presStyleIdx="0" presStyleCnt="8">
         <dgm:presLayoutVars>
           <dgm:chPref val="3"/>
         </dgm:presLayoutVars>
@@ -6996,7 +6969,7 @@
       <dgm:spPr/>
     </dgm:pt>
     <dgm:pt modelId="{54298CE8-D607-4EF1-99DB-56E778E6E051}" type="pres">
-      <dgm:prSet presAssocID="{5B972C33-620B-4D06-A769-D30144C88AD2}" presName="Name17" presStyleLbl="parChTrans1D3" presStyleIdx="1" presStyleCnt="9"/>
+      <dgm:prSet presAssocID="{5B972C33-620B-4D06-A769-D30144C88AD2}" presName="Name17" presStyleLbl="parChTrans1D3" presStyleIdx="1" presStyleCnt="8"/>
       <dgm:spPr/>
       <dgm:t>
         <a:bodyPr/>
@@ -7015,11 +6988,11 @@
       <dgm:spPr/>
     </dgm:pt>
     <dgm:pt modelId="{132DB6EA-FA51-4876-9DEE-F086ECA9C32A}" type="pres">
-      <dgm:prSet presAssocID="{E176D4A6-23B1-45F8-8639-0521E74F02D8}" presName="background3" presStyleLbl="node3" presStyleIdx="1" presStyleCnt="9"/>
+      <dgm:prSet presAssocID="{E176D4A6-23B1-45F8-8639-0521E74F02D8}" presName="background3" presStyleLbl="node3" presStyleIdx="1" presStyleCnt="8"/>
       <dgm:spPr/>
     </dgm:pt>
     <dgm:pt modelId="{D44BB619-B5EC-4378-9406-0D139ECCE68B}" type="pres">
-      <dgm:prSet presAssocID="{E176D4A6-23B1-45F8-8639-0521E74F02D8}" presName="text3" presStyleLbl="fgAcc3" presStyleIdx="1" presStyleCnt="9">
+      <dgm:prSet presAssocID="{E176D4A6-23B1-45F8-8639-0521E74F02D8}" presName="text3" presStyleLbl="fgAcc3" presStyleIdx="1" presStyleCnt="8">
         <dgm:presLayoutVars>
           <dgm:chPref val="3"/>
         </dgm:presLayoutVars>
@@ -7080,7 +7053,7 @@
       <dgm:spPr/>
     </dgm:pt>
     <dgm:pt modelId="{1B3ED58B-D34A-44D0-9577-E58646AC7A19}" type="pres">
-      <dgm:prSet presAssocID="{D4830123-865B-406D-A862-C0D16419462C}" presName="Name17" presStyleLbl="parChTrans1D3" presStyleIdx="2" presStyleCnt="9"/>
+      <dgm:prSet presAssocID="{D4830123-865B-406D-A862-C0D16419462C}" presName="Name17" presStyleLbl="parChTrans1D3" presStyleIdx="2" presStyleCnt="8"/>
       <dgm:spPr/>
       <dgm:t>
         <a:bodyPr/>
@@ -7099,11 +7072,11 @@
       <dgm:spPr/>
     </dgm:pt>
     <dgm:pt modelId="{B3CC3B55-A248-479E-BDA0-8B119091B116}" type="pres">
-      <dgm:prSet presAssocID="{CF02CACD-5214-4A46-984B-DC32F543FA4D}" presName="background3" presStyleLbl="node3" presStyleIdx="2" presStyleCnt="9"/>
+      <dgm:prSet presAssocID="{CF02CACD-5214-4A46-984B-DC32F543FA4D}" presName="background3" presStyleLbl="node3" presStyleIdx="2" presStyleCnt="8"/>
       <dgm:spPr/>
     </dgm:pt>
     <dgm:pt modelId="{11628CE3-4FE4-4A63-9E6F-3C23CDD49E54}" type="pres">
-      <dgm:prSet presAssocID="{CF02CACD-5214-4A46-984B-DC32F543FA4D}" presName="text3" presStyleLbl="fgAcc3" presStyleIdx="2" presStyleCnt="9">
+      <dgm:prSet presAssocID="{CF02CACD-5214-4A46-984B-DC32F543FA4D}" presName="text3" presStyleLbl="fgAcc3" presStyleIdx="2" presStyleCnt="8">
         <dgm:presLayoutVars>
           <dgm:chPref val="3"/>
         </dgm:presLayoutVars>
@@ -7122,7 +7095,7 @@
       <dgm:spPr/>
     </dgm:pt>
     <dgm:pt modelId="{8CF190DC-55BF-4F5C-9A2F-88258F63CAFE}" type="pres">
-      <dgm:prSet presAssocID="{053C239E-BF2B-45C5-A2D7-9A14D0E866A3}" presName="Name17" presStyleLbl="parChTrans1D3" presStyleIdx="3" presStyleCnt="9"/>
+      <dgm:prSet presAssocID="{053C239E-BF2B-45C5-A2D7-9A14D0E866A3}" presName="Name17" presStyleLbl="parChTrans1D3" presStyleIdx="3" presStyleCnt="8"/>
       <dgm:spPr/>
     </dgm:pt>
     <dgm:pt modelId="{84A5E146-83F6-49C2-89E3-A1AD808C63AE}" type="pres">
@@ -7134,11 +7107,11 @@
       <dgm:spPr/>
     </dgm:pt>
     <dgm:pt modelId="{1A89049A-5504-430F-8BF5-7C03D6330046}" type="pres">
-      <dgm:prSet presAssocID="{63C696C5-07BD-420C-8016-3E5DDE8B8832}" presName="background3" presStyleLbl="node3" presStyleIdx="3" presStyleCnt="9"/>
+      <dgm:prSet presAssocID="{63C696C5-07BD-420C-8016-3E5DDE8B8832}" presName="background3" presStyleLbl="node3" presStyleIdx="3" presStyleCnt="8"/>
       <dgm:spPr/>
     </dgm:pt>
     <dgm:pt modelId="{190029D3-CF5D-4F20-906E-7ABEAD252E9E}" type="pres">
-      <dgm:prSet presAssocID="{63C696C5-07BD-420C-8016-3E5DDE8B8832}" presName="text3" presStyleLbl="fgAcc3" presStyleIdx="3" presStyleCnt="9">
+      <dgm:prSet presAssocID="{63C696C5-07BD-420C-8016-3E5DDE8B8832}" presName="text3" presStyleLbl="fgAcc3" presStyleIdx="3" presStyleCnt="8">
         <dgm:presLayoutVars>
           <dgm:chPref val="3"/>
         </dgm:presLayoutVars>
@@ -7199,7 +7172,7 @@
       <dgm:spPr/>
     </dgm:pt>
     <dgm:pt modelId="{46137AA4-6786-4C01-A081-9B0DA8B28B5C}" type="pres">
-      <dgm:prSet presAssocID="{9FC1897A-6480-485D-9E7D-048D0DD3ED34}" presName="Name17" presStyleLbl="parChTrans1D3" presStyleIdx="4" presStyleCnt="9"/>
+      <dgm:prSet presAssocID="{9FC1897A-6480-485D-9E7D-048D0DD3ED34}" presName="Name17" presStyleLbl="parChTrans1D3" presStyleIdx="4" presStyleCnt="8"/>
       <dgm:spPr/>
       <dgm:t>
         <a:bodyPr/>
@@ -7218,11 +7191,11 @@
       <dgm:spPr/>
     </dgm:pt>
     <dgm:pt modelId="{93EBB00C-A530-4F32-97E6-709AFD6597E9}" type="pres">
-      <dgm:prSet presAssocID="{1D83D59B-98DC-4BA5-9FD2-E98B9B1E3ACD}" presName="background3" presStyleLbl="node3" presStyleIdx="4" presStyleCnt="9"/>
+      <dgm:prSet presAssocID="{1D83D59B-98DC-4BA5-9FD2-E98B9B1E3ACD}" presName="background3" presStyleLbl="node3" presStyleIdx="4" presStyleCnt="8"/>
       <dgm:spPr/>
     </dgm:pt>
     <dgm:pt modelId="{AA9179AC-72FA-4C01-BB7C-497E14465A99}" type="pres">
-      <dgm:prSet presAssocID="{1D83D59B-98DC-4BA5-9FD2-E98B9B1E3ACD}" presName="text3" presStyleLbl="fgAcc3" presStyleIdx="4" presStyleCnt="9">
+      <dgm:prSet presAssocID="{1D83D59B-98DC-4BA5-9FD2-E98B9B1E3ACD}" presName="text3" presStyleLbl="fgAcc3" presStyleIdx="4" presStyleCnt="8">
         <dgm:presLayoutVars>
           <dgm:chPref val="3"/>
         </dgm:presLayoutVars>
@@ -7241,7 +7214,7 @@
       <dgm:spPr/>
     </dgm:pt>
     <dgm:pt modelId="{94272433-050F-47EA-8C1B-9FE85CA17316}" type="pres">
-      <dgm:prSet presAssocID="{28C6D3A4-CFA9-44A4-91EF-9DEE449B54FD}" presName="Name17" presStyleLbl="parChTrans1D3" presStyleIdx="5" presStyleCnt="9"/>
+      <dgm:prSet presAssocID="{28C6D3A4-CFA9-44A4-91EF-9DEE449B54FD}" presName="Name17" presStyleLbl="parChTrans1D3" presStyleIdx="5" presStyleCnt="8"/>
       <dgm:spPr/>
       <dgm:t>
         <a:bodyPr/>
@@ -7260,11 +7233,11 @@
       <dgm:spPr/>
     </dgm:pt>
     <dgm:pt modelId="{154431B7-4955-47E2-A31C-EF26EDFC279C}" type="pres">
-      <dgm:prSet presAssocID="{1FE07398-AF54-4D97-975B-A3A2C0058016}" presName="background3" presStyleLbl="node3" presStyleIdx="5" presStyleCnt="9"/>
+      <dgm:prSet presAssocID="{1FE07398-AF54-4D97-975B-A3A2C0058016}" presName="background3" presStyleLbl="node3" presStyleIdx="5" presStyleCnt="8"/>
       <dgm:spPr/>
     </dgm:pt>
     <dgm:pt modelId="{6615E3C8-E1E4-4C77-8C60-867150195CF6}" type="pres">
-      <dgm:prSet presAssocID="{1FE07398-AF54-4D97-975B-A3A2C0058016}" presName="text3" presStyleLbl="fgAcc3" presStyleIdx="5" presStyleCnt="9">
+      <dgm:prSet presAssocID="{1FE07398-AF54-4D97-975B-A3A2C0058016}" presName="text3" presStyleLbl="fgAcc3" presStyleIdx="5" presStyleCnt="8">
         <dgm:presLayoutVars>
           <dgm:chPref val="3"/>
         </dgm:presLayoutVars>
@@ -7283,7 +7256,7 @@
       <dgm:spPr/>
     </dgm:pt>
     <dgm:pt modelId="{536711E3-A80A-449E-B48D-F5FC6634461D}" type="pres">
-      <dgm:prSet presAssocID="{4EAE041A-2C1A-4B18-B2B8-BF22937FB36B}" presName="Name17" presStyleLbl="parChTrans1D3" presStyleIdx="6" presStyleCnt="9"/>
+      <dgm:prSet presAssocID="{4EAE041A-2C1A-4B18-B2B8-BF22937FB36B}" presName="Name17" presStyleLbl="parChTrans1D3" presStyleIdx="6" presStyleCnt="8"/>
       <dgm:spPr/>
       <dgm:t>
         <a:bodyPr/>
@@ -7302,11 +7275,11 @@
       <dgm:spPr/>
     </dgm:pt>
     <dgm:pt modelId="{6AE09336-FD27-4347-B366-7BAEBB03AE82}" type="pres">
-      <dgm:prSet presAssocID="{B08EDF0A-F286-4E82-8065-3B0AC5E4D9A5}" presName="background3" presStyleLbl="node3" presStyleIdx="6" presStyleCnt="9"/>
+      <dgm:prSet presAssocID="{B08EDF0A-F286-4E82-8065-3B0AC5E4D9A5}" presName="background3" presStyleLbl="node3" presStyleIdx="6" presStyleCnt="8"/>
       <dgm:spPr/>
     </dgm:pt>
     <dgm:pt modelId="{4873AE97-C020-4FCC-85D0-2A8AA08A1EE7}" type="pres">
-      <dgm:prSet presAssocID="{B08EDF0A-F286-4E82-8065-3B0AC5E4D9A5}" presName="text3" presStyleLbl="fgAcc3" presStyleIdx="6" presStyleCnt="9">
+      <dgm:prSet presAssocID="{B08EDF0A-F286-4E82-8065-3B0AC5E4D9A5}" presName="text3" presStyleLbl="fgAcc3" presStyleIdx="6" presStyleCnt="8">
         <dgm:presLayoutVars>
           <dgm:chPref val="3"/>
         </dgm:presLayoutVars>
@@ -7325,7 +7298,7 @@
       <dgm:spPr/>
     </dgm:pt>
     <dgm:pt modelId="{08944219-5135-414B-9E47-A9E57E91536A}" type="pres">
-      <dgm:prSet presAssocID="{026FF09E-DBCF-486C-949F-0F7EEE49230D}" presName="Name17" presStyleLbl="parChTrans1D3" presStyleIdx="7" presStyleCnt="9"/>
+      <dgm:prSet presAssocID="{026FF09E-DBCF-486C-949F-0F7EEE49230D}" presName="Name17" presStyleLbl="parChTrans1D3" presStyleIdx="7" presStyleCnt="8"/>
       <dgm:spPr/>
     </dgm:pt>
     <dgm:pt modelId="{512D6CDC-7EB3-456F-85A2-FE96099AB4D4}" type="pres">
@@ -7337,11 +7310,11 @@
       <dgm:spPr/>
     </dgm:pt>
     <dgm:pt modelId="{5706623D-2CC6-4897-8122-2A1A8E8EFF35}" type="pres">
-      <dgm:prSet presAssocID="{1C2627F7-A448-4AA5-96EB-2FA250463777}" presName="background3" presStyleLbl="node3" presStyleIdx="7" presStyleCnt="9"/>
+      <dgm:prSet presAssocID="{1C2627F7-A448-4AA5-96EB-2FA250463777}" presName="background3" presStyleLbl="node3" presStyleIdx="7" presStyleCnt="8"/>
       <dgm:spPr/>
     </dgm:pt>
     <dgm:pt modelId="{798F6B39-52BD-410A-BC57-4520A5F482F8}" type="pres">
-      <dgm:prSet presAssocID="{1C2627F7-A448-4AA5-96EB-2FA250463777}" presName="text3" presStyleLbl="fgAcc3" presStyleIdx="7" presStyleCnt="9">
+      <dgm:prSet presAssocID="{1C2627F7-A448-4AA5-96EB-2FA250463777}" presName="text3" presStyleLbl="fgAcc3" presStyleIdx="7" presStyleCnt="8">
         <dgm:presLayoutVars>
           <dgm:chPref val="3"/>
         </dgm:presLayoutVars>
@@ -7401,92 +7374,47 @@
       <dgm:prSet presAssocID="{D78D3523-5030-4AF5-8C8A-63ABEC2E528E}" presName="hierChild3" presStyleCnt="0"/>
       <dgm:spPr/>
     </dgm:pt>
-    <dgm:pt modelId="{15393D26-DABA-4FB9-90DA-2700D2CCBB60}" type="pres">
-      <dgm:prSet presAssocID="{4A16BB1F-0A33-48F0-B90E-7BDB067E5DBF}" presName="Name17" presStyleLbl="parChTrans1D3" presStyleIdx="8" presStyleCnt="9"/>
-      <dgm:spPr/>
-      <dgm:t>
-        <a:bodyPr/>
-        <a:lstStyle/>
-        <a:p>
-          <a:endParaRPr lang="en-US"/>
-        </a:p>
-      </dgm:t>
-    </dgm:pt>
-    <dgm:pt modelId="{B8B13942-BA20-49EB-80D5-A1F1D20781DD}" type="pres">
-      <dgm:prSet presAssocID="{1268D9A6-1C5D-4525-8BCE-F95BA0099FE2}" presName="hierRoot3" presStyleCnt="0"/>
-      <dgm:spPr/>
-    </dgm:pt>
-    <dgm:pt modelId="{C94059DB-2AE1-4D47-B234-1EDCC19D1D45}" type="pres">
-      <dgm:prSet presAssocID="{1268D9A6-1C5D-4525-8BCE-F95BA0099FE2}" presName="composite3" presStyleCnt="0"/>
-      <dgm:spPr/>
-    </dgm:pt>
-    <dgm:pt modelId="{3C69D9D9-0BEA-4613-A5F4-B78C8A66307D}" type="pres">
-      <dgm:prSet presAssocID="{1268D9A6-1C5D-4525-8BCE-F95BA0099FE2}" presName="background3" presStyleLbl="node3" presStyleIdx="8" presStyleCnt="9"/>
-      <dgm:spPr/>
-    </dgm:pt>
-    <dgm:pt modelId="{DDC8F10D-32D0-48B7-9A78-9483E263C534}" type="pres">
-      <dgm:prSet presAssocID="{1268D9A6-1C5D-4525-8BCE-F95BA0099FE2}" presName="text3" presStyleLbl="fgAcc3" presStyleIdx="8" presStyleCnt="9">
-        <dgm:presLayoutVars>
-          <dgm:chPref val="3"/>
-        </dgm:presLayoutVars>
-      </dgm:prSet>
-      <dgm:spPr/>
-      <dgm:t>
-        <a:bodyPr/>
-        <a:lstStyle/>
-        <a:p>
-          <a:endParaRPr lang="en-US"/>
-        </a:p>
-      </dgm:t>
-    </dgm:pt>
-    <dgm:pt modelId="{3E6E3783-7CFE-47F9-A4F2-628036AC26E2}" type="pres">
-      <dgm:prSet presAssocID="{1268D9A6-1C5D-4525-8BCE-F95BA0099FE2}" presName="hierChild4" presStyleCnt="0"/>
-      <dgm:spPr/>
-    </dgm:pt>
   </dgm:ptLst>
   <dgm:cxnLst>
-    <dgm:cxn modelId="{DFEFD675-B35F-46FA-829D-F1779470C706}" type="presOf" srcId="{B08EDF0A-F286-4E82-8065-3B0AC5E4D9A5}" destId="{4873AE97-C020-4FCC-85D0-2A8AA08A1EE7}" srcOrd="0" destOrd="0" presId="urn:microsoft.com/office/officeart/2005/8/layout/hierarchy1"/>
-    <dgm:cxn modelId="{4CDA8B8A-940A-431A-AA1A-B56EAA81B0A8}" type="presOf" srcId="{50E80EE0-A4DD-47C0-AF86-36F5A9425CC3}" destId="{892C6C42-5060-433C-9DD2-2286DE0167C2}" srcOrd="0" destOrd="0" presId="urn:microsoft.com/office/officeart/2005/8/layout/hierarchy1"/>
-    <dgm:cxn modelId="{AC21D35A-E713-4210-B5E4-34B07DC6DED8}" type="presOf" srcId="{4A16BB1F-0A33-48F0-B90E-7BDB067E5DBF}" destId="{15393D26-DABA-4FB9-90DA-2700D2CCBB60}" srcOrd="0" destOrd="0" presId="urn:microsoft.com/office/officeart/2005/8/layout/hierarchy1"/>
-    <dgm:cxn modelId="{25678C81-7DD8-4C58-A60E-D139DB8CD9E1}" type="presOf" srcId="{D4830123-865B-406D-A862-C0D16419462C}" destId="{1B3ED58B-D34A-44D0-9577-E58646AC7A19}" srcOrd="0" destOrd="0" presId="urn:microsoft.com/office/officeart/2005/8/layout/hierarchy1"/>
-    <dgm:cxn modelId="{01CEB5AF-BD2A-4C67-B375-1A59B608C007}" srcId="{C4FE5C8C-C5F0-4202-9075-A3C4D79FB02C}" destId="{A414F3A0-F3D0-48C7-BD5E-C973BD4DA5FC}" srcOrd="0" destOrd="0" parTransId="{EDCF52CB-D464-4D7F-AB0F-B35D0BDA5651}" sibTransId="{C179DFEE-2BB5-43E0-ADF6-AF3A69E786FC}"/>
-    <dgm:cxn modelId="{EA74CE0A-1C2B-436E-BE25-B69450958013}" type="presOf" srcId="{CF02CACD-5214-4A46-984B-DC32F543FA4D}" destId="{11628CE3-4FE4-4A63-9E6F-3C23CDD49E54}" srcOrd="0" destOrd="0" presId="urn:microsoft.com/office/officeart/2005/8/layout/hierarchy1"/>
+    <dgm:cxn modelId="{59174B3E-CCB9-4655-8540-DE2F87DCDB80}" type="presOf" srcId="{1D83D59B-98DC-4BA5-9FD2-E98B9B1E3ACD}" destId="{AA9179AC-72FA-4C01-BB7C-497E14465A99}" srcOrd="0" destOrd="0" presId="urn:microsoft.com/office/officeart/2005/8/layout/hierarchy1"/>
+    <dgm:cxn modelId="{29868DFC-A2B8-4AE9-9199-3FBD5BA378F5}" type="presOf" srcId="{434D147A-963A-4E4A-A913-C410E6C829B9}" destId="{9CF20209-245F-4EDA-9764-33CBDD2D501E}" srcOrd="0" destOrd="0" presId="urn:microsoft.com/office/officeart/2005/8/layout/hierarchy1"/>
+    <dgm:cxn modelId="{CFB20B97-CAFF-4D71-951F-8B9F7A7FE679}" type="presOf" srcId="{DD351C4C-72E9-4E05-8DC7-951FBBE48B55}" destId="{5ECD72DD-A15C-44EA-A5DF-3D6DCF4BF897}" srcOrd="0" destOrd="0" presId="urn:microsoft.com/office/officeart/2005/8/layout/hierarchy1"/>
+    <dgm:cxn modelId="{F90717E3-4AD1-49F6-8850-2EB3586416C0}" type="presOf" srcId="{37196A59-8A05-408E-8081-A896B92CDAE6}" destId="{BBB183F3-7B4F-4580-9BC4-B55C041C5063}" srcOrd="0" destOrd="0" presId="urn:microsoft.com/office/officeart/2005/8/layout/hierarchy1"/>
     <dgm:cxn modelId="{2B150C46-4247-4152-9328-0B54CA43702B}" srcId="{50E80EE0-A4DD-47C0-AF86-36F5A9425CC3}" destId="{CF02CACD-5214-4A46-984B-DC32F543FA4D}" srcOrd="0" destOrd="0" parTransId="{D4830123-865B-406D-A862-C0D16419462C}" sibTransId="{734D32F3-A2FC-4F87-AAC7-8B4034F7C089}"/>
-    <dgm:cxn modelId="{7A4736F5-E08E-4679-BA68-87A5269F8D89}" type="presOf" srcId="{1268D9A6-1C5D-4525-8BCE-F95BA0099FE2}" destId="{DDC8F10D-32D0-48B7-9A78-9483E263C534}" srcOrd="0" destOrd="0" presId="urn:microsoft.com/office/officeart/2005/8/layout/hierarchy1"/>
+    <dgm:cxn modelId="{15487858-AA27-4254-90AA-8EDFD34EEA48}" type="presOf" srcId="{E176D4A6-23B1-45F8-8639-0521E74F02D8}" destId="{D44BB619-B5EC-4378-9406-0D139ECCE68B}" srcOrd="0" destOrd="0" presId="urn:microsoft.com/office/officeart/2005/8/layout/hierarchy1"/>
+    <dgm:cxn modelId="{E08EDB9E-E72B-47FC-B054-F05013E35335}" srcId="{C4FE5C8C-C5F0-4202-9075-A3C4D79FB02C}" destId="{50E80EE0-A4DD-47C0-AF86-36F5A9425CC3}" srcOrd="1" destOrd="0" parTransId="{37196A59-8A05-408E-8081-A896B92CDAE6}" sibTransId="{120DCC16-057E-4097-80A3-06DCD7725CF4}"/>
+    <dgm:cxn modelId="{3CD4F185-507C-4029-87FB-840AB98E1FB1}" type="presOf" srcId="{D78D3523-5030-4AF5-8C8A-63ABEC2E528E}" destId="{665FF436-E6A1-4DEF-B412-BDBD9FCFA2A2}" srcOrd="0" destOrd="0" presId="urn:microsoft.com/office/officeart/2005/8/layout/hierarchy1"/>
+    <dgm:cxn modelId="{2BD0506F-4E28-49A0-AC2F-5D1C8E4CEAE7}" srcId="{4AFA0BCF-3F76-4A9E-9664-7040D9CE0684}" destId="{1D83D59B-98DC-4BA5-9FD2-E98B9B1E3ACD}" srcOrd="0" destOrd="0" parTransId="{9FC1897A-6480-485D-9E7D-048D0DD3ED34}" sibTransId="{7A5F4BD7-A279-49CB-A533-140E8CFB347A}"/>
+    <dgm:cxn modelId="{37A6415B-36CB-46BA-9D39-ED07D4CCDC7A}" type="presOf" srcId="{5B972C33-620B-4D06-A769-D30144C88AD2}" destId="{54298CE8-D607-4EF1-99DB-56E778E6E051}" srcOrd="0" destOrd="0" presId="urn:microsoft.com/office/officeart/2005/8/layout/hierarchy1"/>
+    <dgm:cxn modelId="{B013F9EB-7674-456B-8597-70A72F02EDA9}" type="presOf" srcId="{EDCF52CB-D464-4D7F-AB0F-B35D0BDA5651}" destId="{62D384A6-4D1E-4C91-B86B-0AA0996C5D63}" srcOrd="0" destOrd="0" presId="urn:microsoft.com/office/officeart/2005/8/layout/hierarchy1"/>
+    <dgm:cxn modelId="{0BFFB86E-6980-4035-9D63-9BD83E45A92E}" srcId="{4AFA0BCF-3F76-4A9E-9664-7040D9CE0684}" destId="{1C2627F7-A448-4AA5-96EB-2FA250463777}" srcOrd="3" destOrd="0" parTransId="{026FF09E-DBCF-486C-949F-0F7EEE49230D}" sibTransId="{2C449019-D56A-4686-A70B-E63CA8F3CE85}"/>
+    <dgm:cxn modelId="{34C5E3BA-3C29-4D6D-8A24-1204EF162599}" type="presOf" srcId="{026FF09E-DBCF-486C-949F-0F7EEE49230D}" destId="{08944219-5135-414B-9E47-A9E57E91536A}" srcOrd="0" destOrd="0" presId="urn:microsoft.com/office/officeart/2005/8/layout/hierarchy1"/>
+    <dgm:cxn modelId="{CE4CB1B4-6888-46EE-860A-E1AACBC7364D}" srcId="{A414F3A0-F3D0-48C7-BD5E-C973BD4DA5FC}" destId="{E176D4A6-23B1-45F8-8639-0521E74F02D8}" srcOrd="1" destOrd="0" parTransId="{5B972C33-620B-4D06-A769-D30144C88AD2}" sibTransId="{446B8507-2614-4842-BE67-D3CAA520C94F}"/>
     <dgm:cxn modelId="{49935385-3B61-4DEC-963D-163236FE6EB7}" srcId="{C4FE5C8C-C5F0-4202-9075-A3C4D79FB02C}" destId="{D78D3523-5030-4AF5-8C8A-63ABEC2E528E}" srcOrd="3" destOrd="0" parTransId="{5757562E-EC33-4594-94F4-7E7D4C8D111E}" sibTransId="{2F827FD8-D6A9-4D4A-A77B-09DF091FAB37}"/>
-    <dgm:cxn modelId="{954B53D5-FA35-4764-842F-87A6A1337AB6}" type="presOf" srcId="{C4FE5C8C-C5F0-4202-9075-A3C4D79FB02C}" destId="{E2E2CEF2-EA91-467F-89EE-9810B62BA7DC}" srcOrd="0" destOrd="0" presId="urn:microsoft.com/office/officeart/2005/8/layout/hierarchy1"/>
-    <dgm:cxn modelId="{15487858-AA27-4254-90AA-8EDFD34EEA48}" type="presOf" srcId="{E176D4A6-23B1-45F8-8639-0521E74F02D8}" destId="{D44BB619-B5EC-4378-9406-0D139ECCE68B}" srcOrd="0" destOrd="0" presId="urn:microsoft.com/office/officeart/2005/8/layout/hierarchy1"/>
-    <dgm:cxn modelId="{31704396-2C07-4074-9C49-1053145576AE}" type="presOf" srcId="{4AFA0BCF-3F76-4A9E-9664-7040D9CE0684}" destId="{1EB26671-3605-41EF-81D5-2B5EC94C22CD}" srcOrd="0" destOrd="0" presId="urn:microsoft.com/office/officeart/2005/8/layout/hierarchy1"/>
-    <dgm:cxn modelId="{59174B3E-CCB9-4655-8540-DE2F87DCDB80}" type="presOf" srcId="{1D83D59B-98DC-4BA5-9FD2-E98B9B1E3ACD}" destId="{AA9179AC-72FA-4C01-BB7C-497E14465A99}" srcOrd="0" destOrd="0" presId="urn:microsoft.com/office/officeart/2005/8/layout/hierarchy1"/>
-    <dgm:cxn modelId="{9E1C9B3C-335B-4441-BF42-7D18AF93A038}" type="presOf" srcId="{28C6D3A4-CFA9-44A4-91EF-9DEE449B54FD}" destId="{94272433-050F-47EA-8C1B-9FE85CA17316}" srcOrd="0" destOrd="0" presId="urn:microsoft.com/office/officeart/2005/8/layout/hierarchy1"/>
-    <dgm:cxn modelId="{37A6415B-36CB-46BA-9D39-ED07D4CCDC7A}" type="presOf" srcId="{5B972C33-620B-4D06-A769-D30144C88AD2}" destId="{54298CE8-D607-4EF1-99DB-56E778E6E051}" srcOrd="0" destOrd="0" presId="urn:microsoft.com/office/officeart/2005/8/layout/hierarchy1"/>
-    <dgm:cxn modelId="{F90717E3-4AD1-49F6-8850-2EB3586416C0}" type="presOf" srcId="{37196A59-8A05-408E-8081-A896B92CDAE6}" destId="{BBB183F3-7B4F-4580-9BC4-B55C041C5063}" srcOrd="0" destOrd="0" presId="urn:microsoft.com/office/officeart/2005/8/layout/hierarchy1"/>
-    <dgm:cxn modelId="{0BFFB86E-6980-4035-9D63-9BD83E45A92E}" srcId="{4AFA0BCF-3F76-4A9E-9664-7040D9CE0684}" destId="{1C2627F7-A448-4AA5-96EB-2FA250463777}" srcOrd="3" destOrd="0" parTransId="{026FF09E-DBCF-486C-949F-0F7EEE49230D}" sibTransId="{2C449019-D56A-4686-A70B-E63CA8F3CE85}"/>
-    <dgm:cxn modelId="{A230359A-72E5-4AEB-BD51-6D01FB28A070}" srcId="{C4FE5C8C-C5F0-4202-9075-A3C4D79FB02C}" destId="{4AFA0BCF-3F76-4A9E-9664-7040D9CE0684}" srcOrd="2" destOrd="0" parTransId="{59E1F62D-6E5A-4033-A063-F00BE8A36645}" sibTransId="{F052597A-91E1-4D1C-A292-AFF6BEB69735}"/>
-    <dgm:cxn modelId="{FC9D7D90-1ADA-431E-9257-CD62F23A7311}" srcId="{4AFA0BCF-3F76-4A9E-9664-7040D9CE0684}" destId="{1FE07398-AF54-4D97-975B-A3A2C0058016}" srcOrd="1" destOrd="0" parTransId="{28C6D3A4-CFA9-44A4-91EF-9DEE449B54FD}" sibTransId="{BA3795BF-7F39-4E7B-AD15-C9712FC1079C}"/>
-    <dgm:cxn modelId="{CE4CB1B4-6888-46EE-860A-E1AACBC7364D}" srcId="{A414F3A0-F3D0-48C7-BD5E-C973BD4DA5FC}" destId="{E176D4A6-23B1-45F8-8639-0521E74F02D8}" srcOrd="1" destOrd="0" parTransId="{5B972C33-620B-4D06-A769-D30144C88AD2}" sibTransId="{446B8507-2614-4842-BE67-D3CAA520C94F}"/>
-    <dgm:cxn modelId="{3CD4F185-507C-4029-87FB-840AB98E1FB1}" type="presOf" srcId="{D78D3523-5030-4AF5-8C8A-63ABEC2E528E}" destId="{665FF436-E6A1-4DEF-B412-BDBD9FCFA2A2}" srcOrd="0" destOrd="0" presId="urn:microsoft.com/office/officeart/2005/8/layout/hierarchy1"/>
-    <dgm:cxn modelId="{0142DEA1-1AA3-4BF7-B1F3-9449878A2BCB}" type="presOf" srcId="{053C239E-BF2B-45C5-A2D7-9A14D0E866A3}" destId="{8CF190DC-55BF-4F5C-9A2F-88258F63CAFE}" srcOrd="0" destOrd="0" presId="urn:microsoft.com/office/officeart/2005/8/layout/hierarchy1"/>
-    <dgm:cxn modelId="{C920D167-8902-447F-B704-15D39A8C068C}" srcId="{D78D3523-5030-4AF5-8C8A-63ABEC2E528E}" destId="{1268D9A6-1C5D-4525-8BCE-F95BA0099FE2}" srcOrd="0" destOrd="0" parTransId="{4A16BB1F-0A33-48F0-B90E-7BDB067E5DBF}" sibTransId="{F3594267-3723-4EF9-BAC2-63217F264343}"/>
-    <dgm:cxn modelId="{5A59D8E5-941E-4EE1-B785-2BAD60F3C967}" type="presOf" srcId="{9FC1897A-6480-485D-9E7D-048D0DD3ED34}" destId="{46137AA4-6786-4C01-A081-9B0DA8B28B5C}" srcOrd="0" destOrd="0" presId="urn:microsoft.com/office/officeart/2005/8/layout/hierarchy1"/>
-    <dgm:cxn modelId="{A7C52BBF-D16A-4358-B255-8AB50AAB348D}" type="presOf" srcId="{1FE07398-AF54-4D97-975B-A3A2C0058016}" destId="{6615E3C8-E1E4-4C77-8C60-867150195CF6}" srcOrd="0" destOrd="0" presId="urn:microsoft.com/office/officeart/2005/8/layout/hierarchy1"/>
-    <dgm:cxn modelId="{FFBE3ED4-1325-4EB0-929C-3905ADE175A6}" srcId="{AF829859-61F7-4201-8323-ABD140313E8F}" destId="{C4FE5C8C-C5F0-4202-9075-A3C4D79FB02C}" srcOrd="0" destOrd="0" parTransId="{8B909053-67F6-4143-AEA3-012B09A34130}" sibTransId="{2E396F87-2586-4005-B8A6-9F28BDD49A4F}"/>
-    <dgm:cxn modelId="{44FE4924-ACEC-4E53-8E63-33A17FB3C01F}" type="presOf" srcId="{59E1F62D-6E5A-4033-A063-F00BE8A36645}" destId="{F11E8542-670B-4C31-9321-CE1749F6A240}" srcOrd="0" destOrd="0" presId="urn:microsoft.com/office/officeart/2005/8/layout/hierarchy1"/>
-    <dgm:cxn modelId="{E08EDB9E-E72B-47FC-B054-F05013E35335}" srcId="{C4FE5C8C-C5F0-4202-9075-A3C4D79FB02C}" destId="{50E80EE0-A4DD-47C0-AF86-36F5A9425CC3}" srcOrd="1" destOrd="0" parTransId="{37196A59-8A05-408E-8081-A896B92CDAE6}" sibTransId="{120DCC16-057E-4097-80A3-06DCD7725CF4}"/>
-    <dgm:cxn modelId="{2355455D-D385-4F18-8AF9-47DBDB833B13}" type="presOf" srcId="{63C696C5-07BD-420C-8016-3E5DDE8B8832}" destId="{190029D3-CF5D-4F20-906E-7ABEAD252E9E}" srcOrd="0" destOrd="0" presId="urn:microsoft.com/office/officeart/2005/8/layout/hierarchy1"/>
-    <dgm:cxn modelId="{B013F9EB-7674-456B-8597-70A72F02EDA9}" type="presOf" srcId="{EDCF52CB-D464-4D7F-AB0F-B35D0BDA5651}" destId="{62D384A6-4D1E-4C91-B86B-0AA0996C5D63}" srcOrd="0" destOrd="0" presId="urn:microsoft.com/office/officeart/2005/8/layout/hierarchy1"/>
-    <dgm:cxn modelId="{2BD0506F-4E28-49A0-AC2F-5D1C8E4CEAE7}" srcId="{4AFA0BCF-3F76-4A9E-9664-7040D9CE0684}" destId="{1D83D59B-98DC-4BA5-9FD2-E98B9B1E3ACD}" srcOrd="0" destOrd="0" parTransId="{9FC1897A-6480-485D-9E7D-048D0DD3ED34}" sibTransId="{7A5F4BD7-A279-49CB-A533-140E8CFB347A}"/>
-    <dgm:cxn modelId="{C043220A-9D61-490A-8910-ED150A98103E}" type="presOf" srcId="{4EAE041A-2C1A-4B18-B2B8-BF22937FB36B}" destId="{536711E3-A80A-449E-B48D-F5FC6634461D}" srcOrd="0" destOrd="0" presId="urn:microsoft.com/office/officeart/2005/8/layout/hierarchy1"/>
-    <dgm:cxn modelId="{CFB20B97-CAFF-4D71-951F-8B9F7A7FE679}" type="presOf" srcId="{DD351C4C-72E9-4E05-8DC7-951FBBE48B55}" destId="{5ECD72DD-A15C-44EA-A5DF-3D6DCF4BF897}" srcOrd="0" destOrd="0" presId="urn:microsoft.com/office/officeart/2005/8/layout/hierarchy1"/>
     <dgm:cxn modelId="{239E8AA2-3A33-47FC-AF70-16440ACAAD58}" type="presOf" srcId="{A414F3A0-F3D0-48C7-BD5E-C973BD4DA5FC}" destId="{2A9EA194-D71D-4004-A3E0-9175E3AD804A}" srcOrd="0" destOrd="0" presId="urn:microsoft.com/office/officeart/2005/8/layout/hierarchy1"/>
     <dgm:cxn modelId="{88AC0845-3372-4778-8562-A5A42F842356}" srcId="{4AFA0BCF-3F76-4A9E-9664-7040D9CE0684}" destId="{B08EDF0A-F286-4E82-8065-3B0AC5E4D9A5}" srcOrd="2" destOrd="0" parTransId="{4EAE041A-2C1A-4B18-B2B8-BF22937FB36B}" sibTransId="{5D0726C4-8EA1-46BD-90B1-02EDB34ED539}"/>
-    <dgm:cxn modelId="{34C5E3BA-3C29-4D6D-8A24-1204EF162599}" type="presOf" srcId="{026FF09E-DBCF-486C-949F-0F7EEE49230D}" destId="{08944219-5135-414B-9E47-A9E57E91536A}" srcOrd="0" destOrd="0" presId="urn:microsoft.com/office/officeart/2005/8/layout/hierarchy1"/>
-    <dgm:cxn modelId="{29868DFC-A2B8-4AE9-9199-3FBD5BA378F5}" type="presOf" srcId="{434D147A-963A-4E4A-A913-C410E6C829B9}" destId="{9CF20209-245F-4EDA-9764-33CBDD2D501E}" srcOrd="0" destOrd="0" presId="urn:microsoft.com/office/officeart/2005/8/layout/hierarchy1"/>
+    <dgm:cxn modelId="{5A59D8E5-941E-4EE1-B785-2BAD60F3C967}" type="presOf" srcId="{9FC1897A-6480-485D-9E7D-048D0DD3ED34}" destId="{46137AA4-6786-4C01-A081-9B0DA8B28B5C}" srcOrd="0" destOrd="0" presId="urn:microsoft.com/office/officeart/2005/8/layout/hierarchy1"/>
+    <dgm:cxn modelId="{9FAC9FDE-7CB8-4A98-BE3B-8A729D97D333}" srcId="{50E80EE0-A4DD-47C0-AF86-36F5A9425CC3}" destId="{63C696C5-07BD-420C-8016-3E5DDE8B8832}" srcOrd="1" destOrd="0" parTransId="{053C239E-BF2B-45C5-A2D7-9A14D0E866A3}" sibTransId="{617BAF96-6F92-435D-802D-ED857D1D6DC6}"/>
+    <dgm:cxn modelId="{FFBE3ED4-1325-4EB0-929C-3905ADE175A6}" srcId="{AF829859-61F7-4201-8323-ABD140313E8F}" destId="{C4FE5C8C-C5F0-4202-9075-A3C4D79FB02C}" srcOrd="0" destOrd="0" parTransId="{8B909053-67F6-4143-AEA3-012B09A34130}" sibTransId="{2E396F87-2586-4005-B8A6-9F28BDD49A4F}"/>
+    <dgm:cxn modelId="{2355455D-D385-4F18-8AF9-47DBDB833B13}" type="presOf" srcId="{63C696C5-07BD-420C-8016-3E5DDE8B8832}" destId="{190029D3-CF5D-4F20-906E-7ABEAD252E9E}" srcOrd="0" destOrd="0" presId="urn:microsoft.com/office/officeart/2005/8/layout/hierarchy1"/>
+    <dgm:cxn modelId="{44FE4924-ACEC-4E53-8E63-33A17FB3C01F}" type="presOf" srcId="{59E1F62D-6E5A-4033-A063-F00BE8A36645}" destId="{F11E8542-670B-4C31-9321-CE1749F6A240}" srcOrd="0" destOrd="0" presId="urn:microsoft.com/office/officeart/2005/8/layout/hierarchy1"/>
+    <dgm:cxn modelId="{EA74CE0A-1C2B-436E-BE25-B69450958013}" type="presOf" srcId="{CF02CACD-5214-4A46-984B-DC32F543FA4D}" destId="{11628CE3-4FE4-4A63-9E6F-3C23CDD49E54}" srcOrd="0" destOrd="0" presId="urn:microsoft.com/office/officeart/2005/8/layout/hierarchy1"/>
+    <dgm:cxn modelId="{954B53D5-FA35-4764-842F-87A6A1337AB6}" type="presOf" srcId="{C4FE5C8C-C5F0-4202-9075-A3C4D79FB02C}" destId="{E2E2CEF2-EA91-467F-89EE-9810B62BA7DC}" srcOrd="0" destOrd="0" presId="urn:microsoft.com/office/officeart/2005/8/layout/hierarchy1"/>
+    <dgm:cxn modelId="{9E1C9B3C-335B-4441-BF42-7D18AF93A038}" type="presOf" srcId="{28C6D3A4-CFA9-44A4-91EF-9DEE449B54FD}" destId="{94272433-050F-47EA-8C1B-9FE85CA17316}" srcOrd="0" destOrd="0" presId="urn:microsoft.com/office/officeart/2005/8/layout/hierarchy1"/>
+    <dgm:cxn modelId="{A230359A-72E5-4AEB-BD51-6D01FB28A070}" srcId="{C4FE5C8C-C5F0-4202-9075-A3C4D79FB02C}" destId="{4AFA0BCF-3F76-4A9E-9664-7040D9CE0684}" srcOrd="2" destOrd="0" parTransId="{59E1F62D-6E5A-4033-A063-F00BE8A36645}" sibTransId="{F052597A-91E1-4D1C-A292-AFF6BEB69735}"/>
+    <dgm:cxn modelId="{01CEB5AF-BD2A-4C67-B375-1A59B608C007}" srcId="{C4FE5C8C-C5F0-4202-9075-A3C4D79FB02C}" destId="{A414F3A0-F3D0-48C7-BD5E-C973BD4DA5FC}" srcOrd="0" destOrd="0" parTransId="{EDCF52CB-D464-4D7F-AB0F-B35D0BDA5651}" sibTransId="{C179DFEE-2BB5-43E0-ADF6-AF3A69E786FC}"/>
+    <dgm:cxn modelId="{5E4F7F30-ADD8-4898-8EC4-D9B700281C6F}" type="presOf" srcId="{1C2627F7-A448-4AA5-96EB-2FA250463777}" destId="{798F6B39-52BD-410A-BC57-4520A5F482F8}" srcOrd="0" destOrd="0" presId="urn:microsoft.com/office/officeart/2005/8/layout/hierarchy1"/>
+    <dgm:cxn modelId="{25678C81-7DD8-4C58-A60E-D139DB8CD9E1}" type="presOf" srcId="{D4830123-865B-406D-A862-C0D16419462C}" destId="{1B3ED58B-D34A-44D0-9577-E58646AC7A19}" srcOrd="0" destOrd="0" presId="urn:microsoft.com/office/officeart/2005/8/layout/hierarchy1"/>
+    <dgm:cxn modelId="{C043220A-9D61-490A-8910-ED150A98103E}" type="presOf" srcId="{4EAE041A-2C1A-4B18-B2B8-BF22937FB36B}" destId="{536711E3-A80A-449E-B48D-F5FC6634461D}" srcOrd="0" destOrd="0" presId="urn:microsoft.com/office/officeart/2005/8/layout/hierarchy1"/>
+    <dgm:cxn modelId="{31704396-2C07-4074-9C49-1053145576AE}" type="presOf" srcId="{4AFA0BCF-3F76-4A9E-9664-7040D9CE0684}" destId="{1EB26671-3605-41EF-81D5-2B5EC94C22CD}" srcOrd="0" destOrd="0" presId="urn:microsoft.com/office/officeart/2005/8/layout/hierarchy1"/>
+    <dgm:cxn modelId="{DFEFD675-B35F-46FA-829D-F1779470C706}" type="presOf" srcId="{B08EDF0A-F286-4E82-8065-3B0AC5E4D9A5}" destId="{4873AE97-C020-4FCC-85D0-2A8AA08A1EE7}" srcOrd="0" destOrd="0" presId="urn:microsoft.com/office/officeart/2005/8/layout/hierarchy1"/>
+    <dgm:cxn modelId="{83C3C5AF-88F9-4206-8B46-1DD3BE4EE214}" srcId="{A414F3A0-F3D0-48C7-BD5E-C973BD4DA5FC}" destId="{DD351C4C-72E9-4E05-8DC7-951FBBE48B55}" srcOrd="0" destOrd="0" parTransId="{434D147A-963A-4E4A-A913-C410E6C829B9}" sibTransId="{4E4DA8F2-F873-4FAE-8DE0-E56B52C5B5AA}"/>
+    <dgm:cxn modelId="{A7C52BBF-D16A-4358-B255-8AB50AAB348D}" type="presOf" srcId="{1FE07398-AF54-4D97-975B-A3A2C0058016}" destId="{6615E3C8-E1E4-4C77-8C60-867150195CF6}" srcOrd="0" destOrd="0" presId="urn:microsoft.com/office/officeart/2005/8/layout/hierarchy1"/>
+    <dgm:cxn modelId="{0142DEA1-1AA3-4BF7-B1F3-9449878A2BCB}" type="presOf" srcId="{053C239E-BF2B-45C5-A2D7-9A14D0E866A3}" destId="{8CF190DC-55BF-4F5C-9A2F-88258F63CAFE}" srcOrd="0" destOrd="0" presId="urn:microsoft.com/office/officeart/2005/8/layout/hierarchy1"/>
+    <dgm:cxn modelId="{FC9D7D90-1ADA-431E-9257-CD62F23A7311}" srcId="{4AFA0BCF-3F76-4A9E-9664-7040D9CE0684}" destId="{1FE07398-AF54-4D97-975B-A3A2C0058016}" srcOrd="1" destOrd="0" parTransId="{28C6D3A4-CFA9-44A4-91EF-9DEE449B54FD}" sibTransId="{BA3795BF-7F39-4E7B-AD15-C9712FC1079C}"/>
+    <dgm:cxn modelId="{4CDA8B8A-940A-431A-AA1A-B56EAA81B0A8}" type="presOf" srcId="{50E80EE0-A4DD-47C0-AF86-36F5A9425CC3}" destId="{892C6C42-5060-433C-9DD2-2286DE0167C2}" srcOrd="0" destOrd="0" presId="urn:microsoft.com/office/officeart/2005/8/layout/hierarchy1"/>
     <dgm:cxn modelId="{3651B70E-C5BC-4A2F-9F70-953692EC670D}" type="presOf" srcId="{AF829859-61F7-4201-8323-ABD140313E8F}" destId="{50AE0911-3195-437C-9119-7F816C8A5E95}" srcOrd="0" destOrd="0" presId="urn:microsoft.com/office/officeart/2005/8/layout/hierarchy1"/>
     <dgm:cxn modelId="{1319027A-C2A7-49C2-9AB1-7392120D9F59}" type="presOf" srcId="{5757562E-EC33-4594-94F4-7E7D4C8D111E}" destId="{99053230-842C-47DC-A3CE-0DFCE161DD0D}" srcOrd="0" destOrd="0" presId="urn:microsoft.com/office/officeart/2005/8/layout/hierarchy1"/>
-    <dgm:cxn modelId="{5E4F7F30-ADD8-4898-8EC4-D9B700281C6F}" type="presOf" srcId="{1C2627F7-A448-4AA5-96EB-2FA250463777}" destId="{798F6B39-52BD-410A-BC57-4520A5F482F8}" srcOrd="0" destOrd="0" presId="urn:microsoft.com/office/officeart/2005/8/layout/hierarchy1"/>
-    <dgm:cxn modelId="{83C3C5AF-88F9-4206-8B46-1DD3BE4EE214}" srcId="{A414F3A0-F3D0-48C7-BD5E-C973BD4DA5FC}" destId="{DD351C4C-72E9-4E05-8DC7-951FBBE48B55}" srcOrd="0" destOrd="0" parTransId="{434D147A-963A-4E4A-A913-C410E6C829B9}" sibTransId="{4E4DA8F2-F873-4FAE-8DE0-E56B52C5B5AA}"/>
-    <dgm:cxn modelId="{9FAC9FDE-7CB8-4A98-BE3B-8A729D97D333}" srcId="{50E80EE0-A4DD-47C0-AF86-36F5A9425CC3}" destId="{63C696C5-07BD-420C-8016-3E5DDE8B8832}" srcOrd="1" destOrd="0" parTransId="{053C239E-BF2B-45C5-A2D7-9A14D0E866A3}" sibTransId="{617BAF96-6F92-435D-802D-ED857D1D6DC6}"/>
     <dgm:cxn modelId="{8BF73618-687B-4AE2-9946-7FEE24DB9432}" type="presParOf" srcId="{50AE0911-3195-437C-9119-7F816C8A5E95}" destId="{83417A64-8025-4DF4-B86A-F57A74BC2319}" srcOrd="0" destOrd="0" presId="urn:microsoft.com/office/officeart/2005/8/layout/hierarchy1"/>
     <dgm:cxn modelId="{E35A6805-5955-4539-AF1B-428D42506162}" type="presParOf" srcId="{83417A64-8025-4DF4-B86A-F57A74BC2319}" destId="{7B6A031D-0D3E-438E-B9E0-D75CDB256A2A}" srcOrd="0" destOrd="0" presId="urn:microsoft.com/office/officeart/2005/8/layout/hierarchy1"/>
     <dgm:cxn modelId="{15FF0ABE-8D84-45B4-AF8C-B034DA4065EA}" type="presParOf" srcId="{7B6A031D-0D3E-438E-B9E0-D75CDB256A2A}" destId="{41AC87DF-859D-456D-8A0C-3F6E4C6AC6E1}" srcOrd="0" destOrd="0" presId="urn:microsoft.com/office/officeart/2005/8/layout/hierarchy1"/>
@@ -7564,12 +7492,6 @@
     <dgm:cxn modelId="{6786BDEB-82F5-42AF-A8B3-EA41677DFC81}" type="presParOf" srcId="{B3FA8080-CC01-4ACE-A7F5-3857FCC58138}" destId="{94B1AC97-30F1-499E-A7B4-B87DDBE371B1}" srcOrd="0" destOrd="0" presId="urn:microsoft.com/office/officeart/2005/8/layout/hierarchy1"/>
     <dgm:cxn modelId="{87633329-AB2D-46AC-88C9-EB241473F34E}" type="presParOf" srcId="{B3FA8080-CC01-4ACE-A7F5-3857FCC58138}" destId="{665FF436-E6A1-4DEF-B412-BDBD9FCFA2A2}" srcOrd="1" destOrd="0" presId="urn:microsoft.com/office/officeart/2005/8/layout/hierarchy1"/>
     <dgm:cxn modelId="{42839BC7-AD67-4109-AF4D-78B91AB5E971}" type="presParOf" srcId="{691731E6-AF1D-492F-ABC5-594956B61865}" destId="{7DBEE065-21FC-4AA6-9032-5EC60D6E2F68}" srcOrd="1" destOrd="0" presId="urn:microsoft.com/office/officeart/2005/8/layout/hierarchy1"/>
-    <dgm:cxn modelId="{D5790253-4662-4B7F-AA64-EEE42B6BF632}" type="presParOf" srcId="{7DBEE065-21FC-4AA6-9032-5EC60D6E2F68}" destId="{15393D26-DABA-4FB9-90DA-2700D2CCBB60}" srcOrd="0" destOrd="0" presId="urn:microsoft.com/office/officeart/2005/8/layout/hierarchy1"/>
-    <dgm:cxn modelId="{4DDA5784-31AD-48C3-A964-CCA0915082C1}" type="presParOf" srcId="{7DBEE065-21FC-4AA6-9032-5EC60D6E2F68}" destId="{B8B13942-BA20-49EB-80D5-A1F1D20781DD}" srcOrd="1" destOrd="0" presId="urn:microsoft.com/office/officeart/2005/8/layout/hierarchy1"/>
-    <dgm:cxn modelId="{19E75BEB-B0C9-425A-AA5E-3FDAED4E66E7}" type="presParOf" srcId="{B8B13942-BA20-49EB-80D5-A1F1D20781DD}" destId="{C94059DB-2AE1-4D47-B234-1EDCC19D1D45}" srcOrd="0" destOrd="0" presId="urn:microsoft.com/office/officeart/2005/8/layout/hierarchy1"/>
-    <dgm:cxn modelId="{5B840026-CE43-415B-9305-A0727618C4EA}" type="presParOf" srcId="{C94059DB-2AE1-4D47-B234-1EDCC19D1D45}" destId="{3C69D9D9-0BEA-4613-A5F4-B78C8A66307D}" srcOrd="0" destOrd="0" presId="urn:microsoft.com/office/officeart/2005/8/layout/hierarchy1"/>
-    <dgm:cxn modelId="{357F701B-0458-4F7C-A199-92192D8E073B}" type="presParOf" srcId="{C94059DB-2AE1-4D47-B234-1EDCC19D1D45}" destId="{DDC8F10D-32D0-48B7-9A78-9483E263C534}" srcOrd="1" destOrd="0" presId="urn:microsoft.com/office/officeart/2005/8/layout/hierarchy1"/>
-    <dgm:cxn modelId="{32BEBA49-6AAC-447E-9324-3E24A693A75D}" type="presParOf" srcId="{B8B13942-BA20-49EB-80D5-A1F1D20781DD}" destId="{3E6E3783-7CFE-47F9-A4F2-628036AC26E2}" srcOrd="1" destOrd="0" presId="urn:microsoft.com/office/officeart/2005/8/layout/hierarchy1"/>
   </dgm:cxnLst>
   <dgm:bg/>
   <dgm:whole/>
@@ -7974,8 +7896,8 @@
     <dgm:cxn modelId="{DFF04B8D-FA8A-45E0-9172-2F7C107B8514}" type="presOf" srcId="{E2A2FC19-1699-4D5D-BC5B-8184E3BB5836}" destId="{6EE1AD01-DC59-4CFD-9369-07BB1364D650}" srcOrd="0" destOrd="0" presId="urn:microsoft.com/office/officeart/2005/8/layout/chevron1"/>
     <dgm:cxn modelId="{DFD492CE-D6A4-4885-8018-3220D58B147E}" srcId="{A6EAE4B1-877D-42DB-A5CB-A9EE9AC3805E}" destId="{F0D13FA7-1932-4E7F-994C-C8C62B249AB7}" srcOrd="2" destOrd="0" parTransId="{FE2FFB95-F698-45E1-8F34-F5DEB194D341}" sibTransId="{4FFB8C0F-3EFD-4557-9038-64E25CA29686}"/>
     <dgm:cxn modelId="{1FCA605B-4461-45EC-99BA-168F9C87B018}" srcId="{A6EAE4B1-877D-42DB-A5CB-A9EE9AC3805E}" destId="{3C0B2BFF-0787-4238-818F-7B195CA491BD}" srcOrd="0" destOrd="0" parTransId="{1DB87269-9E7F-4321-B4C7-89671824F09A}" sibTransId="{9EEDD691-E61D-41CA-BE65-957A67E0E2E6}"/>
+    <dgm:cxn modelId="{53E8B6B7-B3B2-4114-BE6B-B3CC4AEF6B60}" srcId="{A6EAE4B1-877D-42DB-A5CB-A9EE9AC3805E}" destId="{0746D09A-358D-4B48-B2B8-795CF9522C53}" srcOrd="3" destOrd="0" parTransId="{EDA600CC-02A8-442B-9C8A-E020B9853CD4}" sibTransId="{A223E834-D462-415F-9910-9AC824E73EAC}"/>
     <dgm:cxn modelId="{9154521A-C956-4A28-BD4A-1A100F103F72}" srcId="{A6EAE4B1-877D-42DB-A5CB-A9EE9AC3805E}" destId="{BCDB2AF0-EB19-4E19-A992-47C378A25E99}" srcOrd="1" destOrd="0" parTransId="{93573811-B71D-4CE2-A0D3-C79A18915081}" sibTransId="{60DE0289-CF81-4C64-A90B-CA1A51C90884}"/>
-    <dgm:cxn modelId="{53E8B6B7-B3B2-4114-BE6B-B3CC4AEF6B60}" srcId="{A6EAE4B1-877D-42DB-A5CB-A9EE9AC3805E}" destId="{0746D09A-358D-4B48-B2B8-795CF9522C53}" srcOrd="3" destOrd="0" parTransId="{EDA600CC-02A8-442B-9C8A-E020B9853CD4}" sibTransId="{A223E834-D462-415F-9910-9AC824E73EAC}"/>
     <dgm:cxn modelId="{94469146-0433-4ED1-B8A3-B3735141397F}" type="presParOf" srcId="{B5B4D244-990D-416B-BD61-E19906533B59}" destId="{4572A491-6279-4B35-B711-D1A5BD229640}" srcOrd="0" destOrd="0" presId="urn:microsoft.com/office/officeart/2005/8/layout/chevron1"/>
     <dgm:cxn modelId="{729B9C55-9D61-46AB-9F1A-2AAB6E7D582C}" type="presParOf" srcId="{B5B4D244-990D-416B-BD61-E19906533B59}" destId="{A5AD145C-D260-488E-8B4B-2E83F9CF76EB}" srcOrd="1" destOrd="0" presId="urn:microsoft.com/office/officeart/2005/8/layout/chevron1"/>
     <dgm:cxn modelId="{3A45E807-2594-4822-A7A3-43009FA97AFB}" type="presParOf" srcId="{B5B4D244-990D-416B-BD61-E19906533B59}" destId="{1113AE68-48EA-4935-AFF7-309EC9966265}" srcOrd="2" destOrd="0" presId="urn:microsoft.com/office/officeart/2005/8/layout/chevron1"/>
@@ -15935,7 +15857,7 @@
             <a:fld id="{EBF26831-3069-4282-AA8E-ACC810DA8E34}" type="datetimeFigureOut">
               <a:rPr lang="en-US" smtClean="0"/>
               <a:pPr/>
-              <a:t>2/4/2012</a:t>
+              <a:t>2/7/2012</a:t>
             </a:fld>
             <a:endParaRPr lang="en-US"/>
           </a:p>
@@ -22936,7 +22858,15 @@
           <a:p>
             <a:r>
               <a:rPr lang="en-US" b="1" dirty="0" smtClean="0"/>
-              <a:t>Naming and document:</a:t>
+              <a:t>Naming </a:t>
+            </a:r>
+            <a:r>
+              <a:rPr lang="en-US" b="1" dirty="0" smtClean="0"/>
+              <a:t>document</a:t>
+            </a:r>
+            <a:r>
+              <a:rPr lang="en-US" b="1" dirty="0" smtClean="0"/>
+              <a:t>:</a:t>
             </a:r>
           </a:p>
           <a:p>
@@ -22951,8 +22881,13 @@
                   <a:srgbClr val="00B050"/>
                 </a:solidFill>
               </a:rPr>
-              <a:t>FUFO_Naming_And_Doc_Guideline.doc</a:t>
+              <a:t>FUFO_Naming_Guideline.doc</a:t>
             </a:r>
+            <a:endParaRPr lang="en-US" dirty="0" smtClean="0">
+              <a:solidFill>
+                <a:srgbClr val="00B050"/>
+              </a:solidFill>
+            </a:endParaRPr>
           </a:p>
           <a:p>
             <a:r>

</xml_diff>